<commit_message>
Add changes in presentation
</commit_message>
<xml_diff>
--- a/Documents/Presentation.pptx
+++ b/Documents/Presentation.pptx
@@ -232,7 +232,7 @@
           <a:p>
             <a:fld id="{CC50DFF9-D8E9-4F2A-B9F1-4985679C096A}" type="datetime1">
               <a:rPr lang="bg-BG" smtClean="0"/>
-              <a:t>6.11.2021 г.</a:t>
+              <a:t>7.11.2021 г.</a:t>
             </a:fld>
             <a:endParaRPr lang="bg-BG" dirty="0"/>
           </a:p>
@@ -410,7 +410,7 @@
             <a:fld id="{653044A5-1691-448D-81DE-0AE834861BA4}" type="datetime1">
               <a:rPr lang="bg-BG" noProof="0" smtClean="0"/>
               <a:pPr/>
-              <a:t>6.11.2021 г.</a:t>
+              <a:t>7.11.2021 г.</a:t>
             </a:fld>
             <a:endParaRPr lang="bg-BG" noProof="0"/>
           </a:p>
@@ -847,7 +847,7 @@
             <a:pPr rtl="0"/>
             <a:fld id="{908621D7-224A-430A-A592-6CDC2C917898}" type="datetime1">
               <a:rPr lang="bg-BG" noProof="0" smtClean="0"/>
-              <a:t>6.11.2021 г.</a:t>
+              <a:t>7.11.2021 г.</a:t>
             </a:fld>
             <a:endParaRPr lang="bg-BG" noProof="0"/>
           </a:p>
@@ -1175,7 +1175,7 @@
             <a:pPr rtl="0"/>
             <a:fld id="{99A1D22B-1412-400A-8B38-8DF60B6776BC}" type="datetime1">
               <a:rPr lang="bg-BG" noProof="0" smtClean="0"/>
-              <a:t>6.11.2021 г.</a:t>
+              <a:t>7.11.2021 г.</a:t>
             </a:fld>
             <a:endParaRPr lang="bg-BG" noProof="0"/>
           </a:p>
@@ -1352,7 +1352,7 @@
             <a:pPr rtl="0"/>
             <a:fld id="{F08EB276-0219-4B11-9128-E22922A57FEC}" type="datetime1">
               <a:rPr lang="bg-BG" noProof="0" smtClean="0"/>
-              <a:t>6.11.2021 г.</a:t>
+              <a:t>7.11.2021 г.</a:t>
             </a:fld>
             <a:endParaRPr lang="bg-BG" noProof="0"/>
           </a:p>
@@ -1519,7 +1519,7 @@
             <a:pPr rtl="0"/>
             <a:fld id="{A577D47C-07E0-4B68-97A3-ACE6AD8CF9FD}" type="datetime1">
               <a:rPr lang="bg-BG" noProof="0" smtClean="0"/>
-              <a:t>6.11.2021 г.</a:t>
+              <a:t>7.11.2021 г.</a:t>
             </a:fld>
             <a:endParaRPr lang="bg-BG" noProof="0"/>
           </a:p>
@@ -1794,7 +1794,7 @@
             <a:pPr rtl="0"/>
             <a:fld id="{8FCE1BFD-05BA-4C45-8C5F-46598A24A3BA}" type="datetime1">
               <a:rPr lang="bg-BG" noProof="0" smtClean="0"/>
-              <a:t>6.11.2021 г.</a:t>
+              <a:t>7.11.2021 г.</a:t>
             </a:fld>
             <a:endParaRPr lang="bg-BG" noProof="0"/>
           </a:p>
@@ -2185,7 +2185,7 @@
             <a:pPr rtl="0"/>
             <a:fld id="{1034B73D-2961-452F-8257-8BA5E2AA148D}" type="datetime1">
               <a:rPr lang="bg-BG" noProof="0" smtClean="0"/>
-              <a:t>6.11.2021 г.</a:t>
+              <a:t>7.11.2021 г.</a:t>
             </a:fld>
             <a:endParaRPr lang="bg-BG" noProof="0"/>
           </a:p>
@@ -2658,7 +2658,7 @@
             <a:pPr rtl="0"/>
             <a:fld id="{EB842E98-E535-4AFF-9DD8-95300C5C051A}" type="datetime1">
               <a:rPr lang="bg-BG" noProof="0" smtClean="0"/>
-              <a:t>6.11.2021 г.</a:t>
+              <a:t>7.11.2021 г.</a:t>
             </a:fld>
             <a:endParaRPr lang="bg-BG" noProof="0"/>
           </a:p>
@@ -2774,7 +2774,7 @@
             <a:pPr rtl="0"/>
             <a:fld id="{F29935B3-9127-4E40-B655-C03C7583526C}" type="datetime1">
               <a:rPr lang="bg-BG" noProof="0" smtClean="0"/>
-              <a:t>6.11.2021 г.</a:t>
+              <a:t>7.11.2021 г.</a:t>
             </a:fld>
             <a:endParaRPr lang="bg-BG" noProof="0"/>
           </a:p>
@@ -2867,7 +2867,7 @@
             <a:pPr rtl="0"/>
             <a:fld id="{FE91D5B8-9CE4-4CDB-BD26-BB598DED82FA}" type="datetime1">
               <a:rPr lang="bg-BG" noProof="0" smtClean="0"/>
-              <a:t>6.11.2021 г.</a:t>
+              <a:t>7.11.2021 г.</a:t>
             </a:fld>
             <a:endParaRPr lang="bg-BG" noProof="0"/>
           </a:p>
@@ -3210,7 +3210,7 @@
             <a:pPr rtl="0"/>
             <a:fld id="{FD70C4BC-7D9E-4C1F-87A6-EC44819FC5AC}" type="datetime1">
               <a:rPr lang="bg-BG" noProof="0" smtClean="0"/>
-              <a:t>6.11.2021 г.</a:t>
+              <a:t>7.11.2021 г.</a:t>
             </a:fld>
             <a:endParaRPr lang="bg-BG" noProof="0"/>
           </a:p>
@@ -3597,7 +3597,7 @@
             <a:pPr rtl="0"/>
             <a:fld id="{E7690FB9-E0EE-44F6-BC23-C9E850A81F8C}" type="datetime1">
               <a:rPr lang="bg-BG" noProof="0" smtClean="0"/>
-              <a:t>6.11.2021 г.</a:t>
+              <a:t>7.11.2021 г.</a:t>
             </a:fld>
             <a:endParaRPr lang="bg-BG" noProof="0"/>
           </a:p>
@@ -3873,7 +3873,7 @@
             <a:pPr rtl="0"/>
             <a:fld id="{7948993E-CF2E-47AC-B99D-48F9175533B5}" type="datetime1">
               <a:rPr lang="bg-BG" noProof="0" smtClean="0"/>
-              <a:t>6.11.2021 г.</a:t>
+              <a:t>7.11.2021 г.</a:t>
             </a:fld>
             <a:endParaRPr lang="bg-BG" noProof="0"/>
           </a:p>
@@ -4407,7 +4407,7 @@
           <p:nvPr/>
         </p:nvPicPr>
         <p:blipFill rotWithShape="1">
-          <a:blip r:embed="rId2"/>
+          <a:blip r:embed="rId4"/>
           <a:srcRect b="20495"/>
           <a:stretch/>
         </p:blipFill>
@@ -4467,6 +4467,44 @@
           </a:p>
         </p:txBody>
       </p:sp>
+      <p:pic>
+        <p:nvPicPr>
+          <p:cNvPr id="3" name="1">
+            <a:hlinkClick r:id="" action="ppaction://media"/>
+            <a:extLst>
+              <a:ext uri="{FF2B5EF4-FFF2-40B4-BE49-F238E27FC236}">
+                <a16:creationId xmlns:a16="http://schemas.microsoft.com/office/drawing/2014/main" id="{4821B2A9-105E-4A39-81CD-059670C32F62}"/>
+              </a:ext>
+            </a:extLst>
+          </p:cNvPr>
+          <p:cNvPicPr>
+            <a:picLocks noChangeAspect="1"/>
+          </p:cNvPicPr>
+          <p:nvPr>
+            <a:audioFile r:link="rId2"/>
+            <p:extLst>
+              <p:ext uri="{DAA4B4D4-6D71-4841-9C94-3DE7FCFB9230}">
+                <p14:media xmlns:p14="http://schemas.microsoft.com/office/powerpoint/2010/main" r:embed="rId1"/>
+              </p:ext>
+            </p:extLst>
+          </p:nvPr>
+        </p:nvPicPr>
+        <p:blipFill>
+          <a:blip r:embed="rId5"/>
+          <a:stretch>
+            <a:fillRect/>
+          </a:stretch>
+        </p:blipFill>
+        <p:spPr>
+          <a:xfrm>
+            <a:off x="11155680" y="6041572"/>
+            <a:ext cx="609600" cy="609600"/>
+          </a:xfrm>
+          <a:prstGeom prst="rect">
+            <a:avLst/>
+          </a:prstGeom>
+        </p:spPr>
+      </p:pic>
     </p:spTree>
     <p:extLst>
       <p:ext uri="{BB962C8B-B14F-4D97-AF65-F5344CB8AC3E}">
@@ -4477,6 +4515,93 @@
   <p:clrMapOvr>
     <a:masterClrMapping/>
   </p:clrMapOvr>
+  <p:timing>
+    <p:tnLst>
+      <p:par>
+        <p:cTn id="1" dur="indefinite" restart="never" nodeType="tmRoot">
+          <p:childTnLst>
+            <p:seq concurrent="1" nextAc="seek">
+              <p:cTn id="2" dur="indefinite" nodeType="mainSeq">
+                <p:childTnLst>
+                  <p:par>
+                    <p:cTn id="3" fill="hold">
+                      <p:stCondLst>
+                        <p:cond delay="indefinite"/>
+                        <p:cond evt="onBegin" delay="0">
+                          <p:tn val="2"/>
+                        </p:cond>
+                      </p:stCondLst>
+                      <p:childTnLst>
+                        <p:par>
+                          <p:cTn id="4" fill="hold">
+                            <p:stCondLst>
+                              <p:cond delay="0"/>
+                            </p:stCondLst>
+                            <p:childTnLst>
+                              <p:par>
+                                <p:cTn id="5" presetID="1" presetClass="mediacall" presetSubtype="0" fill="hold" nodeType="afterEffect">
+                                  <p:stCondLst>
+                                    <p:cond delay="0"/>
+                                  </p:stCondLst>
+                                  <p:childTnLst>
+                                    <p:cmd type="call" cmd="playFrom(0.0)">
+                                      <p:cBhvr>
+                                        <p:cTn id="6" dur="5567" fill="hold"/>
+                                        <p:tgtEl>
+                                          <p:spTgt spid="3"/>
+                                        </p:tgtEl>
+                                      </p:cBhvr>
+                                    </p:cmd>
+                                  </p:childTnLst>
+                                </p:cTn>
+                              </p:par>
+                            </p:childTnLst>
+                          </p:cTn>
+                        </p:par>
+                      </p:childTnLst>
+                    </p:cTn>
+                  </p:par>
+                </p:childTnLst>
+              </p:cTn>
+              <p:prevCondLst>
+                <p:cond evt="onPrev" delay="0">
+                  <p:tgtEl>
+                    <p:sldTgt/>
+                  </p:tgtEl>
+                </p:cond>
+              </p:prevCondLst>
+              <p:nextCondLst>
+                <p:cond evt="onNext" delay="0">
+                  <p:tgtEl>
+                    <p:sldTgt/>
+                  </p:tgtEl>
+                </p:cond>
+              </p:nextCondLst>
+            </p:seq>
+            <p:audio>
+              <p:cMediaNode vol="80000">
+                <p:cTn id="7" fill="hold" display="0">
+                  <p:stCondLst>
+                    <p:cond delay="indefinite"/>
+                  </p:stCondLst>
+                  <p:endCondLst>
+                    <p:cond evt="onStopAudio" delay="0">
+                      <p:tgtEl>
+                        <p:sldTgt/>
+                      </p:tgtEl>
+                    </p:cond>
+                  </p:endCondLst>
+                </p:cTn>
+                <p:tgtEl>
+                  <p:spTgt spid="3"/>
+                </p:tgtEl>
+              </p:cMediaNode>
+            </p:audio>
+          </p:childTnLst>
+        </p:cTn>
+      </p:par>
+    </p:tnLst>
+  </p:timing>
 </p:sld>
 </file>
 
@@ -6146,6 +6271,44 @@
           </a:p>
         </p:txBody>
       </p:sp>
+      <p:pic>
+        <p:nvPicPr>
+          <p:cNvPr id="2" name="Камелия(слайд 2)">
+            <a:hlinkClick r:id="" action="ppaction://media"/>
+            <a:extLst>
+              <a:ext uri="{FF2B5EF4-FFF2-40B4-BE49-F238E27FC236}">
+                <a16:creationId xmlns:a16="http://schemas.microsoft.com/office/drawing/2014/main" id="{55D59DC7-AE04-47A9-BD19-AE430960F629}"/>
+              </a:ext>
+            </a:extLst>
+          </p:cNvPr>
+          <p:cNvPicPr>
+            <a:picLocks noChangeAspect="1"/>
+          </p:cNvPicPr>
+          <p:nvPr>
+            <a:audioFile r:link="rId2"/>
+            <p:extLst>
+              <p:ext uri="{DAA4B4D4-6D71-4841-9C94-3DE7FCFB9230}">
+                <p14:media xmlns:p14="http://schemas.microsoft.com/office/powerpoint/2010/main" r:embed="rId1"/>
+              </p:ext>
+            </p:extLst>
+          </p:nvPr>
+        </p:nvPicPr>
+        <p:blipFill>
+          <a:blip r:embed="rId4"/>
+          <a:stretch>
+            <a:fillRect/>
+          </a:stretch>
+        </p:blipFill>
+        <p:spPr>
+          <a:xfrm>
+            <a:off x="11192446" y="5654336"/>
+            <a:ext cx="609600" cy="609600"/>
+          </a:xfrm>
+          <a:prstGeom prst="rect">
+            <a:avLst/>
+          </a:prstGeom>
+        </p:spPr>
+      </p:pic>
     </p:spTree>
     <p:extLst>
       <p:ext uri="{BB962C8B-B14F-4D97-AF65-F5344CB8AC3E}">
@@ -6156,6 +6319,93 @@
   <p:clrMapOvr>
     <a:masterClrMapping/>
   </p:clrMapOvr>
+  <p:timing>
+    <p:tnLst>
+      <p:par>
+        <p:cTn id="1" dur="indefinite" restart="never" nodeType="tmRoot">
+          <p:childTnLst>
+            <p:seq concurrent="1" nextAc="seek">
+              <p:cTn id="2" dur="indefinite" nodeType="mainSeq">
+                <p:childTnLst>
+                  <p:par>
+                    <p:cTn id="3" fill="hold">
+                      <p:stCondLst>
+                        <p:cond delay="indefinite"/>
+                        <p:cond evt="onBegin" delay="0">
+                          <p:tn val="2"/>
+                        </p:cond>
+                      </p:stCondLst>
+                      <p:childTnLst>
+                        <p:par>
+                          <p:cTn id="4" fill="hold">
+                            <p:stCondLst>
+                              <p:cond delay="0"/>
+                            </p:stCondLst>
+                            <p:childTnLst>
+                              <p:par>
+                                <p:cTn id="5" presetID="1" presetClass="mediacall" presetSubtype="0" fill="hold" nodeType="afterEffect">
+                                  <p:stCondLst>
+                                    <p:cond delay="0"/>
+                                  </p:stCondLst>
+                                  <p:childTnLst>
+                                    <p:cmd type="call" cmd="playFrom(0.0)">
+                                      <p:cBhvr>
+                                        <p:cTn id="6" dur="17336" fill="hold"/>
+                                        <p:tgtEl>
+                                          <p:spTgt spid="2"/>
+                                        </p:tgtEl>
+                                      </p:cBhvr>
+                                    </p:cmd>
+                                  </p:childTnLst>
+                                </p:cTn>
+                              </p:par>
+                            </p:childTnLst>
+                          </p:cTn>
+                        </p:par>
+                      </p:childTnLst>
+                    </p:cTn>
+                  </p:par>
+                </p:childTnLst>
+              </p:cTn>
+              <p:prevCondLst>
+                <p:cond evt="onPrev" delay="0">
+                  <p:tgtEl>
+                    <p:sldTgt/>
+                  </p:tgtEl>
+                </p:cond>
+              </p:prevCondLst>
+              <p:nextCondLst>
+                <p:cond evt="onNext" delay="0">
+                  <p:tgtEl>
+                    <p:sldTgt/>
+                  </p:tgtEl>
+                </p:cond>
+              </p:nextCondLst>
+            </p:seq>
+            <p:audio>
+              <p:cMediaNode vol="80000">
+                <p:cTn id="7" fill="hold" display="0">
+                  <p:stCondLst>
+                    <p:cond delay="indefinite"/>
+                  </p:stCondLst>
+                  <p:endCondLst>
+                    <p:cond evt="onStopAudio" delay="0">
+                      <p:tgtEl>
+                        <p:sldTgt/>
+                      </p:tgtEl>
+                    </p:cond>
+                  </p:endCondLst>
+                </p:cTn>
+                <p:tgtEl>
+                  <p:spTgt spid="2"/>
+                </p:tgtEl>
+              </p:cMediaNode>
+            </p:audio>
+          </p:childTnLst>
+        </p:cTn>
+      </p:par>
+    </p:tnLst>
+  </p:timing>
 </p:sld>
 </file>
 
@@ -6642,7 +6892,7 @@
           <p:nvPr/>
         </p:nvPicPr>
         <p:blipFill>
-          <a:blip r:embed="rId2"/>
+          <a:blip r:embed="rId4"/>
           <a:stretch>
             <a:fillRect/>
           </a:stretch>
@@ -6899,6 +7149,44 @@
           </a:graphicData>
         </a:graphic>
       </p:graphicFrame>
+      <p:pic>
+        <p:nvPicPr>
+          <p:cNvPr id="2" name="3">
+            <a:hlinkClick r:id="" action="ppaction://media"/>
+            <a:extLst>
+              <a:ext uri="{FF2B5EF4-FFF2-40B4-BE49-F238E27FC236}">
+                <a16:creationId xmlns:a16="http://schemas.microsoft.com/office/drawing/2014/main" id="{1FEB6FFA-C025-4DDA-922D-D1A6E4F5E729}"/>
+              </a:ext>
+            </a:extLst>
+          </p:cNvPr>
+          <p:cNvPicPr>
+            <a:picLocks noChangeAspect="1"/>
+          </p:cNvPicPr>
+          <p:nvPr>
+            <a:audioFile r:link="rId2"/>
+            <p:extLst>
+              <p:ext uri="{DAA4B4D4-6D71-4841-9C94-3DE7FCFB9230}">
+                <p14:media xmlns:p14="http://schemas.microsoft.com/office/powerpoint/2010/main" r:embed="rId1"/>
+              </p:ext>
+            </p:extLst>
+          </p:nvPr>
+        </p:nvPicPr>
+        <p:blipFill>
+          <a:blip r:embed="rId5"/>
+          <a:stretch>
+            <a:fillRect/>
+          </a:stretch>
+        </p:blipFill>
+        <p:spPr>
+          <a:xfrm>
+            <a:off x="11199654" y="6028947"/>
+            <a:ext cx="609600" cy="609600"/>
+          </a:xfrm>
+          <a:prstGeom prst="rect">
+            <a:avLst/>
+          </a:prstGeom>
+        </p:spPr>
+      </p:pic>
     </p:spTree>
     <p:extLst>
       <p:ext uri="{BB962C8B-B14F-4D97-AF65-F5344CB8AC3E}">
@@ -6909,6 +7197,93 @@
   <p:clrMapOvr>
     <a:masterClrMapping/>
   </p:clrMapOvr>
+  <p:timing>
+    <p:tnLst>
+      <p:par>
+        <p:cTn id="1" dur="indefinite" restart="never" nodeType="tmRoot">
+          <p:childTnLst>
+            <p:seq concurrent="1" nextAc="seek">
+              <p:cTn id="2" dur="indefinite" nodeType="mainSeq">
+                <p:childTnLst>
+                  <p:par>
+                    <p:cTn id="3" fill="hold">
+                      <p:stCondLst>
+                        <p:cond delay="indefinite"/>
+                        <p:cond evt="onBegin" delay="0">
+                          <p:tn val="2"/>
+                        </p:cond>
+                      </p:stCondLst>
+                      <p:childTnLst>
+                        <p:par>
+                          <p:cTn id="4" fill="hold">
+                            <p:stCondLst>
+                              <p:cond delay="0"/>
+                            </p:stCondLst>
+                            <p:childTnLst>
+                              <p:par>
+                                <p:cTn id="5" presetID="1" presetClass="mediacall" presetSubtype="0" fill="hold" nodeType="afterEffect">
+                                  <p:stCondLst>
+                                    <p:cond delay="0"/>
+                                  </p:stCondLst>
+                                  <p:childTnLst>
+                                    <p:cmd type="call" cmd="playFrom(0.0)">
+                                      <p:cBhvr>
+                                        <p:cTn id="6" dur="13440" fill="hold"/>
+                                        <p:tgtEl>
+                                          <p:spTgt spid="2"/>
+                                        </p:tgtEl>
+                                      </p:cBhvr>
+                                    </p:cmd>
+                                  </p:childTnLst>
+                                </p:cTn>
+                              </p:par>
+                            </p:childTnLst>
+                          </p:cTn>
+                        </p:par>
+                      </p:childTnLst>
+                    </p:cTn>
+                  </p:par>
+                </p:childTnLst>
+              </p:cTn>
+              <p:prevCondLst>
+                <p:cond evt="onPrev" delay="0">
+                  <p:tgtEl>
+                    <p:sldTgt/>
+                  </p:tgtEl>
+                </p:cond>
+              </p:prevCondLst>
+              <p:nextCondLst>
+                <p:cond evt="onNext" delay="0">
+                  <p:tgtEl>
+                    <p:sldTgt/>
+                  </p:tgtEl>
+                </p:cond>
+              </p:nextCondLst>
+            </p:seq>
+            <p:audio>
+              <p:cMediaNode vol="80000">
+                <p:cTn id="7" fill="hold" display="0">
+                  <p:stCondLst>
+                    <p:cond delay="indefinite"/>
+                  </p:stCondLst>
+                  <p:endCondLst>
+                    <p:cond evt="onStopAudio" delay="0">
+                      <p:tgtEl>
+                        <p:sldTgt/>
+                      </p:tgtEl>
+                    </p:cond>
+                  </p:endCondLst>
+                </p:cTn>
+                <p:tgtEl>
+                  <p:spTgt spid="2"/>
+                </p:tgtEl>
+              </p:cMediaNode>
+            </p:audio>
+          </p:childTnLst>
+        </p:cTn>
+      </p:par>
+    </p:tnLst>
+  </p:timing>
 </p:sld>
 </file>
 
@@ -7709,7 +8084,7 @@
           <p:nvPr/>
         </p:nvPicPr>
         <p:blipFill>
-          <a:blip r:embed="rId2"/>
+          <a:blip r:embed="rId4"/>
           <a:stretch>
             <a:fillRect/>
           </a:stretch>
@@ -7739,7 +8114,7 @@
           <p:nvPr/>
         </p:nvPicPr>
         <p:blipFill>
-          <a:blip r:embed="rId3"/>
+          <a:blip r:embed="rId5"/>
           <a:stretch>
             <a:fillRect/>
           </a:stretch>
@@ -7769,7 +8144,7 @@
           <p:nvPr/>
         </p:nvPicPr>
         <p:blipFill>
-          <a:blip r:embed="rId4"/>
+          <a:blip r:embed="rId6"/>
           <a:stretch>
             <a:fillRect/>
           </a:stretch>
@@ -7799,7 +8174,7 @@
           <p:nvPr/>
         </p:nvPicPr>
         <p:blipFill>
-          <a:blip r:embed="rId5"/>
+          <a:blip r:embed="rId7"/>
           <a:stretch>
             <a:fillRect/>
           </a:stretch>
@@ -7829,7 +8204,7 @@
           <p:nvPr/>
         </p:nvPicPr>
         <p:blipFill>
-          <a:blip r:embed="rId6"/>
+          <a:blip r:embed="rId8"/>
           <a:stretch>
             <a:fillRect/>
           </a:stretch>
@@ -7859,7 +8234,7 @@
           <p:nvPr/>
         </p:nvPicPr>
         <p:blipFill>
-          <a:blip r:embed="rId7"/>
+          <a:blip r:embed="rId9"/>
           <a:stretch>
             <a:fillRect/>
           </a:stretch>
@@ -7868,6 +8243,44 @@
           <a:xfrm>
             <a:off x="5791200" y="2516234"/>
             <a:ext cx="1567544" cy="1531620"/>
+          </a:xfrm>
+          <a:prstGeom prst="rect">
+            <a:avLst/>
+          </a:prstGeom>
+        </p:spPr>
+      </p:pic>
+      <p:pic>
+        <p:nvPicPr>
+          <p:cNvPr id="3" name="Камелия(слайд 6) 1 (1)">
+            <a:hlinkClick r:id="" action="ppaction://media"/>
+            <a:extLst>
+              <a:ext uri="{FF2B5EF4-FFF2-40B4-BE49-F238E27FC236}">
+                <a16:creationId xmlns:a16="http://schemas.microsoft.com/office/drawing/2014/main" id="{E786ADEE-D86B-4E69-9F75-8ABD19B810F0}"/>
+              </a:ext>
+            </a:extLst>
+          </p:cNvPr>
+          <p:cNvPicPr>
+            <a:picLocks noChangeAspect="1"/>
+          </p:cNvPicPr>
+          <p:nvPr>
+            <a:audioFile r:link="rId2"/>
+            <p:extLst>
+              <p:ext uri="{DAA4B4D4-6D71-4841-9C94-3DE7FCFB9230}">
+                <p14:media xmlns:p14="http://schemas.microsoft.com/office/powerpoint/2010/main" r:embed="rId1"/>
+              </p:ext>
+            </p:extLst>
+          </p:nvPr>
+        </p:nvPicPr>
+        <p:blipFill>
+          <a:blip r:embed="rId10"/>
+          <a:stretch>
+            <a:fillRect/>
+          </a:stretch>
+        </p:blipFill>
+        <p:spPr>
+          <a:xfrm>
+            <a:off x="11288487" y="6101172"/>
+            <a:ext cx="609600" cy="609600"/>
           </a:xfrm>
           <a:prstGeom prst="rect">
             <a:avLst/>
@@ -7884,6 +8297,93 @@
   <p:clrMapOvr>
     <a:masterClrMapping/>
   </p:clrMapOvr>
+  <p:timing>
+    <p:tnLst>
+      <p:par>
+        <p:cTn id="1" dur="indefinite" restart="never" nodeType="tmRoot">
+          <p:childTnLst>
+            <p:seq concurrent="1" nextAc="seek">
+              <p:cTn id="2" dur="indefinite" nodeType="mainSeq">
+                <p:childTnLst>
+                  <p:par>
+                    <p:cTn id="3" fill="hold">
+                      <p:stCondLst>
+                        <p:cond delay="indefinite"/>
+                        <p:cond evt="onBegin" delay="0">
+                          <p:tn val="2"/>
+                        </p:cond>
+                      </p:stCondLst>
+                      <p:childTnLst>
+                        <p:par>
+                          <p:cTn id="4" fill="hold">
+                            <p:stCondLst>
+                              <p:cond delay="0"/>
+                            </p:stCondLst>
+                            <p:childTnLst>
+                              <p:par>
+                                <p:cTn id="5" presetID="1" presetClass="mediacall" presetSubtype="0" fill="hold" nodeType="afterEffect">
+                                  <p:stCondLst>
+                                    <p:cond delay="0"/>
+                                  </p:stCondLst>
+                                  <p:childTnLst>
+                                    <p:cmd type="call" cmd="playFrom(0.0)">
+                                      <p:cBhvr>
+                                        <p:cTn id="6" dur="21980" fill="hold"/>
+                                        <p:tgtEl>
+                                          <p:spTgt spid="3"/>
+                                        </p:tgtEl>
+                                      </p:cBhvr>
+                                    </p:cmd>
+                                  </p:childTnLst>
+                                </p:cTn>
+                              </p:par>
+                            </p:childTnLst>
+                          </p:cTn>
+                        </p:par>
+                      </p:childTnLst>
+                    </p:cTn>
+                  </p:par>
+                </p:childTnLst>
+              </p:cTn>
+              <p:prevCondLst>
+                <p:cond evt="onPrev" delay="0">
+                  <p:tgtEl>
+                    <p:sldTgt/>
+                  </p:tgtEl>
+                </p:cond>
+              </p:prevCondLst>
+              <p:nextCondLst>
+                <p:cond evt="onNext" delay="0">
+                  <p:tgtEl>
+                    <p:sldTgt/>
+                  </p:tgtEl>
+                </p:cond>
+              </p:nextCondLst>
+            </p:seq>
+            <p:audio>
+              <p:cMediaNode vol="80000">
+                <p:cTn id="7" fill="hold" display="0">
+                  <p:stCondLst>
+                    <p:cond delay="indefinite"/>
+                  </p:stCondLst>
+                  <p:endCondLst>
+                    <p:cond evt="onStopAudio" delay="0">
+                      <p:tgtEl>
+                        <p:sldTgt/>
+                      </p:tgtEl>
+                    </p:cond>
+                  </p:endCondLst>
+                </p:cTn>
+                <p:tgtEl>
+                  <p:spTgt spid="3"/>
+                </p:tgtEl>
+              </p:cMediaNode>
+            </p:audio>
+          </p:childTnLst>
+        </p:cTn>
+      </p:par>
+    </p:tnLst>
+  </p:timing>
 </p:sld>
 </file>
 
@@ -8229,7 +8729,7 @@
           <p:nvPr/>
         </p:nvPicPr>
         <p:blipFill rotWithShape="1">
-          <a:blip r:embed="rId2"/>
+          <a:blip r:embed="rId4"/>
           <a:srcRect b="8907"/>
           <a:stretch/>
         </p:blipFill>
@@ -8509,6 +9009,63 @@
               <a:buAutoNum type="arabicPeriod"/>
             </a:pPr>
             <a:r>
+              <a:rPr lang="en-US" sz="3200" b="1" dirty="0">
+                <a:solidFill>
+                  <a:schemeClr val="bg1">
+                    <a:lumMod val="95000"/>
+                  </a:schemeClr>
+                </a:solidFill>
+                <a:latin typeface="Book Antiqua"/>
+              </a:rPr>
+              <a:t>To add Multiplayer</a:t>
+            </a:r>
+            <a:endParaRPr lang="bg-BG" sz="3200" b="1" dirty="0">
+              <a:solidFill>
+                <a:schemeClr val="bg1">
+                  <a:lumMod val="95000"/>
+                </a:schemeClr>
+              </a:solidFill>
+              <a:latin typeface="Book Antiqua"/>
+            </a:endParaRPr>
+          </a:p>
+          <a:p>
+            <a:pPr marL="457200" indent="-457200">
+              <a:lnSpc>
+                <a:spcPct val="150000"/>
+              </a:lnSpc>
+              <a:buAutoNum type="arabicPeriod"/>
+            </a:pPr>
+            <a:r>
+              <a:rPr lang="en-US" sz="3200" b="1" dirty="0">
+                <a:solidFill>
+                  <a:schemeClr val="bg1">
+                    <a:lumMod val="95000"/>
+                  </a:schemeClr>
+                </a:solidFill>
+                <a:latin typeface="Book Antiqua"/>
+              </a:rPr>
+              <a:t>To add timer</a:t>
+            </a:r>
+          </a:p>
+          <a:p>
+            <a:pPr marL="457200" indent="-457200">
+              <a:lnSpc>
+                <a:spcPct val="150000"/>
+              </a:lnSpc>
+              <a:buAutoNum type="arabicPeriod"/>
+            </a:pPr>
+            <a:r>
+              <a:rPr lang="en-US" sz="3200" b="1" dirty="0">
+                <a:solidFill>
+                  <a:schemeClr val="bg1">
+                    <a:lumMod val="95000"/>
+                  </a:schemeClr>
+                </a:solidFill>
+                <a:latin typeface="Book Antiqua"/>
+              </a:rPr>
+              <a:t>To </a:t>
+            </a:r>
+            <a:r>
               <a:rPr lang="en-US" sz="3200" b="1">
                 <a:solidFill>
                   <a:schemeClr val="bg1">
@@ -8517,9 +9074,9 @@
                 </a:solidFill>
                 <a:latin typeface="Book Antiqua"/>
               </a:rPr>
-              <a:t>To add more levels</a:t>
-            </a:r>
-            <a:endParaRPr lang="bg-BG" sz="3200" b="1">
+              <a:t>add score</a:t>
+            </a:r>
+            <a:endParaRPr lang="en-US" sz="3200" b="1" dirty="0">
               <a:solidFill>
                 <a:schemeClr val="bg1">
                   <a:lumMod val="95000"/>
@@ -8528,46 +9085,46 @@
               <a:latin typeface="Book Antiqua"/>
             </a:endParaRPr>
           </a:p>
-          <a:p>
-            <a:pPr marL="457200" indent="-457200">
-              <a:lnSpc>
-                <a:spcPct val="150000"/>
-              </a:lnSpc>
-              <a:buAutoNum type="arabicPeriod"/>
-            </a:pPr>
-            <a:r>
-              <a:rPr lang="en-US" sz="3200" b="1">
-                <a:solidFill>
-                  <a:schemeClr val="bg1">
-                    <a:lumMod val="95000"/>
-                  </a:schemeClr>
-                </a:solidFill>
-                <a:latin typeface="Book Antiqua"/>
-              </a:rPr>
-              <a:t>To improve the menu</a:t>
-            </a:r>
-          </a:p>
-          <a:p>
-            <a:pPr marL="457200" indent="-457200">
-              <a:lnSpc>
-                <a:spcPct val="150000"/>
-              </a:lnSpc>
-              <a:buAutoNum type="arabicPeriod"/>
-            </a:pPr>
-            <a:r>
-              <a:rPr lang="en-US" sz="3200" b="1">
-                <a:solidFill>
-                  <a:schemeClr val="bg1">
-                    <a:lumMod val="95000"/>
-                  </a:schemeClr>
-                </a:solidFill>
-                <a:latin typeface="Book Antiqua"/>
-              </a:rPr>
-              <a:t>To improve the design</a:t>
-            </a:r>
-          </a:p>
         </p:txBody>
       </p:sp>
+      <p:pic>
+        <p:nvPicPr>
+          <p:cNvPr id="4" name="8">
+            <a:hlinkClick r:id="" action="ppaction://media"/>
+            <a:extLst>
+              <a:ext uri="{FF2B5EF4-FFF2-40B4-BE49-F238E27FC236}">
+                <a16:creationId xmlns:a16="http://schemas.microsoft.com/office/drawing/2014/main" id="{943A79AB-5EE4-456C-A3CD-95EBACFF7951}"/>
+              </a:ext>
+            </a:extLst>
+          </p:cNvPr>
+          <p:cNvPicPr>
+            <a:picLocks noChangeAspect="1"/>
+          </p:cNvPicPr>
+          <p:nvPr>
+            <a:audioFile r:link="rId2"/>
+            <p:extLst>
+              <p:ext uri="{DAA4B4D4-6D71-4841-9C94-3DE7FCFB9230}">
+                <p14:media xmlns:p14="http://schemas.microsoft.com/office/powerpoint/2010/main" r:embed="rId1"/>
+              </p:ext>
+            </p:extLst>
+          </p:nvPr>
+        </p:nvPicPr>
+        <p:blipFill>
+          <a:blip r:embed="rId5"/>
+          <a:stretch>
+            <a:fillRect/>
+          </a:stretch>
+        </p:blipFill>
+        <p:spPr>
+          <a:xfrm>
+            <a:off x="661851" y="5972908"/>
+            <a:ext cx="609600" cy="609600"/>
+          </a:xfrm>
+          <a:prstGeom prst="rect">
+            <a:avLst/>
+          </a:prstGeom>
+        </p:spPr>
+      </p:pic>
     </p:spTree>
     <p:extLst>
       <p:ext uri="{BB962C8B-B14F-4D97-AF65-F5344CB8AC3E}">
@@ -8578,6 +9135,93 @@
   <p:clrMapOvr>
     <a:masterClrMapping/>
   </p:clrMapOvr>
+  <p:timing>
+    <p:tnLst>
+      <p:par>
+        <p:cTn id="1" dur="indefinite" restart="never" nodeType="tmRoot">
+          <p:childTnLst>
+            <p:seq concurrent="1" nextAc="seek">
+              <p:cTn id="2" dur="indefinite" nodeType="mainSeq">
+                <p:childTnLst>
+                  <p:par>
+                    <p:cTn id="3" fill="hold">
+                      <p:stCondLst>
+                        <p:cond delay="indefinite"/>
+                        <p:cond evt="onBegin" delay="0">
+                          <p:tn val="2"/>
+                        </p:cond>
+                      </p:stCondLst>
+                      <p:childTnLst>
+                        <p:par>
+                          <p:cTn id="4" fill="hold">
+                            <p:stCondLst>
+                              <p:cond delay="0"/>
+                            </p:stCondLst>
+                            <p:childTnLst>
+                              <p:par>
+                                <p:cTn id="5" presetID="1" presetClass="mediacall" presetSubtype="0" fill="hold" nodeType="afterEffect">
+                                  <p:stCondLst>
+                                    <p:cond delay="0"/>
+                                  </p:stCondLst>
+                                  <p:childTnLst>
+                                    <p:cmd type="call" cmd="playFrom(0.0)">
+                                      <p:cBhvr>
+                                        <p:cTn id="6" dur="50112" fill="hold"/>
+                                        <p:tgtEl>
+                                          <p:spTgt spid="4"/>
+                                        </p:tgtEl>
+                                      </p:cBhvr>
+                                    </p:cmd>
+                                  </p:childTnLst>
+                                </p:cTn>
+                              </p:par>
+                            </p:childTnLst>
+                          </p:cTn>
+                        </p:par>
+                      </p:childTnLst>
+                    </p:cTn>
+                  </p:par>
+                </p:childTnLst>
+              </p:cTn>
+              <p:prevCondLst>
+                <p:cond evt="onPrev" delay="0">
+                  <p:tgtEl>
+                    <p:sldTgt/>
+                  </p:tgtEl>
+                </p:cond>
+              </p:prevCondLst>
+              <p:nextCondLst>
+                <p:cond evt="onNext" delay="0">
+                  <p:tgtEl>
+                    <p:sldTgt/>
+                  </p:tgtEl>
+                </p:cond>
+              </p:nextCondLst>
+            </p:seq>
+            <p:audio>
+              <p:cMediaNode vol="80000">
+                <p:cTn id="7" fill="hold" display="0">
+                  <p:stCondLst>
+                    <p:cond delay="indefinite"/>
+                  </p:stCondLst>
+                  <p:endCondLst>
+                    <p:cond evt="onStopAudio" delay="0">
+                      <p:tgtEl>
+                        <p:sldTgt/>
+                      </p:tgtEl>
+                    </p:cond>
+                  </p:endCondLst>
+                </p:cTn>
+                <p:tgtEl>
+                  <p:spTgt spid="4"/>
+                </p:tgtEl>
+              </p:cMediaNode>
+            </p:audio>
+          </p:childTnLst>
+        </p:cTn>
+      </p:par>
+    </p:tnLst>
+  </p:timing>
 </p:sld>
 </file>
 

</xml_diff>

<commit_message>
Add audio to the presentation
</commit_message>
<xml_diff>
--- a/Documents/Presentation.pptx
+++ b/Documents/Presentation.pptx
@@ -7753,7 +7753,7 @@
           <p:nvPr/>
         </p:nvPicPr>
         <p:blipFill rotWithShape="1">
-          <a:blip r:embed="rId2"/>
+          <a:blip r:embed="rId4"/>
           <a:srcRect t="8907"/>
           <a:stretch/>
         </p:blipFill>
@@ -7996,6 +7996,46 @@
           </a:p>
         </p:txBody>
       </p:sp>
+      <p:pic>
+        <p:nvPicPr>
+          <p:cNvPr id="6" name="Slide 5">
+            <a:hlinkClick r:id="" action="ppaction://media"/>
+            <a:extLst>
+              <a:ext uri="{FF2B5EF4-FFF2-40B4-BE49-F238E27FC236}">
+                <a16:creationId xmlns:a16="http://schemas.microsoft.com/office/drawing/2014/main" id="{C79E50C3-73CD-4225-930C-1CF7220AE327}"/>
+              </a:ext>
+            </a:extLst>
+          </p:cNvPr>
+          <p:cNvPicPr>
+            <a:picLocks noChangeAspect="1"/>
+          </p:cNvPicPr>
+          <p:nvPr>
+            <a:audioFile r:link="rId1"/>
+            <p:extLst>
+              <p:ext uri="{DAA4B4D4-6D71-4841-9C94-3DE7FCFB9230}">
+                <p14:media xmlns:p14="http://schemas.microsoft.com/office/powerpoint/2010/main" r:embed="rId2">
+                  <p14:trim end="1856.0544"/>
+                </p14:media>
+              </p:ext>
+            </p:extLst>
+          </p:nvPr>
+        </p:nvPicPr>
+        <p:blipFill>
+          <a:blip r:embed="rId5"/>
+          <a:stretch>
+            <a:fillRect/>
+          </a:stretch>
+        </p:blipFill>
+        <p:spPr>
+          <a:xfrm>
+            <a:off x="11233256" y="6069750"/>
+            <a:ext cx="609600" cy="609600"/>
+          </a:xfrm>
+          <a:prstGeom prst="rect">
+            <a:avLst/>
+          </a:prstGeom>
+        </p:spPr>
+      </p:pic>
     </p:spTree>
     <p:extLst>
       <p:ext uri="{BB962C8B-B14F-4D97-AF65-F5344CB8AC3E}">
@@ -8006,6 +8046,93 @@
   <p:clrMapOvr>
     <a:masterClrMapping/>
   </p:clrMapOvr>
+  <p:timing>
+    <p:tnLst>
+      <p:par>
+        <p:cTn id="1" dur="indefinite" restart="never" nodeType="tmRoot">
+          <p:childTnLst>
+            <p:seq concurrent="1" nextAc="seek">
+              <p:cTn id="2" dur="indefinite" nodeType="mainSeq">
+                <p:childTnLst>
+                  <p:par>
+                    <p:cTn id="3" fill="hold">
+                      <p:stCondLst>
+                        <p:cond delay="indefinite"/>
+                        <p:cond evt="onBegin" delay="0">
+                          <p:tn val="2"/>
+                        </p:cond>
+                      </p:stCondLst>
+                      <p:childTnLst>
+                        <p:par>
+                          <p:cTn id="4" fill="hold">
+                            <p:stCondLst>
+                              <p:cond delay="0"/>
+                            </p:stCondLst>
+                            <p:childTnLst>
+                              <p:par>
+                                <p:cTn id="5" presetID="1" presetClass="mediacall" presetSubtype="0" fill="hold" nodeType="afterEffect">
+                                  <p:stCondLst>
+                                    <p:cond delay="0"/>
+                                  </p:stCondLst>
+                                  <p:childTnLst>
+                                    <p:cmd type="call" cmd="playFrom(0.0)">
+                                      <p:cBhvr>
+                                        <p:cTn id="6" dur="44710" fill="hold"/>
+                                        <p:tgtEl>
+                                          <p:spTgt spid="6"/>
+                                        </p:tgtEl>
+                                      </p:cBhvr>
+                                    </p:cmd>
+                                  </p:childTnLst>
+                                </p:cTn>
+                              </p:par>
+                            </p:childTnLst>
+                          </p:cTn>
+                        </p:par>
+                      </p:childTnLst>
+                    </p:cTn>
+                  </p:par>
+                </p:childTnLst>
+              </p:cTn>
+              <p:prevCondLst>
+                <p:cond evt="onPrev" delay="0">
+                  <p:tgtEl>
+                    <p:sldTgt/>
+                  </p:tgtEl>
+                </p:cond>
+              </p:prevCondLst>
+              <p:nextCondLst>
+                <p:cond evt="onNext" delay="0">
+                  <p:tgtEl>
+                    <p:sldTgt/>
+                  </p:tgtEl>
+                </p:cond>
+              </p:nextCondLst>
+            </p:seq>
+            <p:audio>
+              <p:cMediaNode vol="80000">
+                <p:cTn id="7" fill="hold" display="0">
+                  <p:stCondLst>
+                    <p:cond delay="indefinite"/>
+                  </p:stCondLst>
+                  <p:endCondLst>
+                    <p:cond evt="onStopAudio" delay="0">
+                      <p:tgtEl>
+                        <p:sldTgt/>
+                      </p:tgtEl>
+                    </p:cond>
+                  </p:endCondLst>
+                </p:cTn>
+                <p:tgtEl>
+                  <p:spTgt spid="6"/>
+                </p:tgtEl>
+              </p:cMediaNode>
+            </p:audio>
+          </p:childTnLst>
+        </p:cTn>
+      </p:par>
+    </p:tnLst>
+  </p:timing>
 </p:sld>
 </file>
 
@@ -9619,7 +9746,7 @@
           <p:nvPr/>
         </p:nvPicPr>
         <p:blipFill>
-          <a:blip r:embed="rId2"/>
+          <a:blip r:embed="rId4"/>
           <a:stretch>
             <a:fillRect/>
           </a:stretch>
@@ -9711,6 +9838,44 @@
           </a:ln>
         </p:spPr>
       </p:sp>
+      <p:pic>
+        <p:nvPicPr>
+          <p:cNvPr id="2" name="Slide 9">
+            <a:hlinkClick r:id="" action="ppaction://media"/>
+            <a:extLst>
+              <a:ext uri="{FF2B5EF4-FFF2-40B4-BE49-F238E27FC236}">
+                <a16:creationId xmlns:a16="http://schemas.microsoft.com/office/drawing/2014/main" id="{55F729BA-9F1B-45AA-B2F5-CD5FC8E79040}"/>
+              </a:ext>
+            </a:extLst>
+          </p:cNvPr>
+          <p:cNvPicPr>
+            <a:picLocks noChangeAspect="1"/>
+          </p:cNvPicPr>
+          <p:nvPr>
+            <a:audioFile r:link="rId2"/>
+            <p:extLst>
+              <p:ext uri="{DAA4B4D4-6D71-4841-9C94-3DE7FCFB9230}">
+                <p14:media xmlns:p14="http://schemas.microsoft.com/office/powerpoint/2010/main" r:embed="rId1"/>
+              </p:ext>
+            </p:extLst>
+          </p:nvPr>
+        </p:nvPicPr>
+        <p:blipFill>
+          <a:blip r:embed="rId5"/>
+          <a:stretch>
+            <a:fillRect/>
+          </a:stretch>
+        </p:blipFill>
+        <p:spPr>
+          <a:xfrm>
+            <a:off x="11224180" y="6094140"/>
+            <a:ext cx="609600" cy="609600"/>
+          </a:xfrm>
+          <a:prstGeom prst="rect">
+            <a:avLst/>
+          </a:prstGeom>
+        </p:spPr>
+      </p:pic>
     </p:spTree>
     <p:extLst>
       <p:ext uri="{BB962C8B-B14F-4D97-AF65-F5344CB8AC3E}">
@@ -9721,6 +9886,90 @@
   <p:clrMapOvr>
     <a:overrideClrMapping bg1="dk1" tx1="lt1" bg2="dk2" tx2="lt2" accent1="accent1" accent2="accent2" accent3="accent3" accent4="accent4" accent5="accent5" accent6="accent6" hlink="hlink" folHlink="folHlink"/>
   </p:clrMapOvr>
+  <p:timing>
+    <p:tnLst>
+      <p:par>
+        <p:cTn id="1" dur="indefinite" restart="never" nodeType="tmRoot">
+          <p:childTnLst>
+            <p:seq concurrent="1" nextAc="seek">
+              <p:cTn id="2" dur="indefinite" nodeType="mainSeq">
+                <p:childTnLst>
+                  <p:par>
+                    <p:cTn id="3" fill="hold">
+                      <p:stCondLst>
+                        <p:cond delay="indefinite"/>
+                      </p:stCondLst>
+                      <p:childTnLst>
+                        <p:par>
+                          <p:cTn id="4" fill="hold">
+                            <p:stCondLst>
+                              <p:cond delay="0"/>
+                            </p:stCondLst>
+                            <p:childTnLst>
+                              <p:par>
+                                <p:cTn id="5" presetID="1" presetClass="mediacall" presetSubtype="0" fill="hold" nodeType="clickEffect">
+                                  <p:stCondLst>
+                                    <p:cond delay="0"/>
+                                  </p:stCondLst>
+                                  <p:childTnLst>
+                                    <p:cmd type="call" cmd="playFrom(0.0)">
+                                      <p:cBhvr>
+                                        <p:cTn id="6" dur="4770" fill="hold"/>
+                                        <p:tgtEl>
+                                          <p:spTgt spid="2"/>
+                                        </p:tgtEl>
+                                      </p:cBhvr>
+                                    </p:cmd>
+                                  </p:childTnLst>
+                                </p:cTn>
+                              </p:par>
+                            </p:childTnLst>
+                          </p:cTn>
+                        </p:par>
+                      </p:childTnLst>
+                    </p:cTn>
+                  </p:par>
+                </p:childTnLst>
+              </p:cTn>
+              <p:prevCondLst>
+                <p:cond evt="onPrev" delay="0">
+                  <p:tgtEl>
+                    <p:sldTgt/>
+                  </p:tgtEl>
+                </p:cond>
+              </p:prevCondLst>
+              <p:nextCondLst>
+                <p:cond evt="onNext" delay="0">
+                  <p:tgtEl>
+                    <p:sldTgt/>
+                  </p:tgtEl>
+                </p:cond>
+              </p:nextCondLst>
+            </p:seq>
+            <p:audio>
+              <p:cMediaNode vol="80000">
+                <p:cTn id="7" fill="hold" display="0">
+                  <p:stCondLst>
+                    <p:cond delay="indefinite"/>
+                  </p:stCondLst>
+                  <p:endCondLst>
+                    <p:cond evt="onStopAudio" delay="0">
+                      <p:tgtEl>
+                        <p:sldTgt/>
+                      </p:tgtEl>
+                    </p:cond>
+                  </p:endCondLst>
+                </p:cTn>
+                <p:tgtEl>
+                  <p:spTgt spid="2"/>
+                </p:tgtEl>
+              </p:cMediaNode>
+            </p:audio>
+          </p:childTnLst>
+        </p:cTn>
+      </p:par>
+    </p:tnLst>
+  </p:timing>
 </p:sld>
 </file>
 

</xml_diff>

<commit_message>
Fix error in presentation and readme.md
</commit_message>
<xml_diff>
--- a/Documents/Presentation.pptx
+++ b/Documents/Presentation.pptx
@@ -6922,7 +6922,7 @@
           <p:nvPr>
             <p:extLst>
               <p:ext uri="{D42A27DB-BD31-4B8C-83A1-F6EECF244321}">
-                <p14:modId xmlns:p14="http://schemas.microsoft.com/office/powerpoint/2010/main" val="287225680"/>
+                <p14:modId xmlns:p14="http://schemas.microsoft.com/office/powerpoint/2010/main" val="3130490622"/>
               </p:ext>
             </p:extLst>
           </p:nvPr>
@@ -7009,16 +7009,16 @@
                     <a:lstStyle/>
                     <a:p>
                       <a:r>
-                        <a:rPr lang="bg-BG" sz="2800" err="1"/>
-                        <a:t>Dimityr</a:t>
+                        <a:rPr lang="bg-BG" sz="2800" dirty="0"/>
+                        <a:t>Dimit</a:t>
                       </a:r>
                       <a:r>
-                        <a:rPr lang="bg-BG" sz="2800"/>
-                        <a:t> </a:t>
+                        <a:rPr lang="en-US" sz="2800" dirty="0"/>
+                        <a:t>a</a:t>
                       </a:r>
                       <a:r>
-                        <a:rPr lang="bg-BG" sz="2800" err="1"/>
-                        <a:t>Grudov</a:t>
+                        <a:rPr lang="bg-BG" sz="2800" dirty="0"/>
+                        <a:t>r Grudov</a:t>
                       </a:r>
                     </a:p>
                   </a:txBody>
@@ -7128,12 +7128,8 @@
                     <a:lstStyle/>
                     <a:p>
                       <a:r>
-                        <a:rPr lang="bg-BG" sz="2800"/>
-                        <a:t>QA </a:t>
-                      </a:r>
-                      <a:r>
-                        <a:rPr lang="bg-BG" sz="2800" err="1"/>
-                        <a:t>Engineer</a:t>
+                        <a:rPr lang="bg-BG" sz="2800" dirty="0"/>
+                        <a:t>QA Engineer</a:t>
                       </a:r>
                     </a:p>
                   </a:txBody>

</xml_diff>

<commit_message>
Add slide for Logos and Design
</commit_message>
<xml_diff>
--- a/Documents/Presentation.pptx
+++ b/Documents/Presentation.pptx
@@ -5,10 +5,10 @@
     <p:sldMasterId id="2147483648" r:id="rId1"/>
   </p:sldMasterIdLst>
   <p:notesMasterIdLst>
-    <p:notesMasterId r:id="rId12"/>
+    <p:notesMasterId r:id="rId13"/>
   </p:notesMasterIdLst>
   <p:handoutMasterIdLst>
-    <p:handoutMasterId r:id="rId13"/>
+    <p:handoutMasterId r:id="rId14"/>
   </p:handoutMasterIdLst>
   <p:sldIdLst>
     <p:sldId id="257" r:id="rId2"/>
@@ -16,11 +16,12 @@
     <p:sldId id="260" r:id="rId4"/>
     <p:sldId id="261" r:id="rId5"/>
     <p:sldId id="262" r:id="rId6"/>
-    <p:sldId id="263" r:id="rId7"/>
-    <p:sldId id="264" r:id="rId8"/>
-    <p:sldId id="265" r:id="rId9"/>
-    <p:sldId id="268" r:id="rId10"/>
-    <p:sldId id="269" r:id="rId11"/>
+    <p:sldId id="270" r:id="rId7"/>
+    <p:sldId id="263" r:id="rId8"/>
+    <p:sldId id="264" r:id="rId9"/>
+    <p:sldId id="265" r:id="rId10"/>
+    <p:sldId id="268" r:id="rId11"/>
+    <p:sldId id="269" r:id="rId12"/>
   </p:sldIdLst>
   <p:sldSz cx="12192000" cy="6858000"/>
   <p:notesSz cx="6858000" cy="9144000"/>
@@ -121,10 +122,10 @@
   </p:defaultTextStyle>
   <p:extLst>
     <p:ext uri="{EFAFB233-063F-42B5-8137-9DF3F51BA10A}">
-      <p15:sldGuideLst xmlns:p15="http://schemas.microsoft.com/office/powerpoint/2012/main"/>
+      <p15:sldGuideLst xmlns:p15="http://schemas.microsoft.com/office/powerpoint/2012/main" xmlns=""/>
     </p:ext>
     <p:ext uri="{2D200454-40CA-4A62-9FC3-DE9A4176ACB9}">
-      <p15:notesGuideLst xmlns:p15="http://schemas.microsoft.com/office/powerpoint/2012/main"/>
+      <p15:notesGuideLst xmlns:p15="http://schemas.microsoft.com/office/powerpoint/2012/main" xmlns=""/>
     </p:ext>
   </p:extLst>
 </p:presentation>
@@ -165,7 +166,7 @@
           <p:cNvPr id="2" name="Контейнер за горния колонтитул 1">
             <a:extLst>
               <a:ext uri="{FF2B5EF4-FFF2-40B4-BE49-F238E27FC236}">
-                <a16:creationId xmlns:a16="http://schemas.microsoft.com/office/drawing/2014/main" id="{52780DC7-29C5-4D1C-A591-A8445B983E7E}"/>
+                <a16:creationId xmlns:a16="http://schemas.microsoft.com/office/drawing/2014/main" xmlns="" id="{52780DC7-29C5-4D1C-A591-A8445B983E7E}"/>
               </a:ext>
             </a:extLst>
           </p:cNvPr>
@@ -202,7 +203,7 @@
           <p:cNvPr id="3" name="Контейнер за дата 2">
             <a:extLst>
               <a:ext uri="{FF2B5EF4-FFF2-40B4-BE49-F238E27FC236}">
-                <a16:creationId xmlns:a16="http://schemas.microsoft.com/office/drawing/2014/main" id="{F903BD5B-3BDE-4480-9097-863B586A805A}"/>
+                <a16:creationId xmlns:a16="http://schemas.microsoft.com/office/drawing/2014/main" xmlns="" id="{F903BD5B-3BDE-4480-9097-863B586A805A}"/>
               </a:ext>
             </a:extLst>
           </p:cNvPr>
@@ -232,7 +233,7 @@
           <a:p>
             <a:fld id="{CC50DFF9-D8E9-4F2A-B9F1-4985679C096A}" type="datetime1">
               <a:rPr lang="bg-BG" smtClean="0"/>
-              <a:t>7.11.2021 г.</a:t>
+              <a:t>9.11.2021 г.</a:t>
             </a:fld>
             <a:endParaRPr lang="bg-BG" dirty="0"/>
           </a:p>
@@ -243,7 +244,7 @@
           <p:cNvPr id="4" name="Контейнер за долния колонтитул 3">
             <a:extLst>
               <a:ext uri="{FF2B5EF4-FFF2-40B4-BE49-F238E27FC236}">
-                <a16:creationId xmlns:a16="http://schemas.microsoft.com/office/drawing/2014/main" id="{DC3C9D59-3132-44B3-AEDE-2AAD1708732B}"/>
+                <a16:creationId xmlns:a16="http://schemas.microsoft.com/office/drawing/2014/main" xmlns="" id="{DC3C9D59-3132-44B3-AEDE-2AAD1708732B}"/>
               </a:ext>
             </a:extLst>
           </p:cNvPr>
@@ -280,7 +281,7 @@
           <p:cNvPr id="5" name="Контейнер за номер на слайда 4">
             <a:extLst>
               <a:ext uri="{FF2B5EF4-FFF2-40B4-BE49-F238E27FC236}">
-                <a16:creationId xmlns:a16="http://schemas.microsoft.com/office/drawing/2014/main" id="{9D924885-1CDA-4412-BB8B-3AE64466F8A0}"/>
+                <a16:creationId xmlns:a16="http://schemas.microsoft.com/office/drawing/2014/main" xmlns="" id="{9D924885-1CDA-4412-BB8B-3AE64466F8A0}"/>
               </a:ext>
             </a:extLst>
           </p:cNvPr>
@@ -410,7 +411,7 @@
             <a:fld id="{653044A5-1691-448D-81DE-0AE834861BA4}" type="datetime1">
               <a:rPr lang="bg-BG" noProof="0" smtClean="0"/>
               <a:pPr/>
-              <a:t>7.11.2021 г.</a:t>
+              <a:t>9.11.2021 г.</a:t>
             </a:fld>
             <a:endParaRPr lang="bg-BG" noProof="0"/>
           </a:p>
@@ -847,7 +848,7 @@
             <a:pPr rtl="0"/>
             <a:fld id="{908621D7-224A-430A-A592-6CDC2C917898}" type="datetime1">
               <a:rPr lang="bg-BG" noProof="0" smtClean="0"/>
-              <a:t>7.11.2021 г.</a:t>
+              <a:t>9.11.2021 г.</a:t>
             </a:fld>
             <a:endParaRPr lang="bg-BG" noProof="0"/>
           </a:p>
@@ -1175,7 +1176,7 @@
             <a:pPr rtl="0"/>
             <a:fld id="{99A1D22B-1412-400A-8B38-8DF60B6776BC}" type="datetime1">
               <a:rPr lang="bg-BG" noProof="0" smtClean="0"/>
-              <a:t>7.11.2021 г.</a:t>
+              <a:t>9.11.2021 г.</a:t>
             </a:fld>
             <a:endParaRPr lang="bg-BG" noProof="0"/>
           </a:p>
@@ -1352,7 +1353,7 @@
             <a:pPr rtl="0"/>
             <a:fld id="{F08EB276-0219-4B11-9128-E22922A57FEC}" type="datetime1">
               <a:rPr lang="bg-BG" noProof="0" smtClean="0"/>
-              <a:t>7.11.2021 г.</a:t>
+              <a:t>9.11.2021 г.</a:t>
             </a:fld>
             <a:endParaRPr lang="bg-BG" noProof="0"/>
           </a:p>
@@ -1519,7 +1520,7 @@
             <a:pPr rtl="0"/>
             <a:fld id="{A577D47C-07E0-4B68-97A3-ACE6AD8CF9FD}" type="datetime1">
               <a:rPr lang="bg-BG" noProof="0" smtClean="0"/>
-              <a:t>7.11.2021 г.</a:t>
+              <a:t>9.11.2021 г.</a:t>
             </a:fld>
             <a:endParaRPr lang="bg-BG" noProof="0"/>
           </a:p>
@@ -1794,7 +1795,7 @@
             <a:pPr rtl="0"/>
             <a:fld id="{8FCE1BFD-05BA-4C45-8C5F-46598A24A3BA}" type="datetime1">
               <a:rPr lang="bg-BG" noProof="0" smtClean="0"/>
-              <a:t>7.11.2021 г.</a:t>
+              <a:t>9.11.2021 г.</a:t>
             </a:fld>
             <a:endParaRPr lang="bg-BG" noProof="0"/>
           </a:p>
@@ -2185,7 +2186,7 @@
             <a:pPr rtl="0"/>
             <a:fld id="{1034B73D-2961-452F-8257-8BA5E2AA148D}" type="datetime1">
               <a:rPr lang="bg-BG" noProof="0" smtClean="0"/>
-              <a:t>7.11.2021 г.</a:t>
+              <a:t>9.11.2021 г.</a:t>
             </a:fld>
             <a:endParaRPr lang="bg-BG" noProof="0"/>
           </a:p>
@@ -2658,7 +2659,7 @@
             <a:pPr rtl="0"/>
             <a:fld id="{EB842E98-E535-4AFF-9DD8-95300C5C051A}" type="datetime1">
               <a:rPr lang="bg-BG" noProof="0" smtClean="0"/>
-              <a:t>7.11.2021 г.</a:t>
+              <a:t>9.11.2021 г.</a:t>
             </a:fld>
             <a:endParaRPr lang="bg-BG" noProof="0"/>
           </a:p>
@@ -2774,7 +2775,7 @@
             <a:pPr rtl="0"/>
             <a:fld id="{F29935B3-9127-4E40-B655-C03C7583526C}" type="datetime1">
               <a:rPr lang="bg-BG" noProof="0" smtClean="0"/>
-              <a:t>7.11.2021 г.</a:t>
+              <a:t>9.11.2021 г.</a:t>
             </a:fld>
             <a:endParaRPr lang="bg-BG" noProof="0"/>
           </a:p>
@@ -2867,7 +2868,7 @@
             <a:pPr rtl="0"/>
             <a:fld id="{FE91D5B8-9CE4-4CDB-BD26-BB598DED82FA}" type="datetime1">
               <a:rPr lang="bg-BG" noProof="0" smtClean="0"/>
-              <a:t>7.11.2021 г.</a:t>
+              <a:t>9.11.2021 г.</a:t>
             </a:fld>
             <a:endParaRPr lang="bg-BG" noProof="0"/>
           </a:p>
@@ -3210,7 +3211,7 @@
             <a:pPr rtl="0"/>
             <a:fld id="{FD70C4BC-7D9E-4C1F-87A6-EC44819FC5AC}" type="datetime1">
               <a:rPr lang="bg-BG" noProof="0" smtClean="0"/>
-              <a:t>7.11.2021 г.</a:t>
+              <a:t>9.11.2021 г.</a:t>
             </a:fld>
             <a:endParaRPr lang="bg-BG" noProof="0"/>
           </a:p>
@@ -3597,7 +3598,7 @@
             <a:pPr rtl="0"/>
             <a:fld id="{E7690FB9-E0EE-44F6-BC23-C9E850A81F8C}" type="datetime1">
               <a:rPr lang="bg-BG" noProof="0" smtClean="0"/>
-              <a:t>7.11.2021 г.</a:t>
+              <a:t>9.11.2021 г.</a:t>
             </a:fld>
             <a:endParaRPr lang="bg-BG" noProof="0"/>
           </a:p>
@@ -3873,7 +3874,7 @@
             <a:pPr rtl="0"/>
             <a:fld id="{7948993E-CF2E-47AC-B99D-48F9175533B5}" type="datetime1">
               <a:rPr lang="bg-BG" noProof="0" smtClean="0"/>
-              <a:t>7.11.2021 г.</a:t>
+              <a:t>9.11.2021 г.</a:t>
             </a:fld>
             <a:endParaRPr lang="bg-BG" noProof="0"/>
           </a:p>
@@ -4320,7 +4321,7 @@
   </p:txStyles>
   <p:extLst>
     <p:ext uri="{27BBF7A9-308A-43DC-89C8-2F10F3537804}">
-      <p15:sldGuideLst xmlns:p15="http://schemas.microsoft.com/office/powerpoint/2012/main">
+      <p15:sldGuideLst xmlns:p15="http://schemas.microsoft.com/office/powerpoint/2012/main" xmlns="">
         <p15:guide id="3" orient="horz" pos="1368">
           <p15:clr>
             <a:srgbClr val="F26B43"/>
@@ -4397,7 +4398,7 @@
           <p:cNvPr id="2" name="Картина 2" descr="Картина, която съдържа стрелка&#10;&#10;Описанието е генерирано автоматично">
             <a:extLst>
               <a:ext uri="{FF2B5EF4-FFF2-40B4-BE49-F238E27FC236}">
-                <a16:creationId xmlns:a16="http://schemas.microsoft.com/office/drawing/2014/main" id="{C09CAEF5-4716-493E-BB3A-168AF34B34FA}"/>
+                <a16:creationId xmlns:a16="http://schemas.microsoft.com/office/drawing/2014/main" xmlns="" id="{C09CAEF5-4716-493E-BB3A-168AF34B34FA}"/>
               </a:ext>
             </a:extLst>
           </p:cNvPr>
@@ -4426,7 +4427,7 @@
           <p:cNvPr id="4" name="Текстово поле 3">
             <a:extLst>
               <a:ext uri="{FF2B5EF4-FFF2-40B4-BE49-F238E27FC236}">
-                <a16:creationId xmlns:a16="http://schemas.microsoft.com/office/drawing/2014/main" id="{F8904C2E-E7C5-4AD8-B89E-6DAAE8319014}"/>
+                <a16:creationId xmlns:a16="http://schemas.microsoft.com/office/drawing/2014/main" xmlns="" id="{F8904C2E-E7C5-4AD8-B89E-6DAAE8319014}"/>
               </a:ext>
             </a:extLst>
           </p:cNvPr>
@@ -4473,7 +4474,7 @@
             <a:hlinkClick r:id="" action="ppaction://media"/>
             <a:extLst>
               <a:ext uri="{FF2B5EF4-FFF2-40B4-BE49-F238E27FC236}">
-                <a16:creationId xmlns:a16="http://schemas.microsoft.com/office/drawing/2014/main" id="{4821B2A9-105E-4A39-81CD-059670C32F62}"/>
+                <a16:creationId xmlns:a16="http://schemas.microsoft.com/office/drawing/2014/main" xmlns="" id="{4821B2A9-105E-4A39-81CD-059670C32F62}"/>
               </a:ext>
             </a:extLst>
           </p:cNvPr>
@@ -4632,13 +4633,13 @@
       </p:grpSpPr>
       <p:grpSp>
         <p:nvGrpSpPr>
-          <p:cNvPr id="40" name="Group 42">
+          <p:cNvPr id="23" name="Group 22">
             <a:extLst>
               <a:ext uri="{FF2B5EF4-FFF2-40B4-BE49-F238E27FC236}">
-                <a16:creationId xmlns:a16="http://schemas.microsoft.com/office/drawing/2014/main" id="{9D9D6BF1-DFF2-4526-9D13-BF339D8C4163}"/>
+                <a16:creationId xmlns:a16="http://schemas.microsoft.com/office/drawing/2014/main" xmlns="" id="{449BC34D-9C23-4D6D-8213-1F471AF85B3F}"/>
               </a:ext>
               <a:ext uri="{C183D7F6-B498-43B3-948B-1728B52AA6E4}">
-                <adec:decorative xmlns:adec="http://schemas.microsoft.com/office/drawing/2017/decorative" val="1"/>
+                <adec:decorative xmlns:adec="http://schemas.microsoft.com/office/drawing/2017/decorative" xmlns="" val="1"/>
               </a:ext>
             </a:extLst>
           </p:cNvPr>
@@ -4648,7 +4649,7 @@
           <p:nvPr>
             <p:extLst>
               <p:ext uri="{386F3935-93C4-4BCD-93E2-E3B085C9AB24}">
-                <p16:designElem xmlns:p16="http://schemas.microsoft.com/office/powerpoint/2015/main" val="1"/>
+                <p16:designElem xmlns:p16="http://schemas.microsoft.com/office/powerpoint/2015/main" xmlns="" val="1"/>
               </p:ext>
             </p:extLst>
           </p:nvPr>
@@ -4663,13 +4664,13 @@
         </p:grpSpPr>
         <p:sp>
           <p:nvSpPr>
-            <p:cNvPr id="44" name="Freeform 6">
+            <p:cNvPr id="24" name="Freeform 6">
               <a:extLst>
                 <a:ext uri="{FF2B5EF4-FFF2-40B4-BE49-F238E27FC236}">
-                  <a16:creationId xmlns:a16="http://schemas.microsoft.com/office/drawing/2014/main" id="{A54D4DB6-FB18-4CAE-8905-E0053C92569E}"/>
+                  <a16:creationId xmlns:a16="http://schemas.microsoft.com/office/drawing/2014/main" xmlns="" id="{FA0F5D6C-5025-4D7E-82DD-C2C6FDA1E759}"/>
                 </a:ext>
                 <a:ext uri="{C183D7F6-B498-43B3-948B-1728B52AA6E4}">
-                  <adec:decorative xmlns:adec="http://schemas.microsoft.com/office/drawing/2017/decorative" val="1"/>
+                  <adec:decorative xmlns:adec="http://schemas.microsoft.com/office/drawing/2017/decorative" xmlns="" val="1"/>
                 </a:ext>
               </a:extLst>
             </p:cNvPr>
@@ -4677,7 +4678,628 @@
             <p:nvPr>
               <p:extLst>
                 <p:ext uri="{386F3935-93C4-4BCD-93E2-E3B085C9AB24}">
-                  <p16:designElem xmlns:p16="http://schemas.microsoft.com/office/powerpoint/2015/main" val="1"/>
+                  <p16:designElem xmlns:p16="http://schemas.microsoft.com/office/powerpoint/2015/main" xmlns="" val="1"/>
+                </p:ext>
+              </p:extLst>
+            </p:nvPr>
+          </p:nvSpPr>
+          <p:spPr bwMode="auto">
+            <a:xfrm>
+              <a:off x="8151962" y="1685652"/>
+              <a:ext cx="3275013" cy="4408488"/>
+            </a:xfrm>
+            <a:custGeom>
+              <a:avLst/>
+              <a:gdLst/>
+              <a:ahLst/>
+              <a:cxnLst/>
+              <a:rect l="l" t="t" r="r" b="b"/>
+              <a:pathLst>
+                <a:path w="10000" h="10000">
+                  <a:moveTo>
+                    <a:pt x="8761" y="0"/>
+                  </a:moveTo>
+                  <a:lnTo>
+                    <a:pt x="10000" y="0"/>
+                  </a:lnTo>
+                  <a:lnTo>
+                    <a:pt x="10000" y="10000"/>
+                  </a:lnTo>
+                  <a:lnTo>
+                    <a:pt x="0" y="10000"/>
+                  </a:lnTo>
+                  <a:lnTo>
+                    <a:pt x="0" y="9126"/>
+                  </a:lnTo>
+                  <a:lnTo>
+                    <a:pt x="8761" y="9127"/>
+                  </a:lnTo>
+                  <a:lnTo>
+                    <a:pt x="8761" y="0"/>
+                  </a:lnTo>
+                  <a:close/>
+                </a:path>
+              </a:pathLst>
+            </a:custGeom>
+            <a:solidFill>
+              <a:schemeClr val="tx2"/>
+            </a:solidFill>
+            <a:ln w="0">
+              <a:noFill/>
+              <a:prstDash val="solid"/>
+              <a:round/>
+              <a:headEnd/>
+              <a:tailEnd/>
+            </a:ln>
+          </p:spPr>
+        </p:sp>
+        <p:sp>
+          <p:nvSpPr>
+            <p:cNvPr id="25" name="Freeform 6">
+              <a:extLst>
+                <a:ext uri="{FF2B5EF4-FFF2-40B4-BE49-F238E27FC236}">
+                  <a16:creationId xmlns:a16="http://schemas.microsoft.com/office/drawing/2014/main" xmlns="" id="{E2AF2C17-4AB4-4402-B84B-129EF95D161C}"/>
+                </a:ext>
+                <a:ext uri="{C183D7F6-B498-43B3-948B-1728B52AA6E4}">
+                  <adec:decorative xmlns:adec="http://schemas.microsoft.com/office/drawing/2017/decorative" xmlns="" val="1"/>
+                </a:ext>
+              </a:extLst>
+            </p:cNvPr>
+            <p:cNvSpPr/>
+            <p:nvPr>
+              <p:extLst>
+                <p:ext uri="{386F3935-93C4-4BCD-93E2-E3B085C9AB24}">
+                  <p16:designElem xmlns:p16="http://schemas.microsoft.com/office/powerpoint/2015/main" xmlns="" val="1"/>
+                </p:ext>
+              </p:extLst>
+            </p:nvPr>
+          </p:nvSpPr>
+          <p:spPr bwMode="auto">
+            <a:xfrm flipH="1" flipV="1">
+              <a:off x="752858" y="744469"/>
+              <a:ext cx="3275668" cy="4408488"/>
+            </a:xfrm>
+            <a:custGeom>
+              <a:avLst/>
+              <a:gdLst/>
+              <a:ahLst/>
+              <a:cxnLst/>
+              <a:rect l="l" t="t" r="r" b="b"/>
+              <a:pathLst>
+                <a:path w="10002" h="10000">
+                  <a:moveTo>
+                    <a:pt x="8763" y="0"/>
+                  </a:moveTo>
+                  <a:lnTo>
+                    <a:pt x="10002" y="0"/>
+                  </a:lnTo>
+                  <a:lnTo>
+                    <a:pt x="10002" y="10000"/>
+                  </a:lnTo>
+                  <a:lnTo>
+                    <a:pt x="2" y="10000"/>
+                  </a:lnTo>
+                  <a:cubicBezTo>
+                    <a:pt x="-2" y="9698"/>
+                    <a:pt x="4" y="9427"/>
+                    <a:pt x="0" y="9125"/>
+                  </a:cubicBezTo>
+                  <a:lnTo>
+                    <a:pt x="8763" y="9128"/>
+                  </a:lnTo>
+                  <a:lnTo>
+                    <a:pt x="8763" y="0"/>
+                  </a:lnTo>
+                  <a:close/>
+                </a:path>
+              </a:pathLst>
+            </a:custGeom>
+            <a:solidFill>
+              <a:schemeClr val="tx2"/>
+            </a:solidFill>
+            <a:ln w="0">
+              <a:noFill/>
+              <a:prstDash val="solid"/>
+              <a:round/>
+              <a:headEnd/>
+              <a:tailEnd/>
+            </a:ln>
+          </p:spPr>
+        </p:sp>
+      </p:grpSp>
+      <p:sp useBgFill="1">
+        <p:nvSpPr>
+          <p:cNvPr id="27" name="Rectangle 26">
+            <a:extLst>
+              <a:ext uri="{FF2B5EF4-FFF2-40B4-BE49-F238E27FC236}">
+                <a16:creationId xmlns:a16="http://schemas.microsoft.com/office/drawing/2014/main" xmlns="" id="{5D213B41-AC9B-4E61-BEED-FF4C168A8942}"/>
+              </a:ext>
+              <a:ext uri="{C183D7F6-B498-43B3-948B-1728B52AA6E4}">
+                <adec:decorative xmlns:adec="http://schemas.microsoft.com/office/drawing/2017/decorative" xmlns="" val="1"/>
+              </a:ext>
+            </a:extLst>
+          </p:cNvPr>
+          <p:cNvSpPr>
+            <a:spLocks noGrp="1" noRot="1" noChangeAspect="1" noMove="1" noResize="1" noEditPoints="1" noAdjustHandles="1" noChangeArrowheads="1" noChangeShapeType="1" noTextEdit="1"/>
+          </p:cNvSpPr>
+          <p:nvPr>
+            <p:extLst>
+              <p:ext uri="{386F3935-93C4-4BCD-93E2-E3B085C9AB24}">
+                <p16:designElem xmlns:p16="http://schemas.microsoft.com/office/powerpoint/2015/main" xmlns="" val="1"/>
+              </p:ext>
+            </p:extLst>
+          </p:nvPr>
+        </p:nvSpPr>
+        <p:spPr>
+          <a:xfrm>
+            <a:off x="0" y="0"/>
+            <a:ext cx="12192000" cy="6858000"/>
+          </a:xfrm>
+          <a:prstGeom prst="rect">
+            <a:avLst/>
+          </a:prstGeom>
+          <a:ln>
+            <a:noFill/>
+          </a:ln>
+        </p:spPr>
+        <p:style>
+          <a:lnRef idx="2">
+            <a:schemeClr val="accent1">
+              <a:shade val="50000"/>
+            </a:schemeClr>
+          </a:lnRef>
+          <a:fillRef idx="1001">
+            <a:schemeClr val="lt2"/>
+          </a:fillRef>
+          <a:effectRef idx="0">
+            <a:schemeClr val="accent1"/>
+          </a:effectRef>
+          <a:fontRef idx="minor">
+            <a:schemeClr val="lt1"/>
+          </a:fontRef>
+        </p:style>
+        <p:txBody>
+          <a:bodyPr rtlCol="0" anchor="ctr"/>
+          <a:lstStyle/>
+          <a:p>
+            <a:pPr algn="ctr"/>
+            <a:endParaRPr lang="en-US"/>
+          </a:p>
+        </p:txBody>
+      </p:sp>
+      <p:sp>
+        <p:nvSpPr>
+          <p:cNvPr id="5" name="Заглавие 4">
+            <a:extLst>
+              <a:ext uri="{FF2B5EF4-FFF2-40B4-BE49-F238E27FC236}">
+                <a16:creationId xmlns:a16="http://schemas.microsoft.com/office/drawing/2014/main" xmlns="" id="{080184DB-24D0-47D9-A252-509571819796}"/>
+              </a:ext>
+            </a:extLst>
+          </p:cNvPr>
+          <p:cNvSpPr>
+            <a:spLocks noGrp="1"/>
+          </p:cNvSpPr>
+          <p:nvPr>
+            <p:ph type="title"/>
+          </p:nvPr>
+        </p:nvSpPr>
+        <p:spPr>
+          <a:xfrm>
+            <a:off x="659230" y="1013722"/>
+            <a:ext cx="10869750" cy="1237298"/>
+          </a:xfrm>
+        </p:spPr>
+        <p:txBody>
+          <a:bodyPr vert="horz" lIns="91440" tIns="45720" rIns="91440" bIns="45720" rtlCol="0" anchor="t">
+            <a:normAutofit/>
+          </a:bodyPr>
+          <a:lstStyle/>
+          <a:p>
+            <a:pPr algn="ctr"/>
+            <a:r>
+              <a:rPr lang="en-US" sz="6600" cap="all"/>
+              <a:t>Demonstration</a:t>
+            </a:r>
+          </a:p>
+        </p:txBody>
+      </p:sp>
+      <p:sp>
+        <p:nvSpPr>
+          <p:cNvPr id="29" name="Freeform 6">
+            <a:extLst>
+              <a:ext uri="{FF2B5EF4-FFF2-40B4-BE49-F238E27FC236}">
+                <a16:creationId xmlns:a16="http://schemas.microsoft.com/office/drawing/2014/main" xmlns="" id="{628FBD9F-3B86-4C98-8F77-383320737739}"/>
+              </a:ext>
+              <a:ext uri="{C183D7F6-B498-43B3-948B-1728B52AA6E4}">
+                <adec:decorative xmlns:adec="http://schemas.microsoft.com/office/drawing/2017/decorative" xmlns="" val="1"/>
+              </a:ext>
+            </a:extLst>
+          </p:cNvPr>
+          <p:cNvSpPr>
+            <a:spLocks noGrp="1" noRot="1" noChangeAspect="1" noMove="1" noResize="1" noEditPoints="1" noAdjustHandles="1" noChangeArrowheads="1" noChangeShapeType="1" noTextEdit="1"/>
+          </p:cNvSpPr>
+          <p:nvPr>
+            <p:extLst>
+              <p:ext uri="{386F3935-93C4-4BCD-93E2-E3B085C9AB24}">
+                <p16:designElem xmlns:p16="http://schemas.microsoft.com/office/powerpoint/2015/main" xmlns="" val="1"/>
+              </p:ext>
+            </p:extLst>
+          </p:nvPr>
+        </p:nvSpPr>
+        <p:spPr bwMode="auto">
+          <a:xfrm rot="5400000" flipV="1">
+            <a:off x="8154184" y="2884231"/>
+            <a:ext cx="3005889" cy="4046220"/>
+          </a:xfrm>
+          <a:custGeom>
+            <a:avLst/>
+            <a:gdLst/>
+            <a:ahLst/>
+            <a:cxnLst/>
+            <a:rect l="l" t="t" r="r" b="b"/>
+            <a:pathLst>
+              <a:path w="10000" h="10000">
+                <a:moveTo>
+                  <a:pt x="8761" y="0"/>
+                </a:moveTo>
+                <a:lnTo>
+                  <a:pt x="10000" y="0"/>
+                </a:lnTo>
+                <a:lnTo>
+                  <a:pt x="10000" y="10000"/>
+                </a:lnTo>
+                <a:lnTo>
+                  <a:pt x="0" y="10000"/>
+                </a:lnTo>
+                <a:lnTo>
+                  <a:pt x="0" y="9126"/>
+                </a:lnTo>
+                <a:lnTo>
+                  <a:pt x="8761" y="9127"/>
+                </a:lnTo>
+                <a:lnTo>
+                  <a:pt x="8761" y="0"/>
+                </a:lnTo>
+                <a:close/>
+              </a:path>
+            </a:pathLst>
+          </a:custGeom>
+          <a:solidFill>
+            <a:schemeClr val="tx2">
+              <a:alpha val="90000"/>
+            </a:schemeClr>
+          </a:solidFill>
+          <a:ln w="0">
+            <a:noFill/>
+            <a:prstDash val="solid"/>
+            <a:round/>
+            <a:headEnd/>
+            <a:tailEnd/>
+          </a:ln>
+        </p:spPr>
+        <p:txBody>
+          <a:bodyPr/>
+          <a:lstStyle/>
+          <a:p>
+            <a:endParaRPr lang="en-US" dirty="0"/>
+          </a:p>
+        </p:txBody>
+      </p:sp>
+      <p:pic>
+        <p:nvPicPr>
+          <p:cNvPr id="3" name="Картина 3">
+            <a:extLst>
+              <a:ext uri="{FF2B5EF4-FFF2-40B4-BE49-F238E27FC236}">
+                <a16:creationId xmlns:a16="http://schemas.microsoft.com/office/drawing/2014/main" xmlns="" id="{992BC8AB-2AAD-4D37-81C9-761CC7B9E6F1}"/>
+              </a:ext>
+            </a:extLst>
+          </p:cNvPr>
+          <p:cNvPicPr>
+            <a:picLocks noChangeAspect="1"/>
+          </p:cNvPicPr>
+          <p:nvPr/>
+        </p:nvPicPr>
+        <p:blipFill>
+          <a:blip r:embed="rId4"/>
+          <a:stretch>
+            <a:fillRect/>
+          </a:stretch>
+        </p:blipFill>
+        <p:spPr>
+          <a:xfrm>
+            <a:off x="1485384" y="3056705"/>
+            <a:ext cx="9488571" cy="2812781"/>
+          </a:xfrm>
+          <a:prstGeom prst="rect">
+            <a:avLst/>
+          </a:prstGeom>
+        </p:spPr>
+      </p:pic>
+      <p:sp>
+        <p:nvSpPr>
+          <p:cNvPr id="31" name="Freeform 6">
+            <a:extLst>
+              <a:ext uri="{FF2B5EF4-FFF2-40B4-BE49-F238E27FC236}">
+                <a16:creationId xmlns:a16="http://schemas.microsoft.com/office/drawing/2014/main" xmlns="" id="{6283F864-E3D1-457B-865A-DDC32254D987}"/>
+              </a:ext>
+              <a:ext uri="{C183D7F6-B498-43B3-948B-1728B52AA6E4}">
+                <adec:decorative xmlns:adec="http://schemas.microsoft.com/office/drawing/2017/decorative" xmlns="" val="1"/>
+              </a:ext>
+            </a:extLst>
+          </p:cNvPr>
+          <p:cNvSpPr>
+            <a:spLocks noGrp="1" noRot="1" noChangeAspect="1" noMove="1" noResize="1" noEditPoints="1" noAdjustHandles="1" noChangeArrowheads="1" noChangeShapeType="1" noTextEdit="1"/>
+          </p:cNvSpPr>
+          <p:nvPr>
+            <p:extLst>
+              <p:ext uri="{386F3935-93C4-4BCD-93E2-E3B085C9AB24}">
+                <p16:designElem xmlns:p16="http://schemas.microsoft.com/office/powerpoint/2015/main" xmlns="" val="1"/>
+              </p:ext>
+            </p:extLst>
+          </p:nvPr>
+        </p:nvSpPr>
+        <p:spPr bwMode="auto">
+          <a:xfrm rot="5400000" flipH="1">
+            <a:off x="1080808" y="1936677"/>
+            <a:ext cx="3006491" cy="4046220"/>
+          </a:xfrm>
+          <a:custGeom>
+            <a:avLst/>
+            <a:gdLst/>
+            <a:ahLst/>
+            <a:cxnLst/>
+            <a:rect l="l" t="t" r="r" b="b"/>
+            <a:pathLst>
+              <a:path w="10002" h="10000">
+                <a:moveTo>
+                  <a:pt x="8763" y="0"/>
+                </a:moveTo>
+                <a:lnTo>
+                  <a:pt x="10002" y="0"/>
+                </a:lnTo>
+                <a:lnTo>
+                  <a:pt x="10002" y="10000"/>
+                </a:lnTo>
+                <a:lnTo>
+                  <a:pt x="2" y="10000"/>
+                </a:lnTo>
+                <a:cubicBezTo>
+                  <a:pt x="-2" y="9698"/>
+                  <a:pt x="4" y="9427"/>
+                  <a:pt x="0" y="9125"/>
+                </a:cubicBezTo>
+                <a:lnTo>
+                  <a:pt x="8763" y="9128"/>
+                </a:lnTo>
+                <a:lnTo>
+                  <a:pt x="8763" y="0"/>
+                </a:lnTo>
+                <a:close/>
+              </a:path>
+            </a:pathLst>
+          </a:custGeom>
+          <a:solidFill>
+            <a:schemeClr val="tx2">
+              <a:alpha val="90000"/>
+            </a:schemeClr>
+          </a:solidFill>
+          <a:ln w="0">
+            <a:noFill/>
+            <a:prstDash val="solid"/>
+            <a:round/>
+            <a:headEnd/>
+            <a:tailEnd/>
+          </a:ln>
+        </p:spPr>
+      </p:sp>
+      <p:pic>
+        <p:nvPicPr>
+          <p:cNvPr id="2" name="Slide 9">
+            <a:hlinkClick r:id="" action="ppaction://media"/>
+            <a:extLst>
+              <a:ext uri="{FF2B5EF4-FFF2-40B4-BE49-F238E27FC236}">
+                <a16:creationId xmlns:a16="http://schemas.microsoft.com/office/drawing/2014/main" xmlns="" id="{55F729BA-9F1B-45AA-B2F5-CD5FC8E79040}"/>
+              </a:ext>
+            </a:extLst>
+          </p:cNvPr>
+          <p:cNvPicPr>
+            <a:picLocks noChangeAspect="1"/>
+          </p:cNvPicPr>
+          <p:nvPr>
+            <a:audioFile r:link="rId2"/>
+            <p:extLst>
+              <p:ext uri="{DAA4B4D4-6D71-4841-9C94-3DE7FCFB9230}">
+                <p14:media xmlns:p14="http://schemas.microsoft.com/office/powerpoint/2010/main" r:embed="rId1"/>
+              </p:ext>
+            </p:extLst>
+          </p:nvPr>
+        </p:nvPicPr>
+        <p:blipFill>
+          <a:blip r:embed="rId5"/>
+          <a:stretch>
+            <a:fillRect/>
+          </a:stretch>
+        </p:blipFill>
+        <p:spPr>
+          <a:xfrm>
+            <a:off x="11224180" y="6094140"/>
+            <a:ext cx="609600" cy="609600"/>
+          </a:xfrm>
+          <a:prstGeom prst="rect">
+            <a:avLst/>
+          </a:prstGeom>
+        </p:spPr>
+      </p:pic>
+    </p:spTree>
+    <p:extLst>
+      <p:ext uri="{BB962C8B-B14F-4D97-AF65-F5344CB8AC3E}">
+        <p14:creationId xmlns:p14="http://schemas.microsoft.com/office/powerpoint/2010/main" val="796806462"/>
+      </p:ext>
+    </p:extLst>
+  </p:cSld>
+  <p:clrMapOvr>
+    <a:overrideClrMapping bg1="dk1" tx1="lt1" bg2="dk2" tx2="lt2" accent1="accent1" accent2="accent2" accent3="accent3" accent4="accent4" accent5="accent5" accent6="accent6" hlink="hlink" folHlink="folHlink"/>
+  </p:clrMapOvr>
+  <p:timing>
+    <p:tnLst>
+      <p:par>
+        <p:cTn id="1" dur="indefinite" restart="never" nodeType="tmRoot">
+          <p:childTnLst>
+            <p:seq concurrent="1" nextAc="seek">
+              <p:cTn id="2" dur="indefinite" nodeType="mainSeq">
+                <p:childTnLst>
+                  <p:par>
+                    <p:cTn id="3" fill="hold">
+                      <p:stCondLst>
+                        <p:cond delay="indefinite"/>
+                      </p:stCondLst>
+                      <p:childTnLst>
+                        <p:par>
+                          <p:cTn id="4" fill="hold">
+                            <p:stCondLst>
+                              <p:cond delay="0"/>
+                            </p:stCondLst>
+                            <p:childTnLst>
+                              <p:par>
+                                <p:cTn id="5" presetID="1" presetClass="mediacall" presetSubtype="0" fill="hold" nodeType="clickEffect">
+                                  <p:stCondLst>
+                                    <p:cond delay="0"/>
+                                  </p:stCondLst>
+                                  <p:childTnLst>
+                                    <p:cmd type="call" cmd="playFrom(0.0)">
+                                      <p:cBhvr>
+                                        <p:cTn id="6" dur="4770" fill="hold"/>
+                                        <p:tgtEl>
+                                          <p:spTgt spid="2"/>
+                                        </p:tgtEl>
+                                      </p:cBhvr>
+                                    </p:cmd>
+                                  </p:childTnLst>
+                                </p:cTn>
+                              </p:par>
+                            </p:childTnLst>
+                          </p:cTn>
+                        </p:par>
+                      </p:childTnLst>
+                    </p:cTn>
+                  </p:par>
+                </p:childTnLst>
+              </p:cTn>
+              <p:prevCondLst>
+                <p:cond evt="onPrev" delay="0">
+                  <p:tgtEl>
+                    <p:sldTgt/>
+                  </p:tgtEl>
+                </p:cond>
+              </p:prevCondLst>
+              <p:nextCondLst>
+                <p:cond evt="onNext" delay="0">
+                  <p:tgtEl>
+                    <p:sldTgt/>
+                  </p:tgtEl>
+                </p:cond>
+              </p:nextCondLst>
+            </p:seq>
+            <p:audio>
+              <p:cMediaNode vol="80000">
+                <p:cTn id="7" fill="hold" display="0">
+                  <p:stCondLst>
+                    <p:cond delay="indefinite"/>
+                  </p:stCondLst>
+                  <p:endCondLst>
+                    <p:cond evt="onStopAudio" delay="0">
+                      <p:tgtEl>
+                        <p:sldTgt/>
+                      </p:tgtEl>
+                    </p:cond>
+                  </p:endCondLst>
+                </p:cTn>
+                <p:tgtEl>
+                  <p:spTgt spid="2"/>
+                </p:tgtEl>
+              </p:cMediaNode>
+            </p:audio>
+          </p:childTnLst>
+        </p:cTn>
+      </p:par>
+    </p:tnLst>
+  </p:timing>
+</p:sld>
+</file>
+
+<file path=ppt/slides/slide11.xml><?xml version="1.0" encoding="utf-8"?>
+<p:sld xmlns:a="http://schemas.openxmlformats.org/drawingml/2006/main" xmlns:r="http://schemas.openxmlformats.org/officeDocument/2006/relationships" xmlns:p="http://schemas.openxmlformats.org/presentationml/2006/main">
+  <p:cSld>
+    <p:bg>
+      <p:bgPr>
+        <a:solidFill>
+          <a:schemeClr val="bg2"/>
+        </a:solidFill>
+        <a:effectLst/>
+      </p:bgPr>
+    </p:bg>
+    <p:spTree>
+      <p:nvGrpSpPr>
+        <p:cNvPr id="1" name=""/>
+        <p:cNvGrpSpPr/>
+        <p:nvPr/>
+      </p:nvGrpSpPr>
+      <p:grpSpPr>
+        <a:xfrm>
+          <a:off x="0" y="0"/>
+          <a:ext cx="0" cy="0"/>
+          <a:chOff x="0" y="0"/>
+          <a:chExt cx="0" cy="0"/>
+        </a:xfrm>
+      </p:grpSpPr>
+      <p:grpSp>
+        <p:nvGrpSpPr>
+          <p:cNvPr id="40" name="Group 42">
+            <a:extLst>
+              <a:ext uri="{FF2B5EF4-FFF2-40B4-BE49-F238E27FC236}">
+                <a16:creationId xmlns:a16="http://schemas.microsoft.com/office/drawing/2014/main" xmlns="" id="{9D9D6BF1-DFF2-4526-9D13-BF339D8C4163}"/>
+              </a:ext>
+              <a:ext uri="{C183D7F6-B498-43B3-948B-1728B52AA6E4}">
+                <adec:decorative xmlns:adec="http://schemas.microsoft.com/office/drawing/2017/decorative" xmlns="" val="1"/>
+              </a:ext>
+            </a:extLst>
+          </p:cNvPr>
+          <p:cNvGrpSpPr>
+            <a:grpSpLocks noGrp="1" noUngrp="1" noRot="1" noChangeAspect="1" noMove="1" noResize="1"/>
+          </p:cNvGrpSpPr>
+          <p:nvPr>
+            <p:extLst>
+              <p:ext uri="{386F3935-93C4-4BCD-93E2-E3B085C9AB24}">
+                <p16:designElem xmlns:p16="http://schemas.microsoft.com/office/powerpoint/2015/main" xmlns="" val="1"/>
+              </p:ext>
+            </p:extLst>
+          </p:nvPr>
+        </p:nvGrpSpPr>
+        <p:grpSpPr>
+          <a:xfrm>
+            <a:off x="752858" y="744469"/>
+            <a:ext cx="10674117" cy="5349671"/>
+            <a:chOff x="752858" y="744469"/>
+            <a:chExt cx="10674117" cy="5349671"/>
+          </a:xfrm>
+        </p:grpSpPr>
+        <p:sp>
+          <p:nvSpPr>
+            <p:cNvPr id="44" name="Freeform 6">
+              <a:extLst>
+                <a:ext uri="{FF2B5EF4-FFF2-40B4-BE49-F238E27FC236}">
+                  <a16:creationId xmlns:a16="http://schemas.microsoft.com/office/drawing/2014/main" xmlns="" id="{A54D4DB6-FB18-4CAE-8905-E0053C92569E}"/>
+                </a:ext>
+                <a:ext uri="{C183D7F6-B498-43B3-948B-1728B52AA6E4}">
+                  <adec:decorative xmlns:adec="http://schemas.microsoft.com/office/drawing/2017/decorative" xmlns="" val="1"/>
+                </a:ext>
+              </a:extLst>
+            </p:cNvPr>
+            <p:cNvSpPr/>
+            <p:nvPr>
+              <p:extLst>
+                <p:ext uri="{386F3935-93C4-4BCD-93E2-E3B085C9AB24}">
+                  <p16:designElem xmlns:p16="http://schemas.microsoft.com/office/powerpoint/2015/main" xmlns="" val="1"/>
                 </p:ext>
               </p:extLst>
             </p:nvPr>
@@ -4737,10 +5359,10 @@
             <p:cNvPr id="45" name="Freeform 6">
               <a:extLst>
                 <a:ext uri="{FF2B5EF4-FFF2-40B4-BE49-F238E27FC236}">
-                  <a16:creationId xmlns:a16="http://schemas.microsoft.com/office/drawing/2014/main" id="{1DBD6488-9429-4FFA-8AE8-C4022C39B0F2}"/>
+                  <a16:creationId xmlns:a16="http://schemas.microsoft.com/office/drawing/2014/main" xmlns="" id="{1DBD6488-9429-4FFA-8AE8-C4022C39B0F2}"/>
                 </a:ext>
                 <a:ext uri="{C183D7F6-B498-43B3-948B-1728B52AA6E4}">
-                  <adec:decorative xmlns:adec="http://schemas.microsoft.com/office/drawing/2017/decorative" val="1"/>
+                  <adec:decorative xmlns:adec="http://schemas.microsoft.com/office/drawing/2017/decorative" xmlns="" val="1"/>
                 </a:ext>
               </a:extLst>
             </p:cNvPr>
@@ -4748,7 +5370,7 @@
             <p:nvPr>
               <p:extLst>
                 <p:ext uri="{386F3935-93C4-4BCD-93E2-E3B085C9AB24}">
-                  <p16:designElem xmlns:p16="http://schemas.microsoft.com/office/powerpoint/2015/main" val="1"/>
+                  <p16:designElem xmlns:p16="http://schemas.microsoft.com/office/powerpoint/2015/main" xmlns="" val="1"/>
                 </p:ext>
               </p:extLst>
             </p:nvPr>
@@ -4811,10 +5433,10 @@
           <p:cNvPr id="42" name="Rectangle 46">
             <a:extLst>
               <a:ext uri="{FF2B5EF4-FFF2-40B4-BE49-F238E27FC236}">
-                <a16:creationId xmlns:a16="http://schemas.microsoft.com/office/drawing/2014/main" id="{56C94072-1B34-48FB-9A9C-5A9A0FFC857C}"/>
+                <a16:creationId xmlns:a16="http://schemas.microsoft.com/office/drawing/2014/main" xmlns="" id="{56C94072-1B34-48FB-9A9C-5A9A0FFC857C}"/>
               </a:ext>
               <a:ext uri="{C183D7F6-B498-43B3-948B-1728B52AA6E4}">
-                <adec:decorative xmlns:adec="http://schemas.microsoft.com/office/drawing/2017/decorative" val="1"/>
+                <adec:decorative xmlns:adec="http://schemas.microsoft.com/office/drawing/2017/decorative" xmlns="" val="1"/>
               </a:ext>
             </a:extLst>
           </p:cNvPr>
@@ -4824,7 +5446,7 @@
           <p:nvPr>
             <p:extLst>
               <p:ext uri="{386F3935-93C4-4BCD-93E2-E3B085C9AB24}">
-                <p16:designElem xmlns:p16="http://schemas.microsoft.com/office/powerpoint/2015/main" val="1"/>
+                <p16:designElem xmlns:p16="http://schemas.microsoft.com/office/powerpoint/2015/main" xmlns="" val="1"/>
               </p:ext>
             </p:extLst>
           </p:nvPr>
@@ -4874,7 +5496,7 @@
           <p:cNvPr id="32" name="Картина 35" descr="Картина, която съдържа небе, открито, ден, висок&#10;&#10;Описанието е генерирано автоматично">
             <a:extLst>
               <a:ext uri="{FF2B5EF4-FFF2-40B4-BE49-F238E27FC236}">
-                <a16:creationId xmlns:a16="http://schemas.microsoft.com/office/drawing/2014/main" id="{4DBDED9E-C9E3-4A94-AD06-E4ABE5A950E9}"/>
+                <a16:creationId xmlns:a16="http://schemas.microsoft.com/office/drawing/2014/main" xmlns="" id="{4DBDED9E-C9E3-4A94-AD06-E4ABE5A950E9}"/>
               </a:ext>
             </a:extLst>
           </p:cNvPr>
@@ -4903,10 +5525,10 @@
           <p:cNvPr id="46" name="Rectangle 48">
             <a:extLst>
               <a:ext uri="{FF2B5EF4-FFF2-40B4-BE49-F238E27FC236}">
-                <a16:creationId xmlns:a16="http://schemas.microsoft.com/office/drawing/2014/main" id="{1D5941F3-0256-4E90-BBBC-5A6EDEB8E0AF}"/>
+                <a16:creationId xmlns:a16="http://schemas.microsoft.com/office/drawing/2014/main" xmlns="" id="{1D5941F3-0256-4E90-BBBC-5A6EDEB8E0AF}"/>
               </a:ext>
               <a:ext uri="{C183D7F6-B498-43B3-948B-1728B52AA6E4}">
-                <adec:decorative xmlns:adec="http://schemas.microsoft.com/office/drawing/2017/decorative" val="1"/>
+                <adec:decorative xmlns:adec="http://schemas.microsoft.com/office/drawing/2017/decorative" xmlns="" val="1"/>
               </a:ext>
             </a:extLst>
           </p:cNvPr>
@@ -4916,7 +5538,7 @@
           <p:nvPr>
             <p:extLst>
               <p:ext uri="{386F3935-93C4-4BCD-93E2-E3B085C9AB24}">
-                <p16:designElem xmlns:p16="http://schemas.microsoft.com/office/powerpoint/2015/main" val="1"/>
+                <p16:designElem xmlns:p16="http://schemas.microsoft.com/office/powerpoint/2015/main" xmlns="" val="1"/>
               </p:ext>
             </p:extLst>
           </p:nvPr>
@@ -4968,7 +5590,7 @@
           <p:cNvPr id="2" name="Заглавие 1">
             <a:extLst>
               <a:ext uri="{FF2B5EF4-FFF2-40B4-BE49-F238E27FC236}">
-                <a16:creationId xmlns:a16="http://schemas.microsoft.com/office/drawing/2014/main" id="{4563E238-7BD6-4B5E-BA20-7222AA8A3F70}"/>
+                <a16:creationId xmlns:a16="http://schemas.microsoft.com/office/drawing/2014/main" xmlns="" id="{4563E238-7BD6-4B5E-BA20-7222AA8A3F70}"/>
               </a:ext>
             </a:extLst>
           </p:cNvPr>
@@ -5007,10 +5629,10 @@
           <p:cNvPr id="48" name="Freeform: Shape 50">
             <a:extLst>
               <a:ext uri="{FF2B5EF4-FFF2-40B4-BE49-F238E27FC236}">
-                <a16:creationId xmlns:a16="http://schemas.microsoft.com/office/drawing/2014/main" id="{A5019358-4900-4555-99FF-EF6AE90B8E32}"/>
+                <a16:creationId xmlns:a16="http://schemas.microsoft.com/office/drawing/2014/main" xmlns="" id="{A5019358-4900-4555-99FF-EF6AE90B8E32}"/>
               </a:ext>
               <a:ext uri="{C183D7F6-B498-43B3-948B-1728B52AA6E4}">
-                <adec:decorative xmlns:adec="http://schemas.microsoft.com/office/drawing/2017/decorative" val="1"/>
+                <adec:decorative xmlns:adec="http://schemas.microsoft.com/office/drawing/2017/decorative" xmlns="" val="1"/>
               </a:ext>
             </a:extLst>
           </p:cNvPr>
@@ -5020,7 +5642,7 @@
           <p:nvPr>
             <p:extLst>
               <p:ext uri="{386F3935-93C4-4BCD-93E2-E3B085C9AB24}">
-                <p16:designElem xmlns:p16="http://schemas.microsoft.com/office/powerpoint/2015/main" val="1"/>
+                <p16:designElem xmlns:p16="http://schemas.microsoft.com/office/powerpoint/2015/main" xmlns="" val="1"/>
               </p:ext>
             </p:extLst>
           </p:nvPr>
@@ -5243,10 +5865,10 @@
           <p:cNvPr id="12" name="Rectangle 11">
             <a:extLst>
               <a:ext uri="{FF2B5EF4-FFF2-40B4-BE49-F238E27FC236}">
-                <a16:creationId xmlns:a16="http://schemas.microsoft.com/office/drawing/2014/main" id="{2A97F59D-628C-4053-B41F-489D0045FD5C}"/>
+                <a16:creationId xmlns:a16="http://schemas.microsoft.com/office/drawing/2014/main" xmlns="" id="{2A97F59D-628C-4053-B41F-489D0045FD5C}"/>
               </a:ext>
               <a:ext uri="{C183D7F6-B498-43B3-948B-1728B52AA6E4}">
-                <adec:decorative xmlns:adec="http://schemas.microsoft.com/office/drawing/2017/decorative" val="1"/>
+                <adec:decorative xmlns:adec="http://schemas.microsoft.com/office/drawing/2017/decorative" xmlns="" val="1"/>
               </a:ext>
             </a:extLst>
           </p:cNvPr>
@@ -5256,7 +5878,7 @@
           <p:nvPr>
             <p:extLst>
               <p:ext uri="{386F3935-93C4-4BCD-93E2-E3B085C9AB24}">
-                <p16:designElem xmlns:p16="http://schemas.microsoft.com/office/powerpoint/2015/main" val="1"/>
+                <p16:designElem xmlns:p16="http://schemas.microsoft.com/office/powerpoint/2015/main" xmlns="" val="1"/>
               </p:ext>
             </p:extLst>
           </p:nvPr>
@@ -5298,10 +5920,10 @@
           <p:cNvPr id="14" name="Rectangle 13">
             <a:extLst>
               <a:ext uri="{FF2B5EF4-FFF2-40B4-BE49-F238E27FC236}">
-                <a16:creationId xmlns:a16="http://schemas.microsoft.com/office/drawing/2014/main" id="{BA75F4A0-FEAF-4F1B-9C48-7688BF9D4148}"/>
+                <a16:creationId xmlns:a16="http://schemas.microsoft.com/office/drawing/2014/main" xmlns="" id="{BA75F4A0-FEAF-4F1B-9C48-7688BF9D4148}"/>
               </a:ext>
               <a:ext uri="{C183D7F6-B498-43B3-948B-1728B52AA6E4}">
-                <adec:decorative xmlns:adec="http://schemas.microsoft.com/office/drawing/2017/decorative" val="1"/>
+                <adec:decorative xmlns:adec="http://schemas.microsoft.com/office/drawing/2017/decorative" xmlns="" val="1"/>
               </a:ext>
             </a:extLst>
           </p:cNvPr>
@@ -5311,7 +5933,7 @@
           <p:nvPr>
             <p:extLst>
               <p:ext uri="{386F3935-93C4-4BCD-93E2-E3B085C9AB24}">
-                <p16:designElem xmlns:p16="http://schemas.microsoft.com/office/powerpoint/2015/main" val="1"/>
+                <p16:designElem xmlns:p16="http://schemas.microsoft.com/office/powerpoint/2015/main" xmlns="" val="1"/>
               </p:ext>
             </p:extLst>
           </p:nvPr>
@@ -5358,7 +5980,7 @@
           <p:cNvPr id="3" name="Заглавие 1">
             <a:extLst>
               <a:ext uri="{FF2B5EF4-FFF2-40B4-BE49-F238E27FC236}">
-                <a16:creationId xmlns:a16="http://schemas.microsoft.com/office/drawing/2014/main" id="{04556CA8-19C7-440D-ACE7-3E23549F3703}"/>
+                <a16:creationId xmlns:a16="http://schemas.microsoft.com/office/drawing/2014/main" xmlns="" id="{04556CA8-19C7-440D-ACE7-3E23549F3703}"/>
               </a:ext>
             </a:extLst>
           </p:cNvPr>
@@ -5419,10 +6041,10 @@
           <p:cNvPr id="16" name="Freeform: Shape 15">
             <a:extLst>
               <a:ext uri="{FF2B5EF4-FFF2-40B4-BE49-F238E27FC236}">
-                <a16:creationId xmlns:a16="http://schemas.microsoft.com/office/drawing/2014/main" id="{F1EC79F3-0DE6-47BA-9C5C-039C54F4AC27}"/>
+                <a16:creationId xmlns:a16="http://schemas.microsoft.com/office/drawing/2014/main" xmlns="" id="{F1EC79F3-0DE6-47BA-9C5C-039C54F4AC27}"/>
               </a:ext>
               <a:ext uri="{C183D7F6-B498-43B3-948B-1728B52AA6E4}">
-                <adec:decorative xmlns:adec="http://schemas.microsoft.com/office/drawing/2017/decorative" val="1"/>
+                <adec:decorative xmlns:adec="http://schemas.microsoft.com/office/drawing/2017/decorative" xmlns="" val="1"/>
               </a:ext>
             </a:extLst>
           </p:cNvPr>
@@ -5432,7 +6054,7 @@
           <p:nvPr>
             <p:extLst>
               <p:ext uri="{386F3935-93C4-4BCD-93E2-E3B085C9AB24}">
-                <p16:designElem xmlns:p16="http://schemas.microsoft.com/office/powerpoint/2015/main" val="1"/>
+                <p16:designElem xmlns:p16="http://schemas.microsoft.com/office/powerpoint/2015/main" xmlns="" val="1"/>
               </p:ext>
             </p:extLst>
           </p:nvPr>
@@ -5530,10 +6152,10 @@
           <p:cNvPr id="18" name="Freeform: Shape 17">
             <a:extLst>
               <a:ext uri="{FF2B5EF4-FFF2-40B4-BE49-F238E27FC236}">
-                <a16:creationId xmlns:a16="http://schemas.microsoft.com/office/drawing/2014/main" id="{C86C2B07-2A41-4CB1-9C51-F037AF41765C}"/>
+                <a16:creationId xmlns:a16="http://schemas.microsoft.com/office/drawing/2014/main" xmlns="" id="{C86C2B07-2A41-4CB1-9C51-F037AF41765C}"/>
               </a:ext>
               <a:ext uri="{C183D7F6-B498-43B3-948B-1728B52AA6E4}">
-                <adec:decorative xmlns:adec="http://schemas.microsoft.com/office/drawing/2017/decorative" val="1"/>
+                <adec:decorative xmlns:adec="http://schemas.microsoft.com/office/drawing/2017/decorative" xmlns="" val="1"/>
               </a:ext>
             </a:extLst>
           </p:cNvPr>
@@ -5543,7 +6165,7 @@
           <p:nvPr>
             <p:extLst>
               <p:ext uri="{386F3935-93C4-4BCD-93E2-E3B085C9AB24}">
-                <p16:designElem xmlns:p16="http://schemas.microsoft.com/office/powerpoint/2015/main" val="1"/>
+                <p16:designElem xmlns:p16="http://schemas.microsoft.com/office/powerpoint/2015/main" xmlns="" val="1"/>
               </p:ext>
             </p:extLst>
           </p:nvPr>
@@ -5632,7 +6254,7 @@
           <p:cNvPr id="5" name="Контейнер за съдържание 2">
             <a:extLst>
               <a:ext uri="{FF2B5EF4-FFF2-40B4-BE49-F238E27FC236}">
-                <a16:creationId xmlns:a16="http://schemas.microsoft.com/office/drawing/2014/main" id="{63AD7ECA-5138-4C42-8A41-788DAE72B142}"/>
+                <a16:creationId xmlns:a16="http://schemas.microsoft.com/office/drawing/2014/main" xmlns="" id="{63AD7ECA-5138-4C42-8A41-788DAE72B142}"/>
               </a:ext>
             </a:extLst>
           </p:cNvPr>
@@ -5902,10 +6524,10 @@
           <p:cNvPr id="20" name="Rectangle 19">
             <a:extLst>
               <a:ext uri="{FF2B5EF4-FFF2-40B4-BE49-F238E27FC236}">
-                <a16:creationId xmlns:a16="http://schemas.microsoft.com/office/drawing/2014/main" id="{A3F67AAC-C977-4759-A5C8-6BC998F963D3}"/>
+                <a16:creationId xmlns:a16="http://schemas.microsoft.com/office/drawing/2014/main" xmlns="" id="{A3F67AAC-C977-4759-A5C8-6BC998F963D3}"/>
               </a:ext>
               <a:ext uri="{C183D7F6-B498-43B3-948B-1728B52AA6E4}">
-                <adec:decorative xmlns:adec="http://schemas.microsoft.com/office/drawing/2017/decorative" val="1"/>
+                <adec:decorative xmlns:adec="http://schemas.microsoft.com/office/drawing/2017/decorative" xmlns="" val="1"/>
               </a:ext>
             </a:extLst>
           </p:cNvPr>
@@ -5915,7 +6537,7 @@
           <p:nvPr>
             <p:extLst>
               <p:ext uri="{386F3935-93C4-4BCD-93E2-E3B085C9AB24}">
-                <p16:designElem xmlns:p16="http://schemas.microsoft.com/office/powerpoint/2015/main" val="1"/>
+                <p16:designElem xmlns:p16="http://schemas.microsoft.com/office/powerpoint/2015/main" xmlns="" val="1"/>
               </p:ext>
             </p:extLst>
           </p:nvPr>
@@ -5968,7 +6590,7 @@
           <p:cNvPr id="7" name="Контейнер за съдържание 3">
             <a:extLst>
               <a:ext uri="{FF2B5EF4-FFF2-40B4-BE49-F238E27FC236}">
-                <a16:creationId xmlns:a16="http://schemas.microsoft.com/office/drawing/2014/main" id="{FF3E29AD-67E3-4664-ADDB-34C17DEE545B}"/>
+                <a16:creationId xmlns:a16="http://schemas.microsoft.com/office/drawing/2014/main" xmlns="" id="{FF3E29AD-67E3-4664-ADDB-34C17DEE545B}"/>
               </a:ext>
             </a:extLst>
           </p:cNvPr>
@@ -6277,7 +6899,7 @@
             <a:hlinkClick r:id="" action="ppaction://media"/>
             <a:extLst>
               <a:ext uri="{FF2B5EF4-FFF2-40B4-BE49-F238E27FC236}">
-                <a16:creationId xmlns:a16="http://schemas.microsoft.com/office/drawing/2014/main" id="{55D59DC7-AE04-47A9-BD19-AE430960F629}"/>
+                <a16:creationId xmlns:a16="http://schemas.microsoft.com/office/drawing/2014/main" xmlns="" id="{55D59DC7-AE04-47A9-BD19-AE430960F629}"/>
               </a:ext>
             </a:extLst>
           </p:cNvPr>
@@ -6439,10 +7061,10 @@
           <p:cNvPr id="31" name="Group 33">
             <a:extLst>
               <a:ext uri="{FF2B5EF4-FFF2-40B4-BE49-F238E27FC236}">
-                <a16:creationId xmlns:a16="http://schemas.microsoft.com/office/drawing/2014/main" id="{449BC34D-9C23-4D6D-8213-1F471AF85B3F}"/>
+                <a16:creationId xmlns:a16="http://schemas.microsoft.com/office/drawing/2014/main" xmlns="" id="{449BC34D-9C23-4D6D-8213-1F471AF85B3F}"/>
               </a:ext>
               <a:ext uri="{C183D7F6-B498-43B3-948B-1728B52AA6E4}">
-                <adec:decorative xmlns:adec="http://schemas.microsoft.com/office/drawing/2017/decorative" val="1"/>
+                <adec:decorative xmlns:adec="http://schemas.microsoft.com/office/drawing/2017/decorative" xmlns="" val="1"/>
               </a:ext>
             </a:extLst>
           </p:cNvPr>
@@ -6452,7 +7074,7 @@
           <p:nvPr>
             <p:extLst>
               <p:ext uri="{386F3935-93C4-4BCD-93E2-E3B085C9AB24}">
-                <p16:designElem xmlns:p16="http://schemas.microsoft.com/office/powerpoint/2015/main" val="1"/>
+                <p16:designElem xmlns:p16="http://schemas.microsoft.com/office/powerpoint/2015/main" xmlns="" val="1"/>
               </p:ext>
             </p:extLst>
           </p:nvPr>
@@ -6470,10 +7092,10 @@
             <p:cNvPr id="35" name="Freeform 6">
               <a:extLst>
                 <a:ext uri="{FF2B5EF4-FFF2-40B4-BE49-F238E27FC236}">
-                  <a16:creationId xmlns:a16="http://schemas.microsoft.com/office/drawing/2014/main" id="{FA0F5D6C-5025-4D7E-82DD-C2C6FDA1E759}"/>
+                  <a16:creationId xmlns:a16="http://schemas.microsoft.com/office/drawing/2014/main" xmlns="" id="{FA0F5D6C-5025-4D7E-82DD-C2C6FDA1E759}"/>
                 </a:ext>
                 <a:ext uri="{C183D7F6-B498-43B3-948B-1728B52AA6E4}">
-                  <adec:decorative xmlns:adec="http://schemas.microsoft.com/office/drawing/2017/decorative" val="1"/>
+                  <adec:decorative xmlns:adec="http://schemas.microsoft.com/office/drawing/2017/decorative" xmlns="" val="1"/>
                 </a:ext>
               </a:extLst>
             </p:cNvPr>
@@ -6481,7 +7103,7 @@
             <p:nvPr>
               <p:extLst>
                 <p:ext uri="{386F3935-93C4-4BCD-93E2-E3B085C9AB24}">
-                  <p16:designElem xmlns:p16="http://schemas.microsoft.com/office/powerpoint/2015/main" val="1"/>
+                  <p16:designElem xmlns:p16="http://schemas.microsoft.com/office/powerpoint/2015/main" xmlns="" val="1"/>
                 </p:ext>
               </p:extLst>
             </p:nvPr>
@@ -6541,10 +7163,10 @@
             <p:cNvPr id="36" name="Freeform 6">
               <a:extLst>
                 <a:ext uri="{FF2B5EF4-FFF2-40B4-BE49-F238E27FC236}">
-                  <a16:creationId xmlns:a16="http://schemas.microsoft.com/office/drawing/2014/main" id="{E2AF2C17-4AB4-4402-B84B-129EF95D161C}"/>
+                  <a16:creationId xmlns:a16="http://schemas.microsoft.com/office/drawing/2014/main" xmlns="" id="{E2AF2C17-4AB4-4402-B84B-129EF95D161C}"/>
                 </a:ext>
                 <a:ext uri="{C183D7F6-B498-43B3-948B-1728B52AA6E4}">
-                  <adec:decorative xmlns:adec="http://schemas.microsoft.com/office/drawing/2017/decorative" val="1"/>
+                  <adec:decorative xmlns:adec="http://schemas.microsoft.com/office/drawing/2017/decorative" xmlns="" val="1"/>
                 </a:ext>
               </a:extLst>
             </p:cNvPr>
@@ -6552,7 +7174,7 @@
             <p:nvPr>
               <p:extLst>
                 <p:ext uri="{386F3935-93C4-4BCD-93E2-E3B085C9AB24}">
-                  <p16:designElem xmlns:p16="http://schemas.microsoft.com/office/powerpoint/2015/main" val="1"/>
+                  <p16:designElem xmlns:p16="http://schemas.microsoft.com/office/powerpoint/2015/main" xmlns="" val="1"/>
                 </p:ext>
               </p:extLst>
             </p:nvPr>
@@ -6615,10 +7237,10 @@
           <p:cNvPr id="32" name="Rectangle 37">
             <a:extLst>
               <a:ext uri="{FF2B5EF4-FFF2-40B4-BE49-F238E27FC236}">
-                <a16:creationId xmlns:a16="http://schemas.microsoft.com/office/drawing/2014/main" id="{1F9A0C1C-8ABC-401B-8FE9-AC9327C4C587}"/>
+                <a16:creationId xmlns:a16="http://schemas.microsoft.com/office/drawing/2014/main" xmlns="" id="{1F9A0C1C-8ABC-401B-8FE9-AC9327C4C587}"/>
               </a:ext>
               <a:ext uri="{C183D7F6-B498-43B3-948B-1728B52AA6E4}">
-                <adec:decorative xmlns:adec="http://schemas.microsoft.com/office/drawing/2017/decorative" val="1"/>
+                <adec:decorative xmlns:adec="http://schemas.microsoft.com/office/drawing/2017/decorative" xmlns="" val="1"/>
               </a:ext>
             </a:extLst>
           </p:cNvPr>
@@ -6628,7 +7250,7 @@
           <p:nvPr>
             <p:extLst>
               <p:ext uri="{386F3935-93C4-4BCD-93E2-E3B085C9AB24}">
-                <p16:designElem xmlns:p16="http://schemas.microsoft.com/office/powerpoint/2015/main" val="1"/>
+                <p16:designElem xmlns:p16="http://schemas.microsoft.com/office/powerpoint/2015/main" xmlns="" val="1"/>
               </p:ext>
             </p:extLst>
           </p:nvPr>
@@ -6675,7 +7297,7 @@
           <p:cNvPr id="3" name="Заглавие 1">
             <a:extLst>
               <a:ext uri="{FF2B5EF4-FFF2-40B4-BE49-F238E27FC236}">
-                <a16:creationId xmlns:a16="http://schemas.microsoft.com/office/drawing/2014/main" id="{0ABAD164-01C7-4C3D-BE53-6D1E1D17BA8E}"/>
+                <a16:creationId xmlns:a16="http://schemas.microsoft.com/office/drawing/2014/main" xmlns="" id="{0ABAD164-01C7-4C3D-BE53-6D1E1D17BA8E}"/>
               </a:ext>
             </a:extLst>
           </p:cNvPr>
@@ -6734,10 +7356,10 @@
           <p:cNvPr id="33" name="Freeform 6">
             <a:extLst>
               <a:ext uri="{FF2B5EF4-FFF2-40B4-BE49-F238E27FC236}">
-                <a16:creationId xmlns:a16="http://schemas.microsoft.com/office/drawing/2014/main" id="{BA5783C3-2F96-40A7-A24F-30CB07AA3928}"/>
+                <a16:creationId xmlns:a16="http://schemas.microsoft.com/office/drawing/2014/main" xmlns="" id="{BA5783C3-2F96-40A7-A24F-30CB07AA3928}"/>
               </a:ext>
               <a:ext uri="{C183D7F6-B498-43B3-948B-1728B52AA6E4}">
-                <adec:decorative xmlns:adec="http://schemas.microsoft.com/office/drawing/2017/decorative" val="1"/>
+                <adec:decorative xmlns:adec="http://schemas.microsoft.com/office/drawing/2017/decorative" xmlns="" val="1"/>
               </a:ext>
             </a:extLst>
           </p:cNvPr>
@@ -6747,7 +7369,7 @@
           <p:nvPr>
             <p:extLst>
               <p:ext uri="{386F3935-93C4-4BCD-93E2-E3B085C9AB24}">
-                <p16:designElem xmlns:p16="http://schemas.microsoft.com/office/powerpoint/2015/main" val="1"/>
+                <p16:designElem xmlns:p16="http://schemas.microsoft.com/office/powerpoint/2015/main" xmlns="" val="1"/>
               </p:ext>
             </p:extLst>
           </p:nvPr>
@@ -6809,10 +7431,10 @@
           <p:cNvPr id="37" name="Freeform 6">
             <a:extLst>
               <a:ext uri="{FF2B5EF4-FFF2-40B4-BE49-F238E27FC236}">
-                <a16:creationId xmlns:a16="http://schemas.microsoft.com/office/drawing/2014/main" id="{A9D08DBA-0326-4C4E-ACFB-576F3ABDD2D0}"/>
+                <a16:creationId xmlns:a16="http://schemas.microsoft.com/office/drawing/2014/main" xmlns="" id="{A9D08DBA-0326-4C4E-ACFB-576F3ABDD2D0}"/>
               </a:ext>
               <a:ext uri="{C183D7F6-B498-43B3-948B-1728B52AA6E4}">
-                <adec:decorative xmlns:adec="http://schemas.microsoft.com/office/drawing/2017/decorative" val="1"/>
+                <adec:decorative xmlns:adec="http://schemas.microsoft.com/office/drawing/2017/decorative" xmlns="" val="1"/>
               </a:ext>
             </a:extLst>
           </p:cNvPr>
@@ -6822,7 +7444,7 @@
           <p:nvPr>
             <p:extLst>
               <p:ext uri="{386F3935-93C4-4BCD-93E2-E3B085C9AB24}">
-                <p16:designElem xmlns:p16="http://schemas.microsoft.com/office/powerpoint/2015/main" val="1"/>
+                <p16:designElem xmlns:p16="http://schemas.microsoft.com/office/powerpoint/2015/main" xmlns="" val="1"/>
               </p:ext>
             </p:extLst>
           </p:nvPr>
@@ -6882,7 +7504,7 @@
           <p:cNvPr id="39" name="Картина 40">
             <a:extLst>
               <a:ext uri="{FF2B5EF4-FFF2-40B4-BE49-F238E27FC236}">
-                <a16:creationId xmlns:a16="http://schemas.microsoft.com/office/drawing/2014/main" id="{A93A8873-FEF6-4B19-9EB2-A5DA531C6B5B}"/>
+                <a16:creationId xmlns:a16="http://schemas.microsoft.com/office/drawing/2014/main" xmlns="" id="{A93A8873-FEF6-4B19-9EB2-A5DA531C6B5B}"/>
               </a:ext>
             </a:extLst>
           </p:cNvPr>
@@ -6912,7 +7534,7 @@
           <p:cNvPr id="29" name="Таблица 29">
             <a:extLst>
               <a:ext uri="{FF2B5EF4-FFF2-40B4-BE49-F238E27FC236}">
-                <a16:creationId xmlns:a16="http://schemas.microsoft.com/office/drawing/2014/main" id="{63DBAADE-1F5E-4C4E-AE94-A8D37F143A63}"/>
+                <a16:creationId xmlns:a16="http://schemas.microsoft.com/office/drawing/2014/main" xmlns="" id="{63DBAADE-1F5E-4C4E-AE94-A8D37F143A63}"/>
               </a:ext>
             </a:extLst>
           </p:cNvPr>
@@ -6941,14 +7563,14 @@
                 <a:gridCol w="2899208">
                   <a:extLst>
                     <a:ext uri="{9D8B030D-6E8A-4147-A177-3AD203B41FA5}">
-                      <a16:colId xmlns:a16="http://schemas.microsoft.com/office/drawing/2014/main" val="1996439488"/>
+                      <a16:colId xmlns:a16="http://schemas.microsoft.com/office/drawing/2014/main" xmlns="" val="1996439488"/>
                     </a:ext>
                   </a:extLst>
                 </a:gridCol>
                 <a:gridCol w="2760015">
                   <a:extLst>
                     <a:ext uri="{9D8B030D-6E8A-4147-A177-3AD203B41FA5}">
-                      <a16:colId xmlns:a16="http://schemas.microsoft.com/office/drawing/2014/main" val="3475802433"/>
+                      <a16:colId xmlns:a16="http://schemas.microsoft.com/office/drawing/2014/main" xmlns="" val="3475802433"/>
                     </a:ext>
                   </a:extLst>
                 </a:gridCol>
@@ -6998,7 +7620,7 @@
                 </a:tc>
                 <a:extLst>
                   <a:ext uri="{0D108BD9-81ED-4DB2-BD59-A6C34878D82A}">
-                    <a16:rowId xmlns:a16="http://schemas.microsoft.com/office/drawing/2014/main" val="996890312"/>
+                    <a16:rowId xmlns:a16="http://schemas.microsoft.com/office/drawing/2014/main" xmlns="" val="996890312"/>
                   </a:ext>
                 </a:extLst>
               </a:tr>
@@ -7047,7 +7669,7 @@
                 </a:tc>
                 <a:extLst>
                   <a:ext uri="{0D108BD9-81ED-4DB2-BD59-A6C34878D82A}">
-                    <a16:rowId xmlns:a16="http://schemas.microsoft.com/office/drawing/2014/main" val="1046381762"/>
+                    <a16:rowId xmlns:a16="http://schemas.microsoft.com/office/drawing/2014/main" xmlns="" val="1046381762"/>
                   </a:ext>
                 </a:extLst>
               </a:tr>
@@ -7096,7 +7718,7 @@
                 </a:tc>
                 <a:extLst>
                   <a:ext uri="{0D108BD9-81ED-4DB2-BD59-A6C34878D82A}">
-                    <a16:rowId xmlns:a16="http://schemas.microsoft.com/office/drawing/2014/main" val="4196316508"/>
+                    <a16:rowId xmlns:a16="http://schemas.microsoft.com/office/drawing/2014/main" xmlns="" val="4196316508"/>
                   </a:ext>
                 </a:extLst>
               </a:tr>
@@ -7137,7 +7759,7 @@
                 </a:tc>
                 <a:extLst>
                   <a:ext uri="{0D108BD9-81ED-4DB2-BD59-A6C34878D82A}">
-                    <a16:rowId xmlns:a16="http://schemas.microsoft.com/office/drawing/2014/main" val="3177275793"/>
+                    <a16:rowId xmlns:a16="http://schemas.microsoft.com/office/drawing/2014/main" xmlns="" val="3177275793"/>
                   </a:ext>
                 </a:extLst>
               </a:tr>
@@ -7151,7 +7773,7 @@
             <a:hlinkClick r:id="" action="ppaction://media"/>
             <a:extLst>
               <a:ext uri="{FF2B5EF4-FFF2-40B4-BE49-F238E27FC236}">
-                <a16:creationId xmlns:a16="http://schemas.microsoft.com/office/drawing/2014/main" id="{1FEB6FFA-C025-4DDA-922D-D1A6E4F5E729}"/>
+                <a16:creationId xmlns:a16="http://schemas.microsoft.com/office/drawing/2014/main" xmlns="" id="{1FEB6FFA-C025-4DDA-922D-D1A6E4F5E729}"/>
               </a:ext>
             </a:extLst>
           </p:cNvPr>
@@ -7313,10 +7935,10 @@
           <p:cNvPr id="14" name="Rectangle 13">
             <a:extLst>
               <a:ext uri="{FF2B5EF4-FFF2-40B4-BE49-F238E27FC236}">
-                <a16:creationId xmlns:a16="http://schemas.microsoft.com/office/drawing/2014/main" id="{0E807223-DF88-4D6D-970E-08919E5E02EB}"/>
+                <a16:creationId xmlns:a16="http://schemas.microsoft.com/office/drawing/2014/main" xmlns="" id="{0E807223-DF88-4D6D-970E-08919E5E02EB}"/>
               </a:ext>
               <a:ext uri="{C183D7F6-B498-43B3-948B-1728B52AA6E4}">
-                <adec:decorative xmlns:adec="http://schemas.microsoft.com/office/drawing/2017/decorative" val="1"/>
+                <adec:decorative xmlns:adec="http://schemas.microsoft.com/office/drawing/2017/decorative" xmlns="" val="1"/>
               </a:ext>
             </a:extLst>
           </p:cNvPr>
@@ -7326,7 +7948,7 @@
           <p:nvPr>
             <p:extLst>
               <p:ext uri="{386F3935-93C4-4BCD-93E2-E3B085C9AB24}">
-                <p16:designElem xmlns:p16="http://schemas.microsoft.com/office/powerpoint/2015/main" val="1"/>
+                <p16:designElem xmlns:p16="http://schemas.microsoft.com/office/powerpoint/2015/main" xmlns="" val="1"/>
               </p:ext>
             </p:extLst>
           </p:nvPr>
@@ -7368,10 +7990,10 @@
           <p:cNvPr id="16" name="Rectangle 15">
             <a:extLst>
               <a:ext uri="{FF2B5EF4-FFF2-40B4-BE49-F238E27FC236}">
-                <a16:creationId xmlns:a16="http://schemas.microsoft.com/office/drawing/2014/main" id="{83B91B61-BFCA-4647-957E-A8269BE46F39}"/>
+                <a16:creationId xmlns:a16="http://schemas.microsoft.com/office/drawing/2014/main" xmlns="" id="{83B91B61-BFCA-4647-957E-A8269BE46F39}"/>
               </a:ext>
               <a:ext uri="{C183D7F6-B498-43B3-948B-1728B52AA6E4}">
-                <adec:decorative xmlns:adec="http://schemas.microsoft.com/office/drawing/2017/decorative" val="1"/>
+                <adec:decorative xmlns:adec="http://schemas.microsoft.com/office/drawing/2017/decorative" xmlns="" val="1"/>
               </a:ext>
             </a:extLst>
           </p:cNvPr>
@@ -7381,7 +8003,7 @@
           <p:nvPr>
             <p:extLst>
               <p:ext uri="{386F3935-93C4-4BCD-93E2-E3B085C9AB24}">
-                <p16:designElem xmlns:p16="http://schemas.microsoft.com/office/powerpoint/2015/main" val="1"/>
+                <p16:designElem xmlns:p16="http://schemas.microsoft.com/office/powerpoint/2015/main" xmlns="" val="1"/>
               </p:ext>
             </p:extLst>
           </p:nvPr>
@@ -7428,7 +8050,7 @@
           <p:cNvPr id="3" name="Текстово поле 2">
             <a:extLst>
               <a:ext uri="{FF2B5EF4-FFF2-40B4-BE49-F238E27FC236}">
-                <a16:creationId xmlns:a16="http://schemas.microsoft.com/office/drawing/2014/main" id="{DE5B222A-B6A6-40E2-9E90-BC4961D935C0}"/>
+                <a16:creationId xmlns:a16="http://schemas.microsoft.com/office/drawing/2014/main" xmlns="" id="{DE5B222A-B6A6-40E2-9E90-BC4961D935C0}"/>
               </a:ext>
             </a:extLst>
           </p:cNvPr>
@@ -7483,7 +8105,7 @@
           <p:cNvPr id="2" name="Картина 2">
             <a:extLst>
               <a:ext uri="{FF2B5EF4-FFF2-40B4-BE49-F238E27FC236}">
-                <a16:creationId xmlns:a16="http://schemas.microsoft.com/office/drawing/2014/main" id="{09D0251B-F02F-40DE-97E0-F185F6E57037}"/>
+                <a16:creationId xmlns:a16="http://schemas.microsoft.com/office/drawing/2014/main" xmlns="" id="{09D0251B-F02F-40DE-97E0-F185F6E57037}"/>
               </a:ext>
             </a:extLst>
           </p:cNvPr>
@@ -7512,10 +8134,10 @@
           <p:cNvPr id="18" name="Rectangle 17">
             <a:extLst>
               <a:ext uri="{FF2B5EF4-FFF2-40B4-BE49-F238E27FC236}">
-                <a16:creationId xmlns:a16="http://schemas.microsoft.com/office/drawing/2014/main" id="{92D1D7C6-1C89-420C-8D35-483654167118}"/>
+                <a16:creationId xmlns:a16="http://schemas.microsoft.com/office/drawing/2014/main" xmlns="" id="{92D1D7C6-1C89-420C-8D35-483654167118}"/>
               </a:ext>
               <a:ext uri="{C183D7F6-B498-43B3-948B-1728B52AA6E4}">
-                <adec:decorative xmlns:adec="http://schemas.microsoft.com/office/drawing/2017/decorative" val="1"/>
+                <adec:decorative xmlns:adec="http://schemas.microsoft.com/office/drawing/2017/decorative" xmlns="" val="1"/>
               </a:ext>
             </a:extLst>
           </p:cNvPr>
@@ -7525,7 +8147,7 @@
           <p:nvPr>
             <p:extLst>
               <p:ext uri="{386F3935-93C4-4BCD-93E2-E3B085C9AB24}">
-                <p16:designElem xmlns:p16="http://schemas.microsoft.com/office/powerpoint/2015/main" val="1"/>
+                <p16:designElem xmlns:p16="http://schemas.microsoft.com/office/powerpoint/2015/main" xmlns="" val="1"/>
               </p:ext>
             </p:extLst>
           </p:nvPr>
@@ -7567,7 +8189,7 @@
           <p:cNvPr id="4" name="Текстово поле 3">
             <a:extLst>
               <a:ext uri="{FF2B5EF4-FFF2-40B4-BE49-F238E27FC236}">
-                <a16:creationId xmlns:a16="http://schemas.microsoft.com/office/drawing/2014/main" id="{80EDAA93-8FA3-4C67-93D8-43C31ECAE70F}"/>
+                <a16:creationId xmlns:a16="http://schemas.microsoft.com/office/drawing/2014/main" xmlns="" id="{80EDAA93-8FA3-4C67-93D8-43C31ECAE70F}"/>
               </a:ext>
             </a:extLst>
           </p:cNvPr>
@@ -7679,10 +8301,10 @@
           <p:cNvPr id="7" name="Rectangle 6">
             <a:extLst>
               <a:ext uri="{FF2B5EF4-FFF2-40B4-BE49-F238E27FC236}">
-                <a16:creationId xmlns:a16="http://schemas.microsoft.com/office/drawing/2014/main" id="{35383F2B-0D6A-4B1A-BA43-A65A34B3B2B3}"/>
+                <a16:creationId xmlns:a16="http://schemas.microsoft.com/office/drawing/2014/main" xmlns="" id="{35383F2B-0D6A-4B1A-BA43-A65A34B3B2B3}"/>
               </a:ext>
               <a:ext uri="{C183D7F6-B498-43B3-948B-1728B52AA6E4}">
-                <adec:decorative xmlns:adec="http://schemas.microsoft.com/office/drawing/2017/decorative" val="1"/>
+                <adec:decorative xmlns:adec="http://schemas.microsoft.com/office/drawing/2017/decorative" xmlns="" val="1"/>
               </a:ext>
             </a:extLst>
           </p:cNvPr>
@@ -7692,7 +8314,7 @@
           <p:nvPr>
             <p:extLst>
               <p:ext uri="{386F3935-93C4-4BCD-93E2-E3B085C9AB24}">
-                <p16:designElem xmlns:p16="http://schemas.microsoft.com/office/powerpoint/2015/main" val="1"/>
+                <p16:designElem xmlns:p16="http://schemas.microsoft.com/office/powerpoint/2015/main" xmlns="" val="1"/>
               </p:ext>
             </p:extLst>
           </p:nvPr>
@@ -7739,7 +8361,7 @@
           <p:cNvPr id="2" name="Картина 2">
             <a:extLst>
               <a:ext uri="{FF2B5EF4-FFF2-40B4-BE49-F238E27FC236}">
-                <a16:creationId xmlns:a16="http://schemas.microsoft.com/office/drawing/2014/main" id="{297DAAC4-A373-4EFD-8E78-CA8D4F88C9E7}"/>
+                <a16:creationId xmlns:a16="http://schemas.microsoft.com/office/drawing/2014/main" xmlns="" id="{297DAAC4-A373-4EFD-8E78-CA8D4F88C9E7}"/>
               </a:ext>
             </a:extLst>
           </p:cNvPr>
@@ -7801,7 +8423,7 @@
           <p:cNvPr id="3" name="Текстово поле 2">
             <a:extLst>
               <a:ext uri="{FF2B5EF4-FFF2-40B4-BE49-F238E27FC236}">
-                <a16:creationId xmlns:a16="http://schemas.microsoft.com/office/drawing/2014/main" id="{AE87C820-A5D7-4E23-A9B0-1192B7E70490}"/>
+                <a16:creationId xmlns:a16="http://schemas.microsoft.com/office/drawing/2014/main" xmlns="" id="{AE87C820-A5D7-4E23-A9B0-1192B7E70490}"/>
               </a:ext>
             </a:extLst>
           </p:cNvPr>
@@ -7839,7 +8461,7 @@
           <p:cNvPr id="4" name="Текстово поле 3">
             <a:extLst>
               <a:ext uri="{FF2B5EF4-FFF2-40B4-BE49-F238E27FC236}">
-                <a16:creationId xmlns:a16="http://schemas.microsoft.com/office/drawing/2014/main" id="{86D82ED0-DEA5-46C3-ABEF-7BEF11973A3C}"/>
+                <a16:creationId xmlns:a16="http://schemas.microsoft.com/office/drawing/2014/main" xmlns="" id="{86D82ED0-DEA5-46C3-ABEF-7BEF11973A3C}"/>
               </a:ext>
             </a:extLst>
           </p:cNvPr>
@@ -7886,7 +8508,7 @@
           <p:cNvPr id="9" name="Текстово поле 8">
             <a:extLst>
               <a:ext uri="{FF2B5EF4-FFF2-40B4-BE49-F238E27FC236}">
-                <a16:creationId xmlns:a16="http://schemas.microsoft.com/office/drawing/2014/main" id="{27D7D6C8-2012-4C48-85C1-B7D8D577656D}"/>
+                <a16:creationId xmlns:a16="http://schemas.microsoft.com/office/drawing/2014/main" xmlns="" id="{27D7D6C8-2012-4C48-85C1-B7D8D577656D}"/>
               </a:ext>
             </a:extLst>
           </p:cNvPr>
@@ -7933,7 +8555,7 @@
           <p:cNvPr id="5" name="Текстово поле 4">
             <a:extLst>
               <a:ext uri="{FF2B5EF4-FFF2-40B4-BE49-F238E27FC236}">
-                <a16:creationId xmlns:a16="http://schemas.microsoft.com/office/drawing/2014/main" id="{2F0D7B30-DDFF-48A2-97F5-C2EB6AC4FDD5}"/>
+                <a16:creationId xmlns:a16="http://schemas.microsoft.com/office/drawing/2014/main" xmlns="" id="{2F0D7B30-DDFF-48A2-97F5-C2EB6AC4FDD5}"/>
               </a:ext>
             </a:extLst>
           </p:cNvPr>
@@ -7998,7 +8620,7 @@
             <a:hlinkClick r:id="" action="ppaction://media"/>
             <a:extLst>
               <a:ext uri="{FF2B5EF4-FFF2-40B4-BE49-F238E27FC236}">
-                <a16:creationId xmlns:a16="http://schemas.microsoft.com/office/drawing/2014/main" id="{C79E50C3-73CD-4225-930C-1CF7220AE327}"/>
+                <a16:creationId xmlns:a16="http://schemas.microsoft.com/office/drawing/2014/main" xmlns="" id="{C79E50C3-73CD-4225-930C-1CF7220AE327}"/>
               </a:ext>
             </a:extLst>
           </p:cNvPr>
@@ -8154,7 +8776,338 @@
           <p:cNvPr id="2" name="Текстово поле 1">
             <a:extLst>
               <a:ext uri="{FF2B5EF4-FFF2-40B4-BE49-F238E27FC236}">
-                <a16:creationId xmlns:a16="http://schemas.microsoft.com/office/drawing/2014/main" id="{F6739BB3-2EA5-48AF-B37D-A3A4F9940362}"/>
+                <a16:creationId xmlns:a16="http://schemas.microsoft.com/office/drawing/2014/main" xmlns="" id="{F6739BB3-2EA5-48AF-B37D-A3A4F9940362}"/>
+              </a:ext>
+            </a:extLst>
+          </p:cNvPr>
+          <p:cNvSpPr txBox="1"/>
+          <p:nvPr/>
+        </p:nvSpPr>
+        <p:spPr>
+          <a:xfrm>
+            <a:off x="4323862" y="269631"/>
+            <a:ext cx="4755660" cy="769441"/>
+          </a:xfrm>
+          <a:prstGeom prst="rect">
+            <a:avLst/>
+          </a:prstGeom>
+          <a:noFill/>
+        </p:spPr>
+        <p:txBody>
+          <a:bodyPr rot="0" spcFirstLastPara="0" vertOverflow="overflow" horzOverflow="overflow" vert="horz" wrap="square" lIns="91440" tIns="45720" rIns="91440" bIns="45720" numCol="1" spcCol="0" rtlCol="0" fromWordArt="0" anchor="t" anchorCtr="0" forceAA="0" compatLnSpc="1">
+            <a:prstTxWarp prst="textNoShape">
+              <a:avLst/>
+            </a:prstTxWarp>
+            <a:spAutoFit/>
+          </a:bodyPr>
+          <a:lstStyle/>
+          <a:p>
+            <a:pPr algn="ctr"/>
+            <a:r>
+              <a:rPr lang="en-US" sz="4400" dirty="0" smtClean="0"/>
+              <a:t>Logos and Design</a:t>
+            </a:r>
+            <a:endParaRPr lang="bg-BG" sz="4400" dirty="0"/>
+          </a:p>
+        </p:txBody>
+      </p:sp>
+      <p:pic>
+        <p:nvPicPr>
+          <p:cNvPr id="5" name="Картина 4"/>
+          <p:cNvPicPr>
+            <a:picLocks noChangeAspect="1"/>
+          </p:cNvPicPr>
+          <p:nvPr/>
+        </p:nvPicPr>
+        <p:blipFill>
+          <a:blip r:embed="rId2">
+            <a:extLst>
+              <a:ext uri="{28A0092B-C50C-407E-A947-70E740481C1C}">
+                <a14:useLocalDpi xmlns:a14="http://schemas.microsoft.com/office/drawing/2010/main" val="0"/>
+              </a:ext>
+            </a:extLst>
+          </a:blip>
+          <a:stretch>
+            <a:fillRect/>
+          </a:stretch>
+        </p:blipFill>
+        <p:spPr>
+          <a:xfrm>
+            <a:off x="1602527" y="1500538"/>
+            <a:ext cx="2721335" cy="1679662"/>
+          </a:xfrm>
+          <a:prstGeom prst="rect">
+            <a:avLst/>
+          </a:prstGeom>
+          <a:ln>
+            <a:noFill/>
+          </a:ln>
+          <a:effectLst>
+            <a:outerShdw blurRad="292100" dist="139700" dir="2700000" algn="tl" rotWithShape="0">
+              <a:srgbClr val="333333">
+                <a:alpha val="65000"/>
+              </a:srgbClr>
+            </a:outerShdw>
+          </a:effectLst>
+        </p:spPr>
+      </p:pic>
+      <p:pic>
+        <p:nvPicPr>
+          <p:cNvPr id="10" name="Картина 9"/>
+          <p:cNvPicPr>
+            <a:picLocks noChangeAspect="1"/>
+          </p:cNvPicPr>
+          <p:nvPr/>
+        </p:nvPicPr>
+        <p:blipFill>
+          <a:blip r:embed="rId3">
+            <a:extLst>
+              <a:ext uri="{28A0092B-C50C-407E-A947-70E740481C1C}">
+                <a14:useLocalDpi xmlns:a14="http://schemas.microsoft.com/office/drawing/2010/main" val="0"/>
+              </a:ext>
+            </a:extLst>
+          </a:blip>
+          <a:stretch>
+            <a:fillRect/>
+          </a:stretch>
+        </p:blipFill>
+        <p:spPr>
+          <a:xfrm>
+            <a:off x="8189724" y="1403590"/>
+            <a:ext cx="2512996" cy="1776610"/>
+          </a:xfrm>
+          <a:prstGeom prst="rect">
+            <a:avLst/>
+          </a:prstGeom>
+          <a:ln>
+            <a:noFill/>
+          </a:ln>
+          <a:effectLst>
+            <a:outerShdw blurRad="292100" dist="139700" dir="2700000" algn="tl" rotWithShape="0">
+              <a:srgbClr val="333333">
+                <a:alpha val="65000"/>
+              </a:srgbClr>
+            </a:outerShdw>
+          </a:effectLst>
+        </p:spPr>
+      </p:pic>
+      <p:pic>
+        <p:nvPicPr>
+          <p:cNvPr id="11" name="Картина 10"/>
+          <p:cNvPicPr>
+            <a:picLocks noChangeAspect="1"/>
+          </p:cNvPicPr>
+          <p:nvPr/>
+        </p:nvPicPr>
+        <p:blipFill>
+          <a:blip r:embed="rId4">
+            <a:extLst>
+              <a:ext uri="{28A0092B-C50C-407E-A947-70E740481C1C}">
+                <a14:useLocalDpi xmlns:a14="http://schemas.microsoft.com/office/drawing/2010/main" val="0"/>
+              </a:ext>
+            </a:extLst>
+          </a:blip>
+          <a:stretch>
+            <a:fillRect/>
+          </a:stretch>
+        </p:blipFill>
+        <p:spPr>
+          <a:xfrm>
+            <a:off x="8359759" y="3782375"/>
+            <a:ext cx="2843293" cy="1754937"/>
+          </a:xfrm>
+          <a:prstGeom prst="rect">
+            <a:avLst/>
+          </a:prstGeom>
+          <a:ln w="38100" cap="sq">
+            <a:solidFill>
+              <a:srgbClr val="000000"/>
+            </a:solidFill>
+            <a:prstDash val="solid"/>
+            <a:miter lim="800000"/>
+          </a:ln>
+          <a:effectLst>
+            <a:outerShdw blurRad="50800" dist="38100" dir="2700000" algn="tl" rotWithShape="0">
+              <a:srgbClr val="000000">
+                <a:alpha val="43000"/>
+              </a:srgbClr>
+            </a:outerShdw>
+          </a:effectLst>
+        </p:spPr>
+      </p:pic>
+      <p:pic>
+        <p:nvPicPr>
+          <p:cNvPr id="12" name="Картина 11"/>
+          <p:cNvPicPr>
+            <a:picLocks noChangeAspect="1"/>
+          </p:cNvPicPr>
+          <p:nvPr/>
+        </p:nvPicPr>
+        <p:blipFill>
+          <a:blip r:embed="rId5">
+            <a:extLst>
+              <a:ext uri="{28A0092B-C50C-407E-A947-70E740481C1C}">
+                <a14:useLocalDpi xmlns:a14="http://schemas.microsoft.com/office/drawing/2010/main" val="0"/>
+              </a:ext>
+            </a:extLst>
+          </a:blip>
+          <a:stretch>
+            <a:fillRect/>
+          </a:stretch>
+        </p:blipFill>
+        <p:spPr>
+          <a:xfrm>
+            <a:off x="4859702" y="1315116"/>
+            <a:ext cx="2549517" cy="2549517"/>
+          </a:xfrm>
+          <a:prstGeom prst="roundRect">
+            <a:avLst>
+              <a:gd name="adj" fmla="val 8594"/>
+            </a:avLst>
+          </a:prstGeom>
+          <a:solidFill>
+            <a:srgbClr val="FFFFFF">
+              <a:shade val="85000"/>
+            </a:srgbClr>
+          </a:solidFill>
+          <a:ln>
+            <a:noFill/>
+          </a:ln>
+          <a:effectLst>
+            <a:reflection blurRad="12700" stA="38000" endPos="28000" dist="5000" dir="5400000" sy="-100000" algn="bl" rotWithShape="0"/>
+          </a:effectLst>
+        </p:spPr>
+      </p:pic>
+      <p:pic>
+        <p:nvPicPr>
+          <p:cNvPr id="14" name="Картина 13"/>
+          <p:cNvPicPr>
+            <a:picLocks noChangeAspect="1"/>
+          </p:cNvPicPr>
+          <p:nvPr/>
+        </p:nvPicPr>
+        <p:blipFill>
+          <a:blip r:embed="rId6">
+            <a:extLst>
+              <a:ext uri="{28A0092B-C50C-407E-A947-70E740481C1C}">
+                <a14:useLocalDpi xmlns:a14="http://schemas.microsoft.com/office/drawing/2010/main" val="0"/>
+              </a:ext>
+            </a:extLst>
+          </a:blip>
+          <a:stretch>
+            <a:fillRect/>
+          </a:stretch>
+        </p:blipFill>
+        <p:spPr>
+          <a:xfrm>
+            <a:off x="4741859" y="4356341"/>
+            <a:ext cx="2785202" cy="1719082"/>
+          </a:xfrm>
+          <a:prstGeom prst="roundRect">
+            <a:avLst>
+              <a:gd name="adj" fmla="val 8594"/>
+            </a:avLst>
+          </a:prstGeom>
+          <a:solidFill>
+            <a:srgbClr val="FFFFFF">
+              <a:shade val="85000"/>
+            </a:srgbClr>
+          </a:solidFill>
+          <a:ln>
+            <a:noFill/>
+          </a:ln>
+          <a:effectLst>
+            <a:reflection blurRad="12700" stA="38000" endPos="28000" dist="5000" dir="5400000" sy="-100000" algn="bl" rotWithShape="0"/>
+          </a:effectLst>
+        </p:spPr>
+      </p:pic>
+      <p:pic>
+        <p:nvPicPr>
+          <p:cNvPr id="15" name="Картина 14"/>
+          <p:cNvPicPr>
+            <a:picLocks noChangeAspect="1"/>
+          </p:cNvPicPr>
+          <p:nvPr/>
+        </p:nvPicPr>
+        <p:blipFill>
+          <a:blip r:embed="rId7">
+            <a:extLst>
+              <a:ext uri="{28A0092B-C50C-407E-A947-70E740481C1C}">
+                <a14:useLocalDpi xmlns:a14="http://schemas.microsoft.com/office/drawing/2010/main" val="0"/>
+              </a:ext>
+            </a:extLst>
+          </a:blip>
+          <a:stretch>
+            <a:fillRect/>
+          </a:stretch>
+        </p:blipFill>
+        <p:spPr>
+          <a:xfrm>
+            <a:off x="1101005" y="3782375"/>
+            <a:ext cx="2629999" cy="1623288"/>
+          </a:xfrm>
+          <a:prstGeom prst="rect">
+            <a:avLst/>
+          </a:prstGeom>
+          <a:ln w="38100" cap="sq">
+            <a:solidFill>
+              <a:srgbClr val="000000"/>
+            </a:solidFill>
+            <a:prstDash val="solid"/>
+            <a:miter lim="800000"/>
+          </a:ln>
+          <a:effectLst>
+            <a:outerShdw blurRad="50800" dist="38100" dir="2700000" algn="tl" rotWithShape="0">
+              <a:srgbClr val="000000">
+                <a:alpha val="43000"/>
+              </a:srgbClr>
+            </a:outerShdw>
+          </a:effectLst>
+        </p:spPr>
+      </p:pic>
+    </p:spTree>
+    <p:extLst>
+      <p:ext uri="{BB962C8B-B14F-4D97-AF65-F5344CB8AC3E}">
+        <p14:creationId xmlns:p14="http://schemas.microsoft.com/office/powerpoint/2010/main" val="3335954189"/>
+      </p:ext>
+    </p:extLst>
+  </p:cSld>
+  <p:clrMapOvr>
+    <a:masterClrMapping/>
+  </p:clrMapOvr>
+  <p:timing>
+    <p:tnLst>
+      <p:par>
+        <p:cTn id="1" dur="indefinite" restart="never" nodeType="tmRoot"/>
+      </p:par>
+    </p:tnLst>
+  </p:timing>
+</p:sld>
+</file>
+
+<file path=ppt/slides/slide7.xml><?xml version="1.0" encoding="utf-8"?>
+<p:sld xmlns:a="http://schemas.openxmlformats.org/drawingml/2006/main" xmlns:r="http://schemas.openxmlformats.org/officeDocument/2006/relationships" xmlns:p="http://schemas.openxmlformats.org/presentationml/2006/main">
+  <p:cSld>
+    <p:spTree>
+      <p:nvGrpSpPr>
+        <p:cNvPr id="1" name=""/>
+        <p:cNvGrpSpPr/>
+        <p:nvPr/>
+      </p:nvGrpSpPr>
+      <p:grpSpPr>
+        <a:xfrm>
+          <a:off x="0" y="0"/>
+          <a:ext cx="0" cy="0"/>
+          <a:chOff x="0" y="0"/>
+          <a:chExt cx="0" cy="0"/>
+        </a:xfrm>
+      </p:grpSpPr>
+      <p:sp>
+        <p:nvSpPr>
+          <p:cNvPr id="2" name="Текстово поле 1">
+            <a:extLst>
+              <a:ext uri="{FF2B5EF4-FFF2-40B4-BE49-F238E27FC236}">
+                <a16:creationId xmlns:a16="http://schemas.microsoft.com/office/drawing/2014/main" xmlns="" id="{F6739BB3-2EA5-48AF-B37D-A3A4F9940362}"/>
               </a:ext>
             </a:extLst>
           </p:cNvPr>
@@ -8197,7 +9150,7 @@
           <p:cNvPr id="4" name="Картина 4">
             <a:extLst>
               <a:ext uri="{FF2B5EF4-FFF2-40B4-BE49-F238E27FC236}">
-                <a16:creationId xmlns:a16="http://schemas.microsoft.com/office/drawing/2014/main" id="{11D7D10B-36D6-4264-A1B4-0FF1E422751F}"/>
+                <a16:creationId xmlns:a16="http://schemas.microsoft.com/office/drawing/2014/main" xmlns="" id="{11D7D10B-36D6-4264-A1B4-0FF1E422751F}"/>
               </a:ext>
             </a:extLst>
           </p:cNvPr>
@@ -8227,7 +9180,7 @@
           <p:cNvPr id="6" name="Картина 6">
             <a:extLst>
               <a:ext uri="{FF2B5EF4-FFF2-40B4-BE49-F238E27FC236}">
-                <a16:creationId xmlns:a16="http://schemas.microsoft.com/office/drawing/2014/main" id="{072FD017-1F94-41B9-B3DE-7C3658F8F91F}"/>
+                <a16:creationId xmlns:a16="http://schemas.microsoft.com/office/drawing/2014/main" xmlns="" id="{072FD017-1F94-41B9-B3DE-7C3658F8F91F}"/>
               </a:ext>
             </a:extLst>
           </p:cNvPr>
@@ -8257,7 +9210,7 @@
           <p:cNvPr id="7" name="Картина 7">
             <a:extLst>
               <a:ext uri="{FF2B5EF4-FFF2-40B4-BE49-F238E27FC236}">
-                <a16:creationId xmlns:a16="http://schemas.microsoft.com/office/drawing/2014/main" id="{9FEB4DFD-ED35-4AD2-90DB-8215E25AAFD7}"/>
+                <a16:creationId xmlns:a16="http://schemas.microsoft.com/office/drawing/2014/main" xmlns="" id="{9FEB4DFD-ED35-4AD2-90DB-8215E25AAFD7}"/>
               </a:ext>
             </a:extLst>
           </p:cNvPr>
@@ -8287,7 +9240,7 @@
           <p:cNvPr id="8" name="Картина 8">
             <a:extLst>
               <a:ext uri="{FF2B5EF4-FFF2-40B4-BE49-F238E27FC236}">
-                <a16:creationId xmlns:a16="http://schemas.microsoft.com/office/drawing/2014/main" id="{EF991951-F14F-42D5-ABE4-6C7D6B23750A}"/>
+                <a16:creationId xmlns:a16="http://schemas.microsoft.com/office/drawing/2014/main" xmlns="" id="{EF991951-F14F-42D5-ABE4-6C7D6B23750A}"/>
               </a:ext>
             </a:extLst>
           </p:cNvPr>
@@ -8317,7 +9270,7 @@
           <p:cNvPr id="9" name="Картина 9">
             <a:extLst>
               <a:ext uri="{FF2B5EF4-FFF2-40B4-BE49-F238E27FC236}">
-                <a16:creationId xmlns:a16="http://schemas.microsoft.com/office/drawing/2014/main" id="{04BA4758-2497-45A6-BF0D-B7E2A254C420}"/>
+                <a16:creationId xmlns:a16="http://schemas.microsoft.com/office/drawing/2014/main" xmlns="" id="{04BA4758-2497-45A6-BF0D-B7E2A254C420}"/>
               </a:ext>
             </a:extLst>
           </p:cNvPr>
@@ -8347,7 +9300,7 @@
           <p:cNvPr id="13" name="Картина 13">
             <a:extLst>
               <a:ext uri="{FF2B5EF4-FFF2-40B4-BE49-F238E27FC236}">
-                <a16:creationId xmlns:a16="http://schemas.microsoft.com/office/drawing/2014/main" id="{FA1458E0-54F7-4930-AE44-19AB040CC70A}"/>
+                <a16:creationId xmlns:a16="http://schemas.microsoft.com/office/drawing/2014/main" xmlns="" id="{FA1458E0-54F7-4930-AE44-19AB040CC70A}"/>
               </a:ext>
             </a:extLst>
           </p:cNvPr>
@@ -8378,7 +9331,7 @@
             <a:hlinkClick r:id="" action="ppaction://media"/>
             <a:extLst>
               <a:ext uri="{FF2B5EF4-FFF2-40B4-BE49-F238E27FC236}">
-                <a16:creationId xmlns:a16="http://schemas.microsoft.com/office/drawing/2014/main" id="{E786ADEE-D86B-4E69-9F75-8ABD19B810F0}"/>
+                <a16:creationId xmlns:a16="http://schemas.microsoft.com/office/drawing/2014/main" xmlns="" id="{E786ADEE-D86B-4E69-9F75-8ABD19B810F0}"/>
               </a:ext>
             </a:extLst>
           </p:cNvPr>
@@ -8510,7 +9463,7 @@
 </p:sld>
 </file>
 
-<file path=ppt/slides/slide7.xml><?xml version="1.0" encoding="utf-8"?>
+<file path=ppt/slides/slide8.xml><?xml version="1.0" encoding="utf-8"?>
 <p:sld xmlns:a="http://schemas.openxmlformats.org/drawingml/2006/main" xmlns:r="http://schemas.openxmlformats.org/officeDocument/2006/relationships" xmlns:p="http://schemas.openxmlformats.org/presentationml/2006/main">
   <p:cSld>
     <p:bg>
@@ -8540,10 +9493,10 @@
           <p:cNvPr id="37" name="Group 36">
             <a:extLst>
               <a:ext uri="{FF2B5EF4-FFF2-40B4-BE49-F238E27FC236}">
-                <a16:creationId xmlns:a16="http://schemas.microsoft.com/office/drawing/2014/main" id="{9D9D6BF1-DFF2-4526-9D13-BF339D8C4163}"/>
+                <a16:creationId xmlns:a16="http://schemas.microsoft.com/office/drawing/2014/main" xmlns="" id="{9D9D6BF1-DFF2-4526-9D13-BF339D8C4163}"/>
               </a:ext>
               <a:ext uri="{C183D7F6-B498-43B3-948B-1728B52AA6E4}">
-                <adec:decorative xmlns:adec="http://schemas.microsoft.com/office/drawing/2017/decorative" val="1"/>
+                <adec:decorative xmlns:adec="http://schemas.microsoft.com/office/drawing/2017/decorative" xmlns="" val="1"/>
               </a:ext>
             </a:extLst>
           </p:cNvPr>
@@ -8553,7 +9506,7 @@
           <p:nvPr>
             <p:extLst>
               <p:ext uri="{386F3935-93C4-4BCD-93E2-E3B085C9AB24}">
-                <p16:designElem xmlns:p16="http://schemas.microsoft.com/office/powerpoint/2015/main" val="1"/>
+                <p16:designElem xmlns:p16="http://schemas.microsoft.com/office/powerpoint/2015/main" xmlns="" val="1"/>
               </p:ext>
             </p:extLst>
           </p:nvPr>
@@ -8571,10 +9524,10 @@
             <p:cNvPr id="38" name="Freeform 6">
               <a:extLst>
                 <a:ext uri="{FF2B5EF4-FFF2-40B4-BE49-F238E27FC236}">
-                  <a16:creationId xmlns:a16="http://schemas.microsoft.com/office/drawing/2014/main" id="{A54D4DB6-FB18-4CAE-8905-E0053C92569E}"/>
+                  <a16:creationId xmlns:a16="http://schemas.microsoft.com/office/drawing/2014/main" xmlns="" id="{A54D4DB6-FB18-4CAE-8905-E0053C92569E}"/>
                 </a:ext>
                 <a:ext uri="{C183D7F6-B498-43B3-948B-1728B52AA6E4}">
-                  <adec:decorative xmlns:adec="http://schemas.microsoft.com/office/drawing/2017/decorative" val="1"/>
+                  <adec:decorative xmlns:adec="http://schemas.microsoft.com/office/drawing/2017/decorative" xmlns="" val="1"/>
                 </a:ext>
               </a:extLst>
             </p:cNvPr>
@@ -8582,7 +9535,7 @@
             <p:nvPr>
               <p:extLst>
                 <p:ext uri="{386F3935-93C4-4BCD-93E2-E3B085C9AB24}">
-                  <p16:designElem xmlns:p16="http://schemas.microsoft.com/office/powerpoint/2015/main" val="1"/>
+                  <p16:designElem xmlns:p16="http://schemas.microsoft.com/office/powerpoint/2015/main" xmlns="" val="1"/>
                 </p:ext>
               </p:extLst>
             </p:nvPr>
@@ -8642,10 +9595,10 @@
             <p:cNvPr id="39" name="Freeform 6">
               <a:extLst>
                 <a:ext uri="{FF2B5EF4-FFF2-40B4-BE49-F238E27FC236}">
-                  <a16:creationId xmlns:a16="http://schemas.microsoft.com/office/drawing/2014/main" id="{1DBD6488-9429-4FFA-8AE8-C4022C39B0F2}"/>
+                  <a16:creationId xmlns:a16="http://schemas.microsoft.com/office/drawing/2014/main" xmlns="" id="{1DBD6488-9429-4FFA-8AE8-C4022C39B0F2}"/>
                 </a:ext>
                 <a:ext uri="{C183D7F6-B498-43B3-948B-1728B52AA6E4}">
-                  <adec:decorative xmlns:adec="http://schemas.microsoft.com/office/drawing/2017/decorative" val="1"/>
+                  <adec:decorative xmlns:adec="http://schemas.microsoft.com/office/drawing/2017/decorative" xmlns="" val="1"/>
                 </a:ext>
               </a:extLst>
             </p:cNvPr>
@@ -8653,7 +9606,7 @@
             <p:nvPr>
               <p:extLst>
                 <p:ext uri="{386F3935-93C4-4BCD-93E2-E3B085C9AB24}">
-                  <p16:designElem xmlns:p16="http://schemas.microsoft.com/office/powerpoint/2015/main" val="1"/>
+                  <p16:designElem xmlns:p16="http://schemas.microsoft.com/office/powerpoint/2015/main" xmlns="" val="1"/>
                 </p:ext>
               </p:extLst>
             </p:nvPr>
@@ -8716,7 +9669,7 @@
           <p:cNvPr id="2" name="Текстово поле 1">
             <a:extLst>
               <a:ext uri="{FF2B5EF4-FFF2-40B4-BE49-F238E27FC236}">
-                <a16:creationId xmlns:a16="http://schemas.microsoft.com/office/drawing/2014/main" id="{A6424D40-9064-4DFC-8A40-C47E849F4898}"/>
+                <a16:creationId xmlns:a16="http://schemas.microsoft.com/office/drawing/2014/main" xmlns="" id="{A6424D40-9064-4DFC-8A40-C47E849F4898}"/>
               </a:ext>
             </a:extLst>
           </p:cNvPr>
@@ -8771,7 +9724,7 @@
           <p:cNvPr id="3" name="Картина 3">
             <a:extLst>
               <a:ext uri="{FF2B5EF4-FFF2-40B4-BE49-F238E27FC236}">
-                <a16:creationId xmlns:a16="http://schemas.microsoft.com/office/drawing/2014/main" id="{2CC1C5A0-4960-4921-B307-49C0CCF9CC95}"/>
+                <a16:creationId xmlns:a16="http://schemas.microsoft.com/office/drawing/2014/main" xmlns="" id="{2CC1C5A0-4960-4921-B307-49C0CCF9CC95}"/>
               </a:ext>
             </a:extLst>
           </p:cNvPr>
@@ -8812,7 +9765,7 @@
 </p:sld>
 </file>
 
-<file path=ppt/slides/slide8.xml><?xml version="1.0" encoding="utf-8"?>
+<file path=ppt/slides/slide9.xml><?xml version="1.0" encoding="utf-8"?>
 <p:sld xmlns:a="http://schemas.openxmlformats.org/drawingml/2006/main" xmlns:r="http://schemas.openxmlformats.org/officeDocument/2006/relationships" xmlns:p="http://schemas.openxmlformats.org/presentationml/2006/main">
   <p:cSld>
     <p:bg>
@@ -8842,7 +9795,7 @@
           <p:cNvPr id="2" name="Картина 2">
             <a:extLst>
               <a:ext uri="{FF2B5EF4-FFF2-40B4-BE49-F238E27FC236}">
-                <a16:creationId xmlns:a16="http://schemas.microsoft.com/office/drawing/2014/main" id="{E81AB0D2-F5F4-42F4-81EA-E2AE1D0F8BEC}"/>
+                <a16:creationId xmlns:a16="http://schemas.microsoft.com/office/drawing/2014/main" xmlns="" id="{E81AB0D2-F5F4-42F4-81EA-E2AE1D0F8BEC}"/>
               </a:ext>
             </a:extLst>
           </p:cNvPr>
@@ -8871,7 +9824,7 @@
           <p:cNvPr id="3" name="Текстово поле 2">
             <a:extLst>
               <a:ext uri="{FF2B5EF4-FFF2-40B4-BE49-F238E27FC236}">
-                <a16:creationId xmlns:a16="http://schemas.microsoft.com/office/drawing/2014/main" id="{8DA100FE-4FF6-438E-B035-2018E206D794}"/>
+                <a16:creationId xmlns:a16="http://schemas.microsoft.com/office/drawing/2014/main" xmlns="" id="{8DA100FE-4FF6-438E-B035-2018E206D794}"/>
               </a:ext>
             </a:extLst>
           </p:cNvPr>
@@ -8911,7 +9864,7 @@
           <p:cNvPr id="6" name="Контейнер за съдържание 2">
             <a:extLst>
               <a:ext uri="{FF2B5EF4-FFF2-40B4-BE49-F238E27FC236}">
-                <a16:creationId xmlns:a16="http://schemas.microsoft.com/office/drawing/2014/main" id="{1985DDA9-46D3-42F4-9413-6486DCB0A117}"/>
+                <a16:creationId xmlns:a16="http://schemas.microsoft.com/office/drawing/2014/main" xmlns="" id="{1985DDA9-46D3-42F4-9413-6486DCB0A117}"/>
               </a:ext>
             </a:extLst>
           </p:cNvPr>
@@ -9216,7 +10169,7 @@
             <a:hlinkClick r:id="" action="ppaction://media"/>
             <a:extLst>
               <a:ext uri="{FF2B5EF4-FFF2-40B4-BE49-F238E27FC236}">
-                <a16:creationId xmlns:a16="http://schemas.microsoft.com/office/drawing/2014/main" id="{943A79AB-5EE4-456C-A3CD-95EBACFF7951}"/>
+                <a16:creationId xmlns:a16="http://schemas.microsoft.com/office/drawing/2014/main" xmlns="" id="{943A79AB-5EE4-456C-A3CD-95EBACFF7951}"/>
               </a:ext>
             </a:extLst>
           </p:cNvPr>
@@ -9348,627 +10301,6 @@
 </p:sld>
 </file>
 
-<file path=ppt/slides/slide9.xml><?xml version="1.0" encoding="utf-8"?>
-<p:sld xmlns:a="http://schemas.openxmlformats.org/drawingml/2006/main" xmlns:r="http://schemas.openxmlformats.org/officeDocument/2006/relationships" xmlns:p="http://schemas.openxmlformats.org/presentationml/2006/main">
-  <p:cSld>
-    <p:bg>
-      <p:bgPr>
-        <a:solidFill>
-          <a:schemeClr val="bg2"/>
-        </a:solidFill>
-        <a:effectLst/>
-      </p:bgPr>
-    </p:bg>
-    <p:spTree>
-      <p:nvGrpSpPr>
-        <p:cNvPr id="1" name=""/>
-        <p:cNvGrpSpPr/>
-        <p:nvPr/>
-      </p:nvGrpSpPr>
-      <p:grpSpPr>
-        <a:xfrm>
-          <a:off x="0" y="0"/>
-          <a:ext cx="0" cy="0"/>
-          <a:chOff x="0" y="0"/>
-          <a:chExt cx="0" cy="0"/>
-        </a:xfrm>
-      </p:grpSpPr>
-      <p:grpSp>
-        <p:nvGrpSpPr>
-          <p:cNvPr id="23" name="Group 22">
-            <a:extLst>
-              <a:ext uri="{FF2B5EF4-FFF2-40B4-BE49-F238E27FC236}">
-                <a16:creationId xmlns:a16="http://schemas.microsoft.com/office/drawing/2014/main" id="{449BC34D-9C23-4D6D-8213-1F471AF85B3F}"/>
-              </a:ext>
-              <a:ext uri="{C183D7F6-B498-43B3-948B-1728B52AA6E4}">
-                <adec:decorative xmlns:adec="http://schemas.microsoft.com/office/drawing/2017/decorative" val="1"/>
-              </a:ext>
-            </a:extLst>
-          </p:cNvPr>
-          <p:cNvGrpSpPr>
-            <a:grpSpLocks noGrp="1" noUngrp="1" noRot="1" noChangeAspect="1" noMove="1" noResize="1"/>
-          </p:cNvGrpSpPr>
-          <p:nvPr>
-            <p:extLst>
-              <p:ext uri="{386F3935-93C4-4BCD-93E2-E3B085C9AB24}">
-                <p16:designElem xmlns:p16="http://schemas.microsoft.com/office/powerpoint/2015/main" val="1"/>
-              </p:ext>
-            </p:extLst>
-          </p:nvPr>
-        </p:nvGrpSpPr>
-        <p:grpSpPr>
-          <a:xfrm>
-            <a:off x="752858" y="744469"/>
-            <a:ext cx="10674117" cy="5349671"/>
-            <a:chOff x="752858" y="744469"/>
-            <a:chExt cx="10674117" cy="5349671"/>
-          </a:xfrm>
-        </p:grpSpPr>
-        <p:sp>
-          <p:nvSpPr>
-            <p:cNvPr id="24" name="Freeform 6">
-              <a:extLst>
-                <a:ext uri="{FF2B5EF4-FFF2-40B4-BE49-F238E27FC236}">
-                  <a16:creationId xmlns:a16="http://schemas.microsoft.com/office/drawing/2014/main" id="{FA0F5D6C-5025-4D7E-82DD-C2C6FDA1E759}"/>
-                </a:ext>
-                <a:ext uri="{C183D7F6-B498-43B3-948B-1728B52AA6E4}">
-                  <adec:decorative xmlns:adec="http://schemas.microsoft.com/office/drawing/2017/decorative" val="1"/>
-                </a:ext>
-              </a:extLst>
-            </p:cNvPr>
-            <p:cNvSpPr/>
-            <p:nvPr>
-              <p:extLst>
-                <p:ext uri="{386F3935-93C4-4BCD-93E2-E3B085C9AB24}">
-                  <p16:designElem xmlns:p16="http://schemas.microsoft.com/office/powerpoint/2015/main" val="1"/>
-                </p:ext>
-              </p:extLst>
-            </p:nvPr>
-          </p:nvSpPr>
-          <p:spPr bwMode="auto">
-            <a:xfrm>
-              <a:off x="8151962" y="1685652"/>
-              <a:ext cx="3275013" cy="4408488"/>
-            </a:xfrm>
-            <a:custGeom>
-              <a:avLst/>
-              <a:gdLst/>
-              <a:ahLst/>
-              <a:cxnLst/>
-              <a:rect l="l" t="t" r="r" b="b"/>
-              <a:pathLst>
-                <a:path w="10000" h="10000">
-                  <a:moveTo>
-                    <a:pt x="8761" y="0"/>
-                  </a:moveTo>
-                  <a:lnTo>
-                    <a:pt x="10000" y="0"/>
-                  </a:lnTo>
-                  <a:lnTo>
-                    <a:pt x="10000" y="10000"/>
-                  </a:lnTo>
-                  <a:lnTo>
-                    <a:pt x="0" y="10000"/>
-                  </a:lnTo>
-                  <a:lnTo>
-                    <a:pt x="0" y="9126"/>
-                  </a:lnTo>
-                  <a:lnTo>
-                    <a:pt x="8761" y="9127"/>
-                  </a:lnTo>
-                  <a:lnTo>
-                    <a:pt x="8761" y="0"/>
-                  </a:lnTo>
-                  <a:close/>
-                </a:path>
-              </a:pathLst>
-            </a:custGeom>
-            <a:solidFill>
-              <a:schemeClr val="tx2"/>
-            </a:solidFill>
-            <a:ln w="0">
-              <a:noFill/>
-              <a:prstDash val="solid"/>
-              <a:round/>
-              <a:headEnd/>
-              <a:tailEnd/>
-            </a:ln>
-          </p:spPr>
-        </p:sp>
-        <p:sp>
-          <p:nvSpPr>
-            <p:cNvPr id="25" name="Freeform 6">
-              <a:extLst>
-                <a:ext uri="{FF2B5EF4-FFF2-40B4-BE49-F238E27FC236}">
-                  <a16:creationId xmlns:a16="http://schemas.microsoft.com/office/drawing/2014/main" id="{E2AF2C17-4AB4-4402-B84B-129EF95D161C}"/>
-                </a:ext>
-                <a:ext uri="{C183D7F6-B498-43B3-948B-1728B52AA6E4}">
-                  <adec:decorative xmlns:adec="http://schemas.microsoft.com/office/drawing/2017/decorative" val="1"/>
-                </a:ext>
-              </a:extLst>
-            </p:cNvPr>
-            <p:cNvSpPr/>
-            <p:nvPr>
-              <p:extLst>
-                <p:ext uri="{386F3935-93C4-4BCD-93E2-E3B085C9AB24}">
-                  <p16:designElem xmlns:p16="http://schemas.microsoft.com/office/powerpoint/2015/main" val="1"/>
-                </p:ext>
-              </p:extLst>
-            </p:nvPr>
-          </p:nvSpPr>
-          <p:spPr bwMode="auto">
-            <a:xfrm flipH="1" flipV="1">
-              <a:off x="752858" y="744469"/>
-              <a:ext cx="3275668" cy="4408488"/>
-            </a:xfrm>
-            <a:custGeom>
-              <a:avLst/>
-              <a:gdLst/>
-              <a:ahLst/>
-              <a:cxnLst/>
-              <a:rect l="l" t="t" r="r" b="b"/>
-              <a:pathLst>
-                <a:path w="10002" h="10000">
-                  <a:moveTo>
-                    <a:pt x="8763" y="0"/>
-                  </a:moveTo>
-                  <a:lnTo>
-                    <a:pt x="10002" y="0"/>
-                  </a:lnTo>
-                  <a:lnTo>
-                    <a:pt x="10002" y="10000"/>
-                  </a:lnTo>
-                  <a:lnTo>
-                    <a:pt x="2" y="10000"/>
-                  </a:lnTo>
-                  <a:cubicBezTo>
-                    <a:pt x="-2" y="9698"/>
-                    <a:pt x="4" y="9427"/>
-                    <a:pt x="0" y="9125"/>
-                  </a:cubicBezTo>
-                  <a:lnTo>
-                    <a:pt x="8763" y="9128"/>
-                  </a:lnTo>
-                  <a:lnTo>
-                    <a:pt x="8763" y="0"/>
-                  </a:lnTo>
-                  <a:close/>
-                </a:path>
-              </a:pathLst>
-            </a:custGeom>
-            <a:solidFill>
-              <a:schemeClr val="tx2"/>
-            </a:solidFill>
-            <a:ln w="0">
-              <a:noFill/>
-              <a:prstDash val="solid"/>
-              <a:round/>
-              <a:headEnd/>
-              <a:tailEnd/>
-            </a:ln>
-          </p:spPr>
-        </p:sp>
-      </p:grpSp>
-      <p:sp useBgFill="1">
-        <p:nvSpPr>
-          <p:cNvPr id="27" name="Rectangle 26">
-            <a:extLst>
-              <a:ext uri="{FF2B5EF4-FFF2-40B4-BE49-F238E27FC236}">
-                <a16:creationId xmlns:a16="http://schemas.microsoft.com/office/drawing/2014/main" id="{5D213B41-AC9B-4E61-BEED-FF4C168A8942}"/>
-              </a:ext>
-              <a:ext uri="{C183D7F6-B498-43B3-948B-1728B52AA6E4}">
-                <adec:decorative xmlns:adec="http://schemas.microsoft.com/office/drawing/2017/decorative" val="1"/>
-              </a:ext>
-            </a:extLst>
-          </p:cNvPr>
-          <p:cNvSpPr>
-            <a:spLocks noGrp="1" noRot="1" noChangeAspect="1" noMove="1" noResize="1" noEditPoints="1" noAdjustHandles="1" noChangeArrowheads="1" noChangeShapeType="1" noTextEdit="1"/>
-          </p:cNvSpPr>
-          <p:nvPr>
-            <p:extLst>
-              <p:ext uri="{386F3935-93C4-4BCD-93E2-E3B085C9AB24}">
-                <p16:designElem xmlns:p16="http://schemas.microsoft.com/office/powerpoint/2015/main" val="1"/>
-              </p:ext>
-            </p:extLst>
-          </p:nvPr>
-        </p:nvSpPr>
-        <p:spPr>
-          <a:xfrm>
-            <a:off x="0" y="0"/>
-            <a:ext cx="12192000" cy="6858000"/>
-          </a:xfrm>
-          <a:prstGeom prst="rect">
-            <a:avLst/>
-          </a:prstGeom>
-          <a:ln>
-            <a:noFill/>
-          </a:ln>
-        </p:spPr>
-        <p:style>
-          <a:lnRef idx="2">
-            <a:schemeClr val="accent1">
-              <a:shade val="50000"/>
-            </a:schemeClr>
-          </a:lnRef>
-          <a:fillRef idx="1001">
-            <a:schemeClr val="lt2"/>
-          </a:fillRef>
-          <a:effectRef idx="0">
-            <a:schemeClr val="accent1"/>
-          </a:effectRef>
-          <a:fontRef idx="minor">
-            <a:schemeClr val="lt1"/>
-          </a:fontRef>
-        </p:style>
-        <p:txBody>
-          <a:bodyPr rtlCol="0" anchor="ctr"/>
-          <a:lstStyle/>
-          <a:p>
-            <a:pPr algn="ctr"/>
-            <a:endParaRPr lang="en-US"/>
-          </a:p>
-        </p:txBody>
-      </p:sp>
-      <p:sp>
-        <p:nvSpPr>
-          <p:cNvPr id="5" name="Заглавие 4">
-            <a:extLst>
-              <a:ext uri="{FF2B5EF4-FFF2-40B4-BE49-F238E27FC236}">
-                <a16:creationId xmlns:a16="http://schemas.microsoft.com/office/drawing/2014/main" id="{080184DB-24D0-47D9-A252-509571819796}"/>
-              </a:ext>
-            </a:extLst>
-          </p:cNvPr>
-          <p:cNvSpPr>
-            <a:spLocks noGrp="1"/>
-          </p:cNvSpPr>
-          <p:nvPr>
-            <p:ph type="title"/>
-          </p:nvPr>
-        </p:nvSpPr>
-        <p:spPr>
-          <a:xfrm>
-            <a:off x="659230" y="1013722"/>
-            <a:ext cx="10869750" cy="1237298"/>
-          </a:xfrm>
-        </p:spPr>
-        <p:txBody>
-          <a:bodyPr vert="horz" lIns="91440" tIns="45720" rIns="91440" bIns="45720" rtlCol="0" anchor="t">
-            <a:normAutofit/>
-          </a:bodyPr>
-          <a:lstStyle/>
-          <a:p>
-            <a:pPr algn="ctr"/>
-            <a:r>
-              <a:rPr lang="en-US" sz="6600" cap="all"/>
-              <a:t>Demonstration</a:t>
-            </a:r>
-          </a:p>
-        </p:txBody>
-      </p:sp>
-      <p:sp>
-        <p:nvSpPr>
-          <p:cNvPr id="29" name="Freeform 6">
-            <a:extLst>
-              <a:ext uri="{FF2B5EF4-FFF2-40B4-BE49-F238E27FC236}">
-                <a16:creationId xmlns:a16="http://schemas.microsoft.com/office/drawing/2014/main" id="{628FBD9F-3B86-4C98-8F77-383320737739}"/>
-              </a:ext>
-              <a:ext uri="{C183D7F6-B498-43B3-948B-1728B52AA6E4}">
-                <adec:decorative xmlns:adec="http://schemas.microsoft.com/office/drawing/2017/decorative" val="1"/>
-              </a:ext>
-            </a:extLst>
-          </p:cNvPr>
-          <p:cNvSpPr>
-            <a:spLocks noGrp="1" noRot="1" noChangeAspect="1" noMove="1" noResize="1" noEditPoints="1" noAdjustHandles="1" noChangeArrowheads="1" noChangeShapeType="1" noTextEdit="1"/>
-          </p:cNvSpPr>
-          <p:nvPr>
-            <p:extLst>
-              <p:ext uri="{386F3935-93C4-4BCD-93E2-E3B085C9AB24}">
-                <p16:designElem xmlns:p16="http://schemas.microsoft.com/office/powerpoint/2015/main" val="1"/>
-              </p:ext>
-            </p:extLst>
-          </p:nvPr>
-        </p:nvSpPr>
-        <p:spPr bwMode="auto">
-          <a:xfrm rot="5400000" flipV="1">
-            <a:off x="8154184" y="2884231"/>
-            <a:ext cx="3005889" cy="4046220"/>
-          </a:xfrm>
-          <a:custGeom>
-            <a:avLst/>
-            <a:gdLst/>
-            <a:ahLst/>
-            <a:cxnLst/>
-            <a:rect l="l" t="t" r="r" b="b"/>
-            <a:pathLst>
-              <a:path w="10000" h="10000">
-                <a:moveTo>
-                  <a:pt x="8761" y="0"/>
-                </a:moveTo>
-                <a:lnTo>
-                  <a:pt x="10000" y="0"/>
-                </a:lnTo>
-                <a:lnTo>
-                  <a:pt x="10000" y="10000"/>
-                </a:lnTo>
-                <a:lnTo>
-                  <a:pt x="0" y="10000"/>
-                </a:lnTo>
-                <a:lnTo>
-                  <a:pt x="0" y="9126"/>
-                </a:lnTo>
-                <a:lnTo>
-                  <a:pt x="8761" y="9127"/>
-                </a:lnTo>
-                <a:lnTo>
-                  <a:pt x="8761" y="0"/>
-                </a:lnTo>
-                <a:close/>
-              </a:path>
-            </a:pathLst>
-          </a:custGeom>
-          <a:solidFill>
-            <a:schemeClr val="tx2">
-              <a:alpha val="90000"/>
-            </a:schemeClr>
-          </a:solidFill>
-          <a:ln w="0">
-            <a:noFill/>
-            <a:prstDash val="solid"/>
-            <a:round/>
-            <a:headEnd/>
-            <a:tailEnd/>
-          </a:ln>
-        </p:spPr>
-        <p:txBody>
-          <a:bodyPr/>
-          <a:lstStyle/>
-          <a:p>
-            <a:endParaRPr lang="en-US" dirty="0"/>
-          </a:p>
-        </p:txBody>
-      </p:sp>
-      <p:pic>
-        <p:nvPicPr>
-          <p:cNvPr id="3" name="Картина 3">
-            <a:extLst>
-              <a:ext uri="{FF2B5EF4-FFF2-40B4-BE49-F238E27FC236}">
-                <a16:creationId xmlns:a16="http://schemas.microsoft.com/office/drawing/2014/main" id="{992BC8AB-2AAD-4D37-81C9-761CC7B9E6F1}"/>
-              </a:ext>
-            </a:extLst>
-          </p:cNvPr>
-          <p:cNvPicPr>
-            <a:picLocks noChangeAspect="1"/>
-          </p:cNvPicPr>
-          <p:nvPr/>
-        </p:nvPicPr>
-        <p:blipFill>
-          <a:blip r:embed="rId4"/>
-          <a:stretch>
-            <a:fillRect/>
-          </a:stretch>
-        </p:blipFill>
-        <p:spPr>
-          <a:xfrm>
-            <a:off x="1485384" y="3056705"/>
-            <a:ext cx="9488571" cy="2812781"/>
-          </a:xfrm>
-          <a:prstGeom prst="rect">
-            <a:avLst/>
-          </a:prstGeom>
-        </p:spPr>
-      </p:pic>
-      <p:sp>
-        <p:nvSpPr>
-          <p:cNvPr id="31" name="Freeform 6">
-            <a:extLst>
-              <a:ext uri="{FF2B5EF4-FFF2-40B4-BE49-F238E27FC236}">
-                <a16:creationId xmlns:a16="http://schemas.microsoft.com/office/drawing/2014/main" id="{6283F864-E3D1-457B-865A-DDC32254D987}"/>
-              </a:ext>
-              <a:ext uri="{C183D7F6-B498-43B3-948B-1728B52AA6E4}">
-                <adec:decorative xmlns:adec="http://schemas.microsoft.com/office/drawing/2017/decorative" val="1"/>
-              </a:ext>
-            </a:extLst>
-          </p:cNvPr>
-          <p:cNvSpPr>
-            <a:spLocks noGrp="1" noRot="1" noChangeAspect="1" noMove="1" noResize="1" noEditPoints="1" noAdjustHandles="1" noChangeArrowheads="1" noChangeShapeType="1" noTextEdit="1"/>
-          </p:cNvSpPr>
-          <p:nvPr>
-            <p:extLst>
-              <p:ext uri="{386F3935-93C4-4BCD-93E2-E3B085C9AB24}">
-                <p16:designElem xmlns:p16="http://schemas.microsoft.com/office/powerpoint/2015/main" val="1"/>
-              </p:ext>
-            </p:extLst>
-          </p:nvPr>
-        </p:nvSpPr>
-        <p:spPr bwMode="auto">
-          <a:xfrm rot="5400000" flipH="1">
-            <a:off x="1080808" y="1936677"/>
-            <a:ext cx="3006491" cy="4046220"/>
-          </a:xfrm>
-          <a:custGeom>
-            <a:avLst/>
-            <a:gdLst/>
-            <a:ahLst/>
-            <a:cxnLst/>
-            <a:rect l="l" t="t" r="r" b="b"/>
-            <a:pathLst>
-              <a:path w="10002" h="10000">
-                <a:moveTo>
-                  <a:pt x="8763" y="0"/>
-                </a:moveTo>
-                <a:lnTo>
-                  <a:pt x="10002" y="0"/>
-                </a:lnTo>
-                <a:lnTo>
-                  <a:pt x="10002" y="10000"/>
-                </a:lnTo>
-                <a:lnTo>
-                  <a:pt x="2" y="10000"/>
-                </a:lnTo>
-                <a:cubicBezTo>
-                  <a:pt x="-2" y="9698"/>
-                  <a:pt x="4" y="9427"/>
-                  <a:pt x="0" y="9125"/>
-                </a:cubicBezTo>
-                <a:lnTo>
-                  <a:pt x="8763" y="9128"/>
-                </a:lnTo>
-                <a:lnTo>
-                  <a:pt x="8763" y="0"/>
-                </a:lnTo>
-                <a:close/>
-              </a:path>
-            </a:pathLst>
-          </a:custGeom>
-          <a:solidFill>
-            <a:schemeClr val="tx2">
-              <a:alpha val="90000"/>
-            </a:schemeClr>
-          </a:solidFill>
-          <a:ln w="0">
-            <a:noFill/>
-            <a:prstDash val="solid"/>
-            <a:round/>
-            <a:headEnd/>
-            <a:tailEnd/>
-          </a:ln>
-        </p:spPr>
-      </p:sp>
-      <p:pic>
-        <p:nvPicPr>
-          <p:cNvPr id="2" name="Slide 9">
-            <a:hlinkClick r:id="" action="ppaction://media"/>
-            <a:extLst>
-              <a:ext uri="{FF2B5EF4-FFF2-40B4-BE49-F238E27FC236}">
-                <a16:creationId xmlns:a16="http://schemas.microsoft.com/office/drawing/2014/main" id="{55F729BA-9F1B-45AA-B2F5-CD5FC8E79040}"/>
-              </a:ext>
-            </a:extLst>
-          </p:cNvPr>
-          <p:cNvPicPr>
-            <a:picLocks noChangeAspect="1"/>
-          </p:cNvPicPr>
-          <p:nvPr>
-            <a:audioFile r:link="rId2"/>
-            <p:extLst>
-              <p:ext uri="{DAA4B4D4-6D71-4841-9C94-3DE7FCFB9230}">
-                <p14:media xmlns:p14="http://schemas.microsoft.com/office/powerpoint/2010/main" r:embed="rId1"/>
-              </p:ext>
-            </p:extLst>
-          </p:nvPr>
-        </p:nvPicPr>
-        <p:blipFill>
-          <a:blip r:embed="rId5"/>
-          <a:stretch>
-            <a:fillRect/>
-          </a:stretch>
-        </p:blipFill>
-        <p:spPr>
-          <a:xfrm>
-            <a:off x="11224180" y="6094140"/>
-            <a:ext cx="609600" cy="609600"/>
-          </a:xfrm>
-          <a:prstGeom prst="rect">
-            <a:avLst/>
-          </a:prstGeom>
-        </p:spPr>
-      </p:pic>
-    </p:spTree>
-    <p:extLst>
-      <p:ext uri="{BB962C8B-B14F-4D97-AF65-F5344CB8AC3E}">
-        <p14:creationId xmlns:p14="http://schemas.microsoft.com/office/powerpoint/2010/main" val="796806462"/>
-      </p:ext>
-    </p:extLst>
-  </p:cSld>
-  <p:clrMapOvr>
-    <a:overrideClrMapping bg1="dk1" tx1="lt1" bg2="dk2" tx2="lt2" accent1="accent1" accent2="accent2" accent3="accent3" accent4="accent4" accent5="accent5" accent6="accent6" hlink="hlink" folHlink="folHlink"/>
-  </p:clrMapOvr>
-  <p:timing>
-    <p:tnLst>
-      <p:par>
-        <p:cTn id="1" dur="indefinite" restart="never" nodeType="tmRoot">
-          <p:childTnLst>
-            <p:seq concurrent="1" nextAc="seek">
-              <p:cTn id="2" dur="indefinite" nodeType="mainSeq">
-                <p:childTnLst>
-                  <p:par>
-                    <p:cTn id="3" fill="hold">
-                      <p:stCondLst>
-                        <p:cond delay="indefinite"/>
-                      </p:stCondLst>
-                      <p:childTnLst>
-                        <p:par>
-                          <p:cTn id="4" fill="hold">
-                            <p:stCondLst>
-                              <p:cond delay="0"/>
-                            </p:stCondLst>
-                            <p:childTnLst>
-                              <p:par>
-                                <p:cTn id="5" presetID="1" presetClass="mediacall" presetSubtype="0" fill="hold" nodeType="clickEffect">
-                                  <p:stCondLst>
-                                    <p:cond delay="0"/>
-                                  </p:stCondLst>
-                                  <p:childTnLst>
-                                    <p:cmd type="call" cmd="playFrom(0.0)">
-                                      <p:cBhvr>
-                                        <p:cTn id="6" dur="4770" fill="hold"/>
-                                        <p:tgtEl>
-                                          <p:spTgt spid="2"/>
-                                        </p:tgtEl>
-                                      </p:cBhvr>
-                                    </p:cmd>
-                                  </p:childTnLst>
-                                </p:cTn>
-                              </p:par>
-                            </p:childTnLst>
-                          </p:cTn>
-                        </p:par>
-                      </p:childTnLst>
-                    </p:cTn>
-                  </p:par>
-                </p:childTnLst>
-              </p:cTn>
-              <p:prevCondLst>
-                <p:cond evt="onPrev" delay="0">
-                  <p:tgtEl>
-                    <p:sldTgt/>
-                  </p:tgtEl>
-                </p:cond>
-              </p:prevCondLst>
-              <p:nextCondLst>
-                <p:cond evt="onNext" delay="0">
-                  <p:tgtEl>
-                    <p:sldTgt/>
-                  </p:tgtEl>
-                </p:cond>
-              </p:nextCondLst>
-            </p:seq>
-            <p:audio>
-              <p:cMediaNode vol="80000">
-                <p:cTn id="7" fill="hold" display="0">
-                  <p:stCondLst>
-                    <p:cond delay="indefinite"/>
-                  </p:stCondLst>
-                  <p:endCondLst>
-                    <p:cond evt="onStopAudio" delay="0">
-                      <p:tgtEl>
-                        <p:sldTgt/>
-                      </p:tgtEl>
-                    </p:cond>
-                  </p:endCondLst>
-                </p:cTn>
-                <p:tgtEl>
-                  <p:spTgt spid="2"/>
-                </p:tgtEl>
-              </p:cMediaNode>
-            </p:audio>
-          </p:childTnLst>
-        </p:cTn>
-      </p:par>
-    </p:tnLst>
-  </p:timing>
-</p:sld>
-</file>
-
 <file path=ppt/theme/theme1.xml><?xml version="1.0" encoding="utf-8"?>
 <a:theme xmlns:a="http://schemas.openxmlformats.org/drawingml/2006/main" name="Изрязване">
   <a:themeElements>
@@ -10012,7 +10344,7 @@
     </a:clrScheme>
     <a:fontScheme name="Crop">
       <a:majorFont>
-        <a:latin typeface="Franklin Gothic Book" panose="020B0503020102020204"/>
+        <a:latin typeface="Franklin Gothic Book"/>
         <a:ea typeface=""/>
         <a:cs typeface=""/>
         <a:font script="Jpan" typeface="メイリオ"/>
@@ -10047,7 +10379,7 @@
         <a:font script="Geor" typeface="Sylfaen"/>
       </a:majorFont>
       <a:minorFont>
-        <a:latin typeface="Franklin Gothic Book" panose="020B0503020102020204"/>
+        <a:latin typeface="Franklin Gothic Book"/>
         <a:ea typeface=""/>
         <a:cs typeface=""/>
         <a:font script="Jpan" typeface="メイリオ"/>
@@ -10221,7 +10553,7 @@
   <a:extraClrSchemeLst/>
   <a:extLst>
     <a:ext uri="{05A4C25C-085E-4340-85A3-A5531E510DB2}">
-      <thm15:themeFamily xmlns:thm15="http://schemas.microsoft.com/office/thememl/2012/main" name="Crop" id="{EC9488ED-E761-4D60-9AC4-764D1FE2C171}" vid="{CE19780C-D67D-4C13-9DE9-A52BC3BA51B4}"/>
+      <thm15:themeFamily xmlns:thm15="http://schemas.microsoft.com/office/thememl/2012/main" xmlns="" name="Crop" id="{EC9488ED-E761-4D60-9AC4-764D1FE2C171}" vid="{CE19780C-D67D-4C13-9DE9-A52BC3BA51B4}"/>
     </a:ext>
   </a:extLst>
 </a:theme>
@@ -10270,7 +10602,7 @@
     </a:clrScheme>
     <a:fontScheme name="Оffice">
       <a:majorFont>
-        <a:latin typeface="Calibri Light" panose="020F0302020204030204"/>
+        <a:latin typeface="Calibri Light"/>
         <a:ea typeface=""/>
         <a:cs typeface=""/>
         <a:font script="Jpan" typeface="游ゴシック Light"/>
@@ -10322,7 +10654,7 @@
         <a:font script="Tfng" typeface="Ebrima"/>
       </a:majorFont>
       <a:minorFont>
-        <a:latin typeface="Calibri" panose="020F0502020204030204"/>
+        <a:latin typeface="Calibri"/>
         <a:ea typeface=""/>
         <a:cs typeface=""/>
         <a:font script="Jpan" typeface="游ゴシック"/>
@@ -10516,7 +10848,7 @@
   <a:extraClrSchemeLst/>
   <a:extLst>
     <a:ext uri="{05A4C25C-085E-4340-85A3-A5531E510DB2}">
-      <thm15:themeFamily xmlns:thm15="http://schemas.microsoft.com/office/thememl/2012/main" name="Office Theme" id="{62F939B6-93AF-4DB8-9C6B-D6C7DFDC589F}" vid="{4A3C46E8-61CC-4603-A589-7422A47A8E4A}"/>
+      <thm15:themeFamily xmlns:thm15="http://schemas.microsoft.com/office/thememl/2012/main" xmlns="" name="Office Theme" id="{62F939B6-93AF-4DB8-9C6B-D6C7DFDC589F}" vid="{4A3C46E8-61CC-4603-A589-7422A47A8E4A}"/>
     </a:ext>
   </a:extLst>
 </a:theme>
@@ -10565,7 +10897,7 @@
     </a:clrScheme>
     <a:fontScheme name="Оffice">
       <a:majorFont>
-        <a:latin typeface="Calibri Light" panose="020F0302020204030204"/>
+        <a:latin typeface="Calibri Light"/>
         <a:ea typeface=""/>
         <a:cs typeface=""/>
         <a:font script="Jpan" typeface="游ゴシック Light"/>
@@ -10617,7 +10949,7 @@
         <a:font script="Tfng" typeface="Ebrima"/>
       </a:majorFont>
       <a:minorFont>
-        <a:latin typeface="Calibri" panose="020F0502020204030204"/>
+        <a:latin typeface="Calibri"/>
         <a:ea typeface=""/>
         <a:cs typeface=""/>
         <a:font script="Jpan" typeface="游ゴシック"/>
@@ -10811,7 +11143,7 @@
   <a:extraClrSchemeLst/>
   <a:extLst>
     <a:ext uri="{05A4C25C-085E-4340-85A3-A5531E510DB2}">
-      <thm15:themeFamily xmlns:thm15="http://schemas.microsoft.com/office/thememl/2012/main" name="Office Theme" id="{62F939B6-93AF-4DB8-9C6B-D6C7DFDC589F}" vid="{4A3C46E8-61CC-4603-A589-7422A47A8E4A}"/>
+      <thm15:themeFamily xmlns:thm15="http://schemas.microsoft.com/office/thememl/2012/main" xmlns="" name="Office Theme" id="{62F939B6-93AF-4DB8-9C6B-D6C7DFDC589F}" vid="{4A3C46E8-61CC-4603-A589-7422A47A8E4A}"/>
     </a:ext>
   </a:extLst>
 </a:theme>

</xml_diff>

<commit_message>
Change audio for presentation
</commit_message>
<xml_diff>
--- a/Documents/Presentation.pptx
+++ b/Documents/Presentation.pptx
@@ -122,10 +122,21 @@
   </p:defaultTextStyle>
   <p:extLst>
     <p:ext uri="{EFAFB233-063F-42B5-8137-9DF3F51BA10A}">
-      <p15:sldGuideLst xmlns:p15="http://schemas.microsoft.com/office/powerpoint/2012/main" xmlns=""/>
+      <p15:sldGuideLst xmlns:p15="http://schemas.microsoft.com/office/powerpoint/2012/main">
+        <p15:guide id="1" orient="horz" pos="2160">
+          <p15:clr>
+            <a:srgbClr val="A4A3A4"/>
+          </p15:clr>
+        </p15:guide>
+        <p15:guide id="2" pos="3840">
+          <p15:clr>
+            <a:srgbClr val="A4A3A4"/>
+          </p15:clr>
+        </p15:guide>
+      </p15:sldGuideLst>
     </p:ext>
     <p:ext uri="{2D200454-40CA-4A62-9FC3-DE9A4176ACB9}">
-      <p15:notesGuideLst xmlns:p15="http://schemas.microsoft.com/office/powerpoint/2012/main" xmlns=""/>
+      <p15:notesGuideLst xmlns:p15="http://schemas.microsoft.com/office/powerpoint/2012/main"/>
     </p:ext>
   </p:extLst>
 </p:presentation>
@@ -166,7 +177,7 @@
           <p:cNvPr id="2" name="Контейнер за горния колонтитул 1">
             <a:extLst>
               <a:ext uri="{FF2B5EF4-FFF2-40B4-BE49-F238E27FC236}">
-                <a16:creationId xmlns:a16="http://schemas.microsoft.com/office/drawing/2014/main" xmlns="" id="{52780DC7-29C5-4D1C-A591-A8445B983E7E}"/>
+                <a16:creationId xmlns:a16="http://schemas.microsoft.com/office/drawing/2014/main" id="{52780DC7-29C5-4D1C-A591-A8445B983E7E}"/>
               </a:ext>
             </a:extLst>
           </p:cNvPr>
@@ -203,7 +214,7 @@
           <p:cNvPr id="3" name="Контейнер за дата 2">
             <a:extLst>
               <a:ext uri="{FF2B5EF4-FFF2-40B4-BE49-F238E27FC236}">
-                <a16:creationId xmlns:a16="http://schemas.microsoft.com/office/drawing/2014/main" xmlns="" id="{F903BD5B-3BDE-4480-9097-863B586A805A}"/>
+                <a16:creationId xmlns:a16="http://schemas.microsoft.com/office/drawing/2014/main" id="{F903BD5B-3BDE-4480-9097-863B586A805A}"/>
               </a:ext>
             </a:extLst>
           </p:cNvPr>
@@ -244,7 +255,7 @@
           <p:cNvPr id="4" name="Контейнер за долния колонтитул 3">
             <a:extLst>
               <a:ext uri="{FF2B5EF4-FFF2-40B4-BE49-F238E27FC236}">
-                <a16:creationId xmlns:a16="http://schemas.microsoft.com/office/drawing/2014/main" xmlns="" id="{DC3C9D59-3132-44B3-AEDE-2AAD1708732B}"/>
+                <a16:creationId xmlns:a16="http://schemas.microsoft.com/office/drawing/2014/main" id="{DC3C9D59-3132-44B3-AEDE-2AAD1708732B}"/>
               </a:ext>
             </a:extLst>
           </p:cNvPr>
@@ -281,7 +292,7 @@
           <p:cNvPr id="5" name="Контейнер за номер на слайда 4">
             <a:extLst>
               <a:ext uri="{FF2B5EF4-FFF2-40B4-BE49-F238E27FC236}">
-                <a16:creationId xmlns:a16="http://schemas.microsoft.com/office/drawing/2014/main" xmlns="" id="{9D924885-1CDA-4412-BB8B-3AE64466F8A0}"/>
+                <a16:creationId xmlns:a16="http://schemas.microsoft.com/office/drawing/2014/main" id="{9D924885-1CDA-4412-BB8B-3AE64466F8A0}"/>
               </a:ext>
             </a:extLst>
           </p:cNvPr>
@@ -4321,7 +4332,7 @@
   </p:txStyles>
   <p:extLst>
     <p:ext uri="{27BBF7A9-308A-43DC-89C8-2F10F3537804}">
-      <p15:sldGuideLst xmlns:p15="http://schemas.microsoft.com/office/powerpoint/2012/main" xmlns="">
+      <p15:sldGuideLst xmlns:p15="http://schemas.microsoft.com/office/powerpoint/2012/main">
         <p15:guide id="3" orient="horz" pos="1368">
           <p15:clr>
             <a:srgbClr val="F26B43"/>
@@ -4398,7 +4409,7 @@
           <p:cNvPr id="2" name="Картина 2" descr="Картина, която съдържа стрелка&#10;&#10;Описанието е генерирано автоматично">
             <a:extLst>
               <a:ext uri="{FF2B5EF4-FFF2-40B4-BE49-F238E27FC236}">
-                <a16:creationId xmlns:a16="http://schemas.microsoft.com/office/drawing/2014/main" xmlns="" id="{C09CAEF5-4716-493E-BB3A-168AF34B34FA}"/>
+                <a16:creationId xmlns:a16="http://schemas.microsoft.com/office/drawing/2014/main" id="{C09CAEF5-4716-493E-BB3A-168AF34B34FA}"/>
               </a:ext>
             </a:extLst>
           </p:cNvPr>
@@ -4427,7 +4438,7 @@
           <p:cNvPr id="4" name="Текстово поле 3">
             <a:extLst>
               <a:ext uri="{FF2B5EF4-FFF2-40B4-BE49-F238E27FC236}">
-                <a16:creationId xmlns:a16="http://schemas.microsoft.com/office/drawing/2014/main" xmlns="" id="{F8904C2E-E7C5-4AD8-B89E-6DAAE8319014}"/>
+                <a16:creationId xmlns:a16="http://schemas.microsoft.com/office/drawing/2014/main" id="{F8904C2E-E7C5-4AD8-B89E-6DAAE8319014}"/>
               </a:ext>
             </a:extLst>
           </p:cNvPr>
@@ -4474,7 +4485,7 @@
             <a:hlinkClick r:id="" action="ppaction://media"/>
             <a:extLst>
               <a:ext uri="{FF2B5EF4-FFF2-40B4-BE49-F238E27FC236}">
-                <a16:creationId xmlns:a16="http://schemas.microsoft.com/office/drawing/2014/main" xmlns="" id="{4821B2A9-105E-4A39-81CD-059670C32F62}"/>
+                <a16:creationId xmlns:a16="http://schemas.microsoft.com/office/drawing/2014/main" id="{4821B2A9-105E-4A39-81CD-059670C32F62}"/>
               </a:ext>
             </a:extLst>
           </p:cNvPr>
@@ -4636,10 +4647,10 @@
           <p:cNvPr id="23" name="Group 22">
             <a:extLst>
               <a:ext uri="{FF2B5EF4-FFF2-40B4-BE49-F238E27FC236}">
-                <a16:creationId xmlns:a16="http://schemas.microsoft.com/office/drawing/2014/main" xmlns="" id="{449BC34D-9C23-4D6D-8213-1F471AF85B3F}"/>
+                <a16:creationId xmlns:a16="http://schemas.microsoft.com/office/drawing/2014/main" id="{449BC34D-9C23-4D6D-8213-1F471AF85B3F}"/>
               </a:ext>
               <a:ext uri="{C183D7F6-B498-43B3-948B-1728B52AA6E4}">
-                <adec:decorative xmlns:adec="http://schemas.microsoft.com/office/drawing/2017/decorative" xmlns="" val="1"/>
+                <adec:decorative xmlns:adec="http://schemas.microsoft.com/office/drawing/2017/decorative" val="1"/>
               </a:ext>
             </a:extLst>
           </p:cNvPr>
@@ -4649,7 +4660,7 @@
           <p:nvPr>
             <p:extLst>
               <p:ext uri="{386F3935-93C4-4BCD-93E2-E3B085C9AB24}">
-                <p16:designElem xmlns:p16="http://schemas.microsoft.com/office/powerpoint/2015/main" xmlns="" val="1"/>
+                <p16:designElem xmlns:p16="http://schemas.microsoft.com/office/powerpoint/2015/main" val="1"/>
               </p:ext>
             </p:extLst>
           </p:nvPr>
@@ -4667,10 +4678,10 @@
             <p:cNvPr id="24" name="Freeform 6">
               <a:extLst>
                 <a:ext uri="{FF2B5EF4-FFF2-40B4-BE49-F238E27FC236}">
-                  <a16:creationId xmlns:a16="http://schemas.microsoft.com/office/drawing/2014/main" xmlns="" id="{FA0F5D6C-5025-4D7E-82DD-C2C6FDA1E759}"/>
+                  <a16:creationId xmlns:a16="http://schemas.microsoft.com/office/drawing/2014/main" id="{FA0F5D6C-5025-4D7E-82DD-C2C6FDA1E759}"/>
                 </a:ext>
                 <a:ext uri="{C183D7F6-B498-43B3-948B-1728B52AA6E4}">
-                  <adec:decorative xmlns:adec="http://schemas.microsoft.com/office/drawing/2017/decorative" xmlns="" val="1"/>
+                  <adec:decorative xmlns:adec="http://schemas.microsoft.com/office/drawing/2017/decorative" val="1"/>
                 </a:ext>
               </a:extLst>
             </p:cNvPr>
@@ -4678,7 +4689,7 @@
             <p:nvPr>
               <p:extLst>
                 <p:ext uri="{386F3935-93C4-4BCD-93E2-E3B085C9AB24}">
-                  <p16:designElem xmlns:p16="http://schemas.microsoft.com/office/powerpoint/2015/main" xmlns="" val="1"/>
+                  <p16:designElem xmlns:p16="http://schemas.microsoft.com/office/powerpoint/2015/main" val="1"/>
                 </p:ext>
               </p:extLst>
             </p:nvPr>
@@ -4738,10 +4749,10 @@
             <p:cNvPr id="25" name="Freeform 6">
               <a:extLst>
                 <a:ext uri="{FF2B5EF4-FFF2-40B4-BE49-F238E27FC236}">
-                  <a16:creationId xmlns:a16="http://schemas.microsoft.com/office/drawing/2014/main" xmlns="" id="{E2AF2C17-4AB4-4402-B84B-129EF95D161C}"/>
+                  <a16:creationId xmlns:a16="http://schemas.microsoft.com/office/drawing/2014/main" id="{E2AF2C17-4AB4-4402-B84B-129EF95D161C}"/>
                 </a:ext>
                 <a:ext uri="{C183D7F6-B498-43B3-948B-1728B52AA6E4}">
-                  <adec:decorative xmlns:adec="http://schemas.microsoft.com/office/drawing/2017/decorative" xmlns="" val="1"/>
+                  <adec:decorative xmlns:adec="http://schemas.microsoft.com/office/drawing/2017/decorative" val="1"/>
                 </a:ext>
               </a:extLst>
             </p:cNvPr>
@@ -4749,7 +4760,7 @@
             <p:nvPr>
               <p:extLst>
                 <p:ext uri="{386F3935-93C4-4BCD-93E2-E3B085C9AB24}">
-                  <p16:designElem xmlns:p16="http://schemas.microsoft.com/office/powerpoint/2015/main" xmlns="" val="1"/>
+                  <p16:designElem xmlns:p16="http://schemas.microsoft.com/office/powerpoint/2015/main" val="1"/>
                 </p:ext>
               </p:extLst>
             </p:nvPr>
@@ -4812,10 +4823,10 @@
           <p:cNvPr id="27" name="Rectangle 26">
             <a:extLst>
               <a:ext uri="{FF2B5EF4-FFF2-40B4-BE49-F238E27FC236}">
-                <a16:creationId xmlns:a16="http://schemas.microsoft.com/office/drawing/2014/main" xmlns="" id="{5D213B41-AC9B-4E61-BEED-FF4C168A8942}"/>
+                <a16:creationId xmlns:a16="http://schemas.microsoft.com/office/drawing/2014/main" id="{5D213B41-AC9B-4E61-BEED-FF4C168A8942}"/>
               </a:ext>
               <a:ext uri="{C183D7F6-B498-43B3-948B-1728B52AA6E4}">
-                <adec:decorative xmlns:adec="http://schemas.microsoft.com/office/drawing/2017/decorative" xmlns="" val="1"/>
+                <adec:decorative xmlns:adec="http://schemas.microsoft.com/office/drawing/2017/decorative" val="1"/>
               </a:ext>
             </a:extLst>
           </p:cNvPr>
@@ -4825,7 +4836,7 @@
           <p:nvPr>
             <p:extLst>
               <p:ext uri="{386F3935-93C4-4BCD-93E2-E3B085C9AB24}">
-                <p16:designElem xmlns:p16="http://schemas.microsoft.com/office/powerpoint/2015/main" xmlns="" val="1"/>
+                <p16:designElem xmlns:p16="http://schemas.microsoft.com/office/powerpoint/2015/main" val="1"/>
               </p:ext>
             </p:extLst>
           </p:nvPr>
@@ -4872,7 +4883,7 @@
           <p:cNvPr id="5" name="Заглавие 4">
             <a:extLst>
               <a:ext uri="{FF2B5EF4-FFF2-40B4-BE49-F238E27FC236}">
-                <a16:creationId xmlns:a16="http://schemas.microsoft.com/office/drawing/2014/main" xmlns="" id="{080184DB-24D0-47D9-A252-509571819796}"/>
+                <a16:creationId xmlns:a16="http://schemas.microsoft.com/office/drawing/2014/main" id="{080184DB-24D0-47D9-A252-509571819796}"/>
               </a:ext>
             </a:extLst>
           </p:cNvPr>
@@ -4908,10 +4919,10 @@
           <p:cNvPr id="29" name="Freeform 6">
             <a:extLst>
               <a:ext uri="{FF2B5EF4-FFF2-40B4-BE49-F238E27FC236}">
-                <a16:creationId xmlns:a16="http://schemas.microsoft.com/office/drawing/2014/main" xmlns="" id="{628FBD9F-3B86-4C98-8F77-383320737739}"/>
+                <a16:creationId xmlns:a16="http://schemas.microsoft.com/office/drawing/2014/main" id="{628FBD9F-3B86-4C98-8F77-383320737739}"/>
               </a:ext>
               <a:ext uri="{C183D7F6-B498-43B3-948B-1728B52AA6E4}">
-                <adec:decorative xmlns:adec="http://schemas.microsoft.com/office/drawing/2017/decorative" xmlns="" val="1"/>
+                <adec:decorative xmlns:adec="http://schemas.microsoft.com/office/drawing/2017/decorative" val="1"/>
               </a:ext>
             </a:extLst>
           </p:cNvPr>
@@ -4921,7 +4932,7 @@
           <p:nvPr>
             <p:extLst>
               <p:ext uri="{386F3935-93C4-4BCD-93E2-E3B085C9AB24}">
-                <p16:designElem xmlns:p16="http://schemas.microsoft.com/office/powerpoint/2015/main" xmlns="" val="1"/>
+                <p16:designElem xmlns:p16="http://schemas.microsoft.com/office/powerpoint/2015/main" val="1"/>
               </p:ext>
             </p:extLst>
           </p:nvPr>
@@ -4990,7 +5001,7 @@
           <p:cNvPr id="3" name="Картина 3">
             <a:extLst>
               <a:ext uri="{FF2B5EF4-FFF2-40B4-BE49-F238E27FC236}">
-                <a16:creationId xmlns:a16="http://schemas.microsoft.com/office/drawing/2014/main" xmlns="" id="{992BC8AB-2AAD-4D37-81C9-761CC7B9E6F1}"/>
+                <a16:creationId xmlns:a16="http://schemas.microsoft.com/office/drawing/2014/main" id="{992BC8AB-2AAD-4D37-81C9-761CC7B9E6F1}"/>
               </a:ext>
             </a:extLst>
           </p:cNvPr>
@@ -5020,10 +5031,10 @@
           <p:cNvPr id="31" name="Freeform 6">
             <a:extLst>
               <a:ext uri="{FF2B5EF4-FFF2-40B4-BE49-F238E27FC236}">
-                <a16:creationId xmlns:a16="http://schemas.microsoft.com/office/drawing/2014/main" xmlns="" id="{6283F864-E3D1-457B-865A-DDC32254D987}"/>
+                <a16:creationId xmlns:a16="http://schemas.microsoft.com/office/drawing/2014/main" id="{6283F864-E3D1-457B-865A-DDC32254D987}"/>
               </a:ext>
               <a:ext uri="{C183D7F6-B498-43B3-948B-1728B52AA6E4}">
-                <adec:decorative xmlns:adec="http://schemas.microsoft.com/office/drawing/2017/decorative" xmlns="" val="1"/>
+                <adec:decorative xmlns:adec="http://schemas.microsoft.com/office/drawing/2017/decorative" val="1"/>
               </a:ext>
             </a:extLst>
           </p:cNvPr>
@@ -5033,7 +5044,7 @@
           <p:nvPr>
             <p:extLst>
               <p:ext uri="{386F3935-93C4-4BCD-93E2-E3B085C9AB24}">
-                <p16:designElem xmlns:p16="http://schemas.microsoft.com/office/powerpoint/2015/main" xmlns="" val="1"/>
+                <p16:designElem xmlns:p16="http://schemas.microsoft.com/office/powerpoint/2015/main" val="1"/>
               </p:ext>
             </p:extLst>
           </p:nvPr>
@@ -5098,7 +5109,7 @@
             <a:hlinkClick r:id="" action="ppaction://media"/>
             <a:extLst>
               <a:ext uri="{FF2B5EF4-FFF2-40B4-BE49-F238E27FC236}">
-                <a16:creationId xmlns:a16="http://schemas.microsoft.com/office/drawing/2014/main" xmlns="" id="{55F729BA-9F1B-45AA-B2F5-CD5FC8E79040}"/>
+                <a16:creationId xmlns:a16="http://schemas.microsoft.com/office/drawing/2014/main" id="{55F729BA-9F1B-45AA-B2F5-CD5FC8E79040}"/>
               </a:ext>
             </a:extLst>
           </p:cNvPr>
@@ -5257,10 +5268,10 @@
           <p:cNvPr id="40" name="Group 42">
             <a:extLst>
               <a:ext uri="{FF2B5EF4-FFF2-40B4-BE49-F238E27FC236}">
-                <a16:creationId xmlns:a16="http://schemas.microsoft.com/office/drawing/2014/main" xmlns="" id="{9D9D6BF1-DFF2-4526-9D13-BF339D8C4163}"/>
+                <a16:creationId xmlns:a16="http://schemas.microsoft.com/office/drawing/2014/main" id="{9D9D6BF1-DFF2-4526-9D13-BF339D8C4163}"/>
               </a:ext>
               <a:ext uri="{C183D7F6-B498-43B3-948B-1728B52AA6E4}">
-                <adec:decorative xmlns:adec="http://schemas.microsoft.com/office/drawing/2017/decorative" xmlns="" val="1"/>
+                <adec:decorative xmlns:adec="http://schemas.microsoft.com/office/drawing/2017/decorative" val="1"/>
               </a:ext>
             </a:extLst>
           </p:cNvPr>
@@ -5270,7 +5281,7 @@
           <p:nvPr>
             <p:extLst>
               <p:ext uri="{386F3935-93C4-4BCD-93E2-E3B085C9AB24}">
-                <p16:designElem xmlns:p16="http://schemas.microsoft.com/office/powerpoint/2015/main" xmlns="" val="1"/>
+                <p16:designElem xmlns:p16="http://schemas.microsoft.com/office/powerpoint/2015/main" val="1"/>
               </p:ext>
             </p:extLst>
           </p:nvPr>
@@ -5288,10 +5299,10 @@
             <p:cNvPr id="44" name="Freeform 6">
               <a:extLst>
                 <a:ext uri="{FF2B5EF4-FFF2-40B4-BE49-F238E27FC236}">
-                  <a16:creationId xmlns:a16="http://schemas.microsoft.com/office/drawing/2014/main" xmlns="" id="{A54D4DB6-FB18-4CAE-8905-E0053C92569E}"/>
+                  <a16:creationId xmlns:a16="http://schemas.microsoft.com/office/drawing/2014/main" id="{A54D4DB6-FB18-4CAE-8905-E0053C92569E}"/>
                 </a:ext>
                 <a:ext uri="{C183D7F6-B498-43B3-948B-1728B52AA6E4}">
-                  <adec:decorative xmlns:adec="http://schemas.microsoft.com/office/drawing/2017/decorative" xmlns="" val="1"/>
+                  <adec:decorative xmlns:adec="http://schemas.microsoft.com/office/drawing/2017/decorative" val="1"/>
                 </a:ext>
               </a:extLst>
             </p:cNvPr>
@@ -5299,7 +5310,7 @@
             <p:nvPr>
               <p:extLst>
                 <p:ext uri="{386F3935-93C4-4BCD-93E2-E3B085C9AB24}">
-                  <p16:designElem xmlns:p16="http://schemas.microsoft.com/office/powerpoint/2015/main" xmlns="" val="1"/>
+                  <p16:designElem xmlns:p16="http://schemas.microsoft.com/office/powerpoint/2015/main" val="1"/>
                 </p:ext>
               </p:extLst>
             </p:nvPr>
@@ -5359,10 +5370,10 @@
             <p:cNvPr id="45" name="Freeform 6">
               <a:extLst>
                 <a:ext uri="{FF2B5EF4-FFF2-40B4-BE49-F238E27FC236}">
-                  <a16:creationId xmlns:a16="http://schemas.microsoft.com/office/drawing/2014/main" xmlns="" id="{1DBD6488-9429-4FFA-8AE8-C4022C39B0F2}"/>
+                  <a16:creationId xmlns:a16="http://schemas.microsoft.com/office/drawing/2014/main" id="{1DBD6488-9429-4FFA-8AE8-C4022C39B0F2}"/>
                 </a:ext>
                 <a:ext uri="{C183D7F6-B498-43B3-948B-1728B52AA6E4}">
-                  <adec:decorative xmlns:adec="http://schemas.microsoft.com/office/drawing/2017/decorative" xmlns="" val="1"/>
+                  <adec:decorative xmlns:adec="http://schemas.microsoft.com/office/drawing/2017/decorative" val="1"/>
                 </a:ext>
               </a:extLst>
             </p:cNvPr>
@@ -5370,7 +5381,7 @@
             <p:nvPr>
               <p:extLst>
                 <p:ext uri="{386F3935-93C4-4BCD-93E2-E3B085C9AB24}">
-                  <p16:designElem xmlns:p16="http://schemas.microsoft.com/office/powerpoint/2015/main" xmlns="" val="1"/>
+                  <p16:designElem xmlns:p16="http://schemas.microsoft.com/office/powerpoint/2015/main" val="1"/>
                 </p:ext>
               </p:extLst>
             </p:nvPr>
@@ -5433,10 +5444,10 @@
           <p:cNvPr id="42" name="Rectangle 46">
             <a:extLst>
               <a:ext uri="{FF2B5EF4-FFF2-40B4-BE49-F238E27FC236}">
-                <a16:creationId xmlns:a16="http://schemas.microsoft.com/office/drawing/2014/main" xmlns="" id="{56C94072-1B34-48FB-9A9C-5A9A0FFC857C}"/>
+                <a16:creationId xmlns:a16="http://schemas.microsoft.com/office/drawing/2014/main" id="{56C94072-1B34-48FB-9A9C-5A9A0FFC857C}"/>
               </a:ext>
               <a:ext uri="{C183D7F6-B498-43B3-948B-1728B52AA6E4}">
-                <adec:decorative xmlns:adec="http://schemas.microsoft.com/office/drawing/2017/decorative" xmlns="" val="1"/>
+                <adec:decorative xmlns:adec="http://schemas.microsoft.com/office/drawing/2017/decorative" val="1"/>
               </a:ext>
             </a:extLst>
           </p:cNvPr>
@@ -5446,7 +5457,7 @@
           <p:nvPr>
             <p:extLst>
               <p:ext uri="{386F3935-93C4-4BCD-93E2-E3B085C9AB24}">
-                <p16:designElem xmlns:p16="http://schemas.microsoft.com/office/powerpoint/2015/main" xmlns="" val="1"/>
+                <p16:designElem xmlns:p16="http://schemas.microsoft.com/office/powerpoint/2015/main" val="1"/>
               </p:ext>
             </p:extLst>
           </p:nvPr>
@@ -5496,7 +5507,7 @@
           <p:cNvPr id="32" name="Картина 35" descr="Картина, която съдържа небе, открито, ден, висок&#10;&#10;Описанието е генерирано автоматично">
             <a:extLst>
               <a:ext uri="{FF2B5EF4-FFF2-40B4-BE49-F238E27FC236}">
-                <a16:creationId xmlns:a16="http://schemas.microsoft.com/office/drawing/2014/main" xmlns="" id="{4DBDED9E-C9E3-4A94-AD06-E4ABE5A950E9}"/>
+                <a16:creationId xmlns:a16="http://schemas.microsoft.com/office/drawing/2014/main" id="{4DBDED9E-C9E3-4A94-AD06-E4ABE5A950E9}"/>
               </a:ext>
             </a:extLst>
           </p:cNvPr>
@@ -5525,10 +5536,10 @@
           <p:cNvPr id="46" name="Rectangle 48">
             <a:extLst>
               <a:ext uri="{FF2B5EF4-FFF2-40B4-BE49-F238E27FC236}">
-                <a16:creationId xmlns:a16="http://schemas.microsoft.com/office/drawing/2014/main" xmlns="" id="{1D5941F3-0256-4E90-BBBC-5A6EDEB8E0AF}"/>
+                <a16:creationId xmlns:a16="http://schemas.microsoft.com/office/drawing/2014/main" id="{1D5941F3-0256-4E90-BBBC-5A6EDEB8E0AF}"/>
               </a:ext>
               <a:ext uri="{C183D7F6-B498-43B3-948B-1728B52AA6E4}">
-                <adec:decorative xmlns:adec="http://schemas.microsoft.com/office/drawing/2017/decorative" xmlns="" val="1"/>
+                <adec:decorative xmlns:adec="http://schemas.microsoft.com/office/drawing/2017/decorative" val="1"/>
               </a:ext>
             </a:extLst>
           </p:cNvPr>
@@ -5538,7 +5549,7 @@
           <p:nvPr>
             <p:extLst>
               <p:ext uri="{386F3935-93C4-4BCD-93E2-E3B085C9AB24}">
-                <p16:designElem xmlns:p16="http://schemas.microsoft.com/office/powerpoint/2015/main" xmlns="" val="1"/>
+                <p16:designElem xmlns:p16="http://schemas.microsoft.com/office/powerpoint/2015/main" val="1"/>
               </p:ext>
             </p:extLst>
           </p:nvPr>
@@ -5590,7 +5601,7 @@
           <p:cNvPr id="2" name="Заглавие 1">
             <a:extLst>
               <a:ext uri="{FF2B5EF4-FFF2-40B4-BE49-F238E27FC236}">
-                <a16:creationId xmlns:a16="http://schemas.microsoft.com/office/drawing/2014/main" xmlns="" id="{4563E238-7BD6-4B5E-BA20-7222AA8A3F70}"/>
+                <a16:creationId xmlns:a16="http://schemas.microsoft.com/office/drawing/2014/main" id="{4563E238-7BD6-4B5E-BA20-7222AA8A3F70}"/>
               </a:ext>
             </a:extLst>
           </p:cNvPr>
@@ -5629,10 +5640,10 @@
           <p:cNvPr id="48" name="Freeform: Shape 50">
             <a:extLst>
               <a:ext uri="{FF2B5EF4-FFF2-40B4-BE49-F238E27FC236}">
-                <a16:creationId xmlns:a16="http://schemas.microsoft.com/office/drawing/2014/main" xmlns="" id="{A5019358-4900-4555-99FF-EF6AE90B8E32}"/>
+                <a16:creationId xmlns:a16="http://schemas.microsoft.com/office/drawing/2014/main" id="{A5019358-4900-4555-99FF-EF6AE90B8E32}"/>
               </a:ext>
               <a:ext uri="{C183D7F6-B498-43B3-948B-1728B52AA6E4}">
-                <adec:decorative xmlns:adec="http://schemas.microsoft.com/office/drawing/2017/decorative" xmlns="" val="1"/>
+                <adec:decorative xmlns:adec="http://schemas.microsoft.com/office/drawing/2017/decorative" val="1"/>
               </a:ext>
             </a:extLst>
           </p:cNvPr>
@@ -5642,7 +5653,7 @@
           <p:nvPr>
             <p:extLst>
               <p:ext uri="{386F3935-93C4-4BCD-93E2-E3B085C9AB24}">
-                <p16:designElem xmlns:p16="http://schemas.microsoft.com/office/powerpoint/2015/main" xmlns="" val="1"/>
+                <p16:designElem xmlns:p16="http://schemas.microsoft.com/office/powerpoint/2015/main" val="1"/>
               </p:ext>
             </p:extLst>
           </p:nvPr>
@@ -5865,10 +5876,10 @@
           <p:cNvPr id="12" name="Rectangle 11">
             <a:extLst>
               <a:ext uri="{FF2B5EF4-FFF2-40B4-BE49-F238E27FC236}">
-                <a16:creationId xmlns:a16="http://schemas.microsoft.com/office/drawing/2014/main" xmlns="" id="{2A97F59D-628C-4053-B41F-489D0045FD5C}"/>
+                <a16:creationId xmlns:a16="http://schemas.microsoft.com/office/drawing/2014/main" id="{2A97F59D-628C-4053-B41F-489D0045FD5C}"/>
               </a:ext>
               <a:ext uri="{C183D7F6-B498-43B3-948B-1728B52AA6E4}">
-                <adec:decorative xmlns:adec="http://schemas.microsoft.com/office/drawing/2017/decorative" xmlns="" val="1"/>
+                <adec:decorative xmlns:adec="http://schemas.microsoft.com/office/drawing/2017/decorative" val="1"/>
               </a:ext>
             </a:extLst>
           </p:cNvPr>
@@ -5878,7 +5889,7 @@
           <p:nvPr>
             <p:extLst>
               <p:ext uri="{386F3935-93C4-4BCD-93E2-E3B085C9AB24}">
-                <p16:designElem xmlns:p16="http://schemas.microsoft.com/office/powerpoint/2015/main" xmlns="" val="1"/>
+                <p16:designElem xmlns:p16="http://schemas.microsoft.com/office/powerpoint/2015/main" val="1"/>
               </p:ext>
             </p:extLst>
           </p:nvPr>
@@ -5920,10 +5931,10 @@
           <p:cNvPr id="14" name="Rectangle 13">
             <a:extLst>
               <a:ext uri="{FF2B5EF4-FFF2-40B4-BE49-F238E27FC236}">
-                <a16:creationId xmlns:a16="http://schemas.microsoft.com/office/drawing/2014/main" xmlns="" id="{BA75F4A0-FEAF-4F1B-9C48-7688BF9D4148}"/>
+                <a16:creationId xmlns:a16="http://schemas.microsoft.com/office/drawing/2014/main" id="{BA75F4A0-FEAF-4F1B-9C48-7688BF9D4148}"/>
               </a:ext>
               <a:ext uri="{C183D7F6-B498-43B3-948B-1728B52AA6E4}">
-                <adec:decorative xmlns:adec="http://schemas.microsoft.com/office/drawing/2017/decorative" xmlns="" val="1"/>
+                <adec:decorative xmlns:adec="http://schemas.microsoft.com/office/drawing/2017/decorative" val="1"/>
               </a:ext>
             </a:extLst>
           </p:cNvPr>
@@ -5933,7 +5944,7 @@
           <p:nvPr>
             <p:extLst>
               <p:ext uri="{386F3935-93C4-4BCD-93E2-E3B085C9AB24}">
-                <p16:designElem xmlns:p16="http://schemas.microsoft.com/office/powerpoint/2015/main" xmlns="" val="1"/>
+                <p16:designElem xmlns:p16="http://schemas.microsoft.com/office/powerpoint/2015/main" val="1"/>
               </p:ext>
             </p:extLst>
           </p:nvPr>
@@ -5980,7 +5991,7 @@
           <p:cNvPr id="3" name="Заглавие 1">
             <a:extLst>
               <a:ext uri="{FF2B5EF4-FFF2-40B4-BE49-F238E27FC236}">
-                <a16:creationId xmlns:a16="http://schemas.microsoft.com/office/drawing/2014/main" xmlns="" id="{04556CA8-19C7-440D-ACE7-3E23549F3703}"/>
+                <a16:creationId xmlns:a16="http://schemas.microsoft.com/office/drawing/2014/main" id="{04556CA8-19C7-440D-ACE7-3E23549F3703}"/>
               </a:ext>
             </a:extLst>
           </p:cNvPr>
@@ -6041,10 +6052,10 @@
           <p:cNvPr id="16" name="Freeform: Shape 15">
             <a:extLst>
               <a:ext uri="{FF2B5EF4-FFF2-40B4-BE49-F238E27FC236}">
-                <a16:creationId xmlns:a16="http://schemas.microsoft.com/office/drawing/2014/main" xmlns="" id="{F1EC79F3-0DE6-47BA-9C5C-039C54F4AC27}"/>
+                <a16:creationId xmlns:a16="http://schemas.microsoft.com/office/drawing/2014/main" id="{F1EC79F3-0DE6-47BA-9C5C-039C54F4AC27}"/>
               </a:ext>
               <a:ext uri="{C183D7F6-B498-43B3-948B-1728B52AA6E4}">
-                <adec:decorative xmlns:adec="http://schemas.microsoft.com/office/drawing/2017/decorative" xmlns="" val="1"/>
+                <adec:decorative xmlns:adec="http://schemas.microsoft.com/office/drawing/2017/decorative" val="1"/>
               </a:ext>
             </a:extLst>
           </p:cNvPr>
@@ -6054,7 +6065,7 @@
           <p:nvPr>
             <p:extLst>
               <p:ext uri="{386F3935-93C4-4BCD-93E2-E3B085C9AB24}">
-                <p16:designElem xmlns:p16="http://schemas.microsoft.com/office/powerpoint/2015/main" xmlns="" val="1"/>
+                <p16:designElem xmlns:p16="http://schemas.microsoft.com/office/powerpoint/2015/main" val="1"/>
               </p:ext>
             </p:extLst>
           </p:nvPr>
@@ -6152,10 +6163,10 @@
           <p:cNvPr id="18" name="Freeform: Shape 17">
             <a:extLst>
               <a:ext uri="{FF2B5EF4-FFF2-40B4-BE49-F238E27FC236}">
-                <a16:creationId xmlns:a16="http://schemas.microsoft.com/office/drawing/2014/main" xmlns="" id="{C86C2B07-2A41-4CB1-9C51-F037AF41765C}"/>
+                <a16:creationId xmlns:a16="http://schemas.microsoft.com/office/drawing/2014/main" id="{C86C2B07-2A41-4CB1-9C51-F037AF41765C}"/>
               </a:ext>
               <a:ext uri="{C183D7F6-B498-43B3-948B-1728B52AA6E4}">
-                <adec:decorative xmlns:adec="http://schemas.microsoft.com/office/drawing/2017/decorative" xmlns="" val="1"/>
+                <adec:decorative xmlns:adec="http://schemas.microsoft.com/office/drawing/2017/decorative" val="1"/>
               </a:ext>
             </a:extLst>
           </p:cNvPr>
@@ -6165,7 +6176,7 @@
           <p:nvPr>
             <p:extLst>
               <p:ext uri="{386F3935-93C4-4BCD-93E2-E3B085C9AB24}">
-                <p16:designElem xmlns:p16="http://schemas.microsoft.com/office/powerpoint/2015/main" xmlns="" val="1"/>
+                <p16:designElem xmlns:p16="http://schemas.microsoft.com/office/powerpoint/2015/main" val="1"/>
               </p:ext>
             </p:extLst>
           </p:nvPr>
@@ -6254,7 +6265,7 @@
           <p:cNvPr id="5" name="Контейнер за съдържание 2">
             <a:extLst>
               <a:ext uri="{FF2B5EF4-FFF2-40B4-BE49-F238E27FC236}">
-                <a16:creationId xmlns:a16="http://schemas.microsoft.com/office/drawing/2014/main" xmlns="" id="{63AD7ECA-5138-4C42-8A41-788DAE72B142}"/>
+                <a16:creationId xmlns:a16="http://schemas.microsoft.com/office/drawing/2014/main" id="{63AD7ECA-5138-4C42-8A41-788DAE72B142}"/>
               </a:ext>
             </a:extLst>
           </p:cNvPr>
@@ -6524,10 +6535,10 @@
           <p:cNvPr id="20" name="Rectangle 19">
             <a:extLst>
               <a:ext uri="{FF2B5EF4-FFF2-40B4-BE49-F238E27FC236}">
-                <a16:creationId xmlns:a16="http://schemas.microsoft.com/office/drawing/2014/main" xmlns="" id="{A3F67AAC-C977-4759-A5C8-6BC998F963D3}"/>
+                <a16:creationId xmlns:a16="http://schemas.microsoft.com/office/drawing/2014/main" id="{A3F67AAC-C977-4759-A5C8-6BC998F963D3}"/>
               </a:ext>
               <a:ext uri="{C183D7F6-B498-43B3-948B-1728B52AA6E4}">
-                <adec:decorative xmlns:adec="http://schemas.microsoft.com/office/drawing/2017/decorative" xmlns="" val="1"/>
+                <adec:decorative xmlns:adec="http://schemas.microsoft.com/office/drawing/2017/decorative" val="1"/>
               </a:ext>
             </a:extLst>
           </p:cNvPr>
@@ -6537,7 +6548,7 @@
           <p:nvPr>
             <p:extLst>
               <p:ext uri="{386F3935-93C4-4BCD-93E2-E3B085C9AB24}">
-                <p16:designElem xmlns:p16="http://schemas.microsoft.com/office/powerpoint/2015/main" xmlns="" val="1"/>
+                <p16:designElem xmlns:p16="http://schemas.microsoft.com/office/powerpoint/2015/main" val="1"/>
               </p:ext>
             </p:extLst>
           </p:nvPr>
@@ -6590,7 +6601,7 @@
           <p:cNvPr id="7" name="Контейнер за съдържание 3">
             <a:extLst>
               <a:ext uri="{FF2B5EF4-FFF2-40B4-BE49-F238E27FC236}">
-                <a16:creationId xmlns:a16="http://schemas.microsoft.com/office/drawing/2014/main" xmlns="" id="{FF3E29AD-67E3-4664-ADDB-34C17DEE545B}"/>
+                <a16:creationId xmlns:a16="http://schemas.microsoft.com/office/drawing/2014/main" id="{FF3E29AD-67E3-4664-ADDB-34C17DEE545B}"/>
               </a:ext>
             </a:extLst>
           </p:cNvPr>
@@ -6899,7 +6910,7 @@
             <a:hlinkClick r:id="" action="ppaction://media"/>
             <a:extLst>
               <a:ext uri="{FF2B5EF4-FFF2-40B4-BE49-F238E27FC236}">
-                <a16:creationId xmlns:a16="http://schemas.microsoft.com/office/drawing/2014/main" xmlns="" id="{55D59DC7-AE04-47A9-BD19-AE430960F629}"/>
+                <a16:creationId xmlns:a16="http://schemas.microsoft.com/office/drawing/2014/main" id="{55D59DC7-AE04-47A9-BD19-AE430960F629}"/>
               </a:ext>
             </a:extLst>
           </p:cNvPr>
@@ -7061,10 +7072,10 @@
           <p:cNvPr id="31" name="Group 33">
             <a:extLst>
               <a:ext uri="{FF2B5EF4-FFF2-40B4-BE49-F238E27FC236}">
-                <a16:creationId xmlns:a16="http://schemas.microsoft.com/office/drawing/2014/main" xmlns="" id="{449BC34D-9C23-4D6D-8213-1F471AF85B3F}"/>
+                <a16:creationId xmlns:a16="http://schemas.microsoft.com/office/drawing/2014/main" id="{449BC34D-9C23-4D6D-8213-1F471AF85B3F}"/>
               </a:ext>
               <a:ext uri="{C183D7F6-B498-43B3-948B-1728B52AA6E4}">
-                <adec:decorative xmlns:adec="http://schemas.microsoft.com/office/drawing/2017/decorative" xmlns="" val="1"/>
+                <adec:decorative xmlns:adec="http://schemas.microsoft.com/office/drawing/2017/decorative" val="1"/>
               </a:ext>
             </a:extLst>
           </p:cNvPr>
@@ -7074,7 +7085,7 @@
           <p:nvPr>
             <p:extLst>
               <p:ext uri="{386F3935-93C4-4BCD-93E2-E3B085C9AB24}">
-                <p16:designElem xmlns:p16="http://schemas.microsoft.com/office/powerpoint/2015/main" xmlns="" val="1"/>
+                <p16:designElem xmlns:p16="http://schemas.microsoft.com/office/powerpoint/2015/main" val="1"/>
               </p:ext>
             </p:extLst>
           </p:nvPr>
@@ -7092,10 +7103,10 @@
             <p:cNvPr id="35" name="Freeform 6">
               <a:extLst>
                 <a:ext uri="{FF2B5EF4-FFF2-40B4-BE49-F238E27FC236}">
-                  <a16:creationId xmlns:a16="http://schemas.microsoft.com/office/drawing/2014/main" xmlns="" id="{FA0F5D6C-5025-4D7E-82DD-C2C6FDA1E759}"/>
+                  <a16:creationId xmlns:a16="http://schemas.microsoft.com/office/drawing/2014/main" id="{FA0F5D6C-5025-4D7E-82DD-C2C6FDA1E759}"/>
                 </a:ext>
                 <a:ext uri="{C183D7F6-B498-43B3-948B-1728B52AA6E4}">
-                  <adec:decorative xmlns:adec="http://schemas.microsoft.com/office/drawing/2017/decorative" xmlns="" val="1"/>
+                  <adec:decorative xmlns:adec="http://schemas.microsoft.com/office/drawing/2017/decorative" val="1"/>
                 </a:ext>
               </a:extLst>
             </p:cNvPr>
@@ -7103,7 +7114,7 @@
             <p:nvPr>
               <p:extLst>
                 <p:ext uri="{386F3935-93C4-4BCD-93E2-E3B085C9AB24}">
-                  <p16:designElem xmlns:p16="http://schemas.microsoft.com/office/powerpoint/2015/main" xmlns="" val="1"/>
+                  <p16:designElem xmlns:p16="http://schemas.microsoft.com/office/powerpoint/2015/main" val="1"/>
                 </p:ext>
               </p:extLst>
             </p:nvPr>
@@ -7163,10 +7174,10 @@
             <p:cNvPr id="36" name="Freeform 6">
               <a:extLst>
                 <a:ext uri="{FF2B5EF4-FFF2-40B4-BE49-F238E27FC236}">
-                  <a16:creationId xmlns:a16="http://schemas.microsoft.com/office/drawing/2014/main" xmlns="" id="{E2AF2C17-4AB4-4402-B84B-129EF95D161C}"/>
+                  <a16:creationId xmlns:a16="http://schemas.microsoft.com/office/drawing/2014/main" id="{E2AF2C17-4AB4-4402-B84B-129EF95D161C}"/>
                 </a:ext>
                 <a:ext uri="{C183D7F6-B498-43B3-948B-1728B52AA6E4}">
-                  <adec:decorative xmlns:adec="http://schemas.microsoft.com/office/drawing/2017/decorative" xmlns="" val="1"/>
+                  <adec:decorative xmlns:adec="http://schemas.microsoft.com/office/drawing/2017/decorative" val="1"/>
                 </a:ext>
               </a:extLst>
             </p:cNvPr>
@@ -7174,7 +7185,7 @@
             <p:nvPr>
               <p:extLst>
                 <p:ext uri="{386F3935-93C4-4BCD-93E2-E3B085C9AB24}">
-                  <p16:designElem xmlns:p16="http://schemas.microsoft.com/office/powerpoint/2015/main" xmlns="" val="1"/>
+                  <p16:designElem xmlns:p16="http://schemas.microsoft.com/office/powerpoint/2015/main" val="1"/>
                 </p:ext>
               </p:extLst>
             </p:nvPr>
@@ -7237,10 +7248,10 @@
           <p:cNvPr id="32" name="Rectangle 37">
             <a:extLst>
               <a:ext uri="{FF2B5EF4-FFF2-40B4-BE49-F238E27FC236}">
-                <a16:creationId xmlns:a16="http://schemas.microsoft.com/office/drawing/2014/main" xmlns="" id="{1F9A0C1C-8ABC-401B-8FE9-AC9327C4C587}"/>
+                <a16:creationId xmlns:a16="http://schemas.microsoft.com/office/drawing/2014/main" id="{1F9A0C1C-8ABC-401B-8FE9-AC9327C4C587}"/>
               </a:ext>
               <a:ext uri="{C183D7F6-B498-43B3-948B-1728B52AA6E4}">
-                <adec:decorative xmlns:adec="http://schemas.microsoft.com/office/drawing/2017/decorative" xmlns="" val="1"/>
+                <adec:decorative xmlns:adec="http://schemas.microsoft.com/office/drawing/2017/decorative" val="1"/>
               </a:ext>
             </a:extLst>
           </p:cNvPr>
@@ -7250,7 +7261,7 @@
           <p:nvPr>
             <p:extLst>
               <p:ext uri="{386F3935-93C4-4BCD-93E2-E3B085C9AB24}">
-                <p16:designElem xmlns:p16="http://schemas.microsoft.com/office/powerpoint/2015/main" xmlns="" val="1"/>
+                <p16:designElem xmlns:p16="http://schemas.microsoft.com/office/powerpoint/2015/main" val="1"/>
               </p:ext>
             </p:extLst>
           </p:nvPr>
@@ -7297,7 +7308,7 @@
           <p:cNvPr id="3" name="Заглавие 1">
             <a:extLst>
               <a:ext uri="{FF2B5EF4-FFF2-40B4-BE49-F238E27FC236}">
-                <a16:creationId xmlns:a16="http://schemas.microsoft.com/office/drawing/2014/main" xmlns="" id="{0ABAD164-01C7-4C3D-BE53-6D1E1D17BA8E}"/>
+                <a16:creationId xmlns:a16="http://schemas.microsoft.com/office/drawing/2014/main" id="{0ABAD164-01C7-4C3D-BE53-6D1E1D17BA8E}"/>
               </a:ext>
             </a:extLst>
           </p:cNvPr>
@@ -7356,10 +7367,10 @@
           <p:cNvPr id="33" name="Freeform 6">
             <a:extLst>
               <a:ext uri="{FF2B5EF4-FFF2-40B4-BE49-F238E27FC236}">
-                <a16:creationId xmlns:a16="http://schemas.microsoft.com/office/drawing/2014/main" xmlns="" id="{BA5783C3-2F96-40A7-A24F-30CB07AA3928}"/>
+                <a16:creationId xmlns:a16="http://schemas.microsoft.com/office/drawing/2014/main" id="{BA5783C3-2F96-40A7-A24F-30CB07AA3928}"/>
               </a:ext>
               <a:ext uri="{C183D7F6-B498-43B3-948B-1728B52AA6E4}">
-                <adec:decorative xmlns:adec="http://schemas.microsoft.com/office/drawing/2017/decorative" xmlns="" val="1"/>
+                <adec:decorative xmlns:adec="http://schemas.microsoft.com/office/drawing/2017/decorative" val="1"/>
               </a:ext>
             </a:extLst>
           </p:cNvPr>
@@ -7369,7 +7380,7 @@
           <p:nvPr>
             <p:extLst>
               <p:ext uri="{386F3935-93C4-4BCD-93E2-E3B085C9AB24}">
-                <p16:designElem xmlns:p16="http://schemas.microsoft.com/office/powerpoint/2015/main" xmlns="" val="1"/>
+                <p16:designElem xmlns:p16="http://schemas.microsoft.com/office/powerpoint/2015/main" val="1"/>
               </p:ext>
             </p:extLst>
           </p:nvPr>
@@ -7431,10 +7442,10 @@
           <p:cNvPr id="37" name="Freeform 6">
             <a:extLst>
               <a:ext uri="{FF2B5EF4-FFF2-40B4-BE49-F238E27FC236}">
-                <a16:creationId xmlns:a16="http://schemas.microsoft.com/office/drawing/2014/main" xmlns="" id="{A9D08DBA-0326-4C4E-ACFB-576F3ABDD2D0}"/>
+                <a16:creationId xmlns:a16="http://schemas.microsoft.com/office/drawing/2014/main" id="{A9D08DBA-0326-4C4E-ACFB-576F3ABDD2D0}"/>
               </a:ext>
               <a:ext uri="{C183D7F6-B498-43B3-948B-1728B52AA6E4}">
-                <adec:decorative xmlns:adec="http://schemas.microsoft.com/office/drawing/2017/decorative" xmlns="" val="1"/>
+                <adec:decorative xmlns:adec="http://schemas.microsoft.com/office/drawing/2017/decorative" val="1"/>
               </a:ext>
             </a:extLst>
           </p:cNvPr>
@@ -7444,7 +7455,7 @@
           <p:nvPr>
             <p:extLst>
               <p:ext uri="{386F3935-93C4-4BCD-93E2-E3B085C9AB24}">
-                <p16:designElem xmlns:p16="http://schemas.microsoft.com/office/powerpoint/2015/main" xmlns="" val="1"/>
+                <p16:designElem xmlns:p16="http://schemas.microsoft.com/office/powerpoint/2015/main" val="1"/>
               </p:ext>
             </p:extLst>
           </p:nvPr>
@@ -7504,7 +7515,7 @@
           <p:cNvPr id="39" name="Картина 40">
             <a:extLst>
               <a:ext uri="{FF2B5EF4-FFF2-40B4-BE49-F238E27FC236}">
-                <a16:creationId xmlns:a16="http://schemas.microsoft.com/office/drawing/2014/main" xmlns="" id="{A93A8873-FEF6-4B19-9EB2-A5DA531C6B5B}"/>
+                <a16:creationId xmlns:a16="http://schemas.microsoft.com/office/drawing/2014/main" id="{A93A8873-FEF6-4B19-9EB2-A5DA531C6B5B}"/>
               </a:ext>
             </a:extLst>
           </p:cNvPr>
@@ -7534,7 +7545,7 @@
           <p:cNvPr id="29" name="Таблица 29">
             <a:extLst>
               <a:ext uri="{FF2B5EF4-FFF2-40B4-BE49-F238E27FC236}">
-                <a16:creationId xmlns:a16="http://schemas.microsoft.com/office/drawing/2014/main" xmlns="" id="{63DBAADE-1F5E-4C4E-AE94-A8D37F143A63}"/>
+                <a16:creationId xmlns:a16="http://schemas.microsoft.com/office/drawing/2014/main" id="{63DBAADE-1F5E-4C4E-AE94-A8D37F143A63}"/>
               </a:ext>
             </a:extLst>
           </p:cNvPr>
@@ -7563,14 +7574,14 @@
                 <a:gridCol w="2899208">
                   <a:extLst>
                     <a:ext uri="{9D8B030D-6E8A-4147-A177-3AD203B41FA5}">
-                      <a16:colId xmlns:a16="http://schemas.microsoft.com/office/drawing/2014/main" xmlns="" val="1996439488"/>
+                      <a16:colId xmlns:a16="http://schemas.microsoft.com/office/drawing/2014/main" val="1996439488"/>
                     </a:ext>
                   </a:extLst>
                 </a:gridCol>
                 <a:gridCol w="2760015">
                   <a:extLst>
                     <a:ext uri="{9D8B030D-6E8A-4147-A177-3AD203B41FA5}">
-                      <a16:colId xmlns:a16="http://schemas.microsoft.com/office/drawing/2014/main" xmlns="" val="3475802433"/>
+                      <a16:colId xmlns:a16="http://schemas.microsoft.com/office/drawing/2014/main" val="3475802433"/>
                     </a:ext>
                   </a:extLst>
                 </a:gridCol>
@@ -7620,7 +7631,7 @@
                 </a:tc>
                 <a:extLst>
                   <a:ext uri="{0D108BD9-81ED-4DB2-BD59-A6C34878D82A}">
-                    <a16:rowId xmlns:a16="http://schemas.microsoft.com/office/drawing/2014/main" xmlns="" val="996890312"/>
+                    <a16:rowId xmlns:a16="http://schemas.microsoft.com/office/drawing/2014/main" val="996890312"/>
                   </a:ext>
                 </a:extLst>
               </a:tr>
@@ -7669,7 +7680,7 @@
                 </a:tc>
                 <a:extLst>
                   <a:ext uri="{0D108BD9-81ED-4DB2-BD59-A6C34878D82A}">
-                    <a16:rowId xmlns:a16="http://schemas.microsoft.com/office/drawing/2014/main" xmlns="" val="1046381762"/>
+                    <a16:rowId xmlns:a16="http://schemas.microsoft.com/office/drawing/2014/main" val="1046381762"/>
                   </a:ext>
                 </a:extLst>
               </a:tr>
@@ -7718,7 +7729,7 @@
                 </a:tc>
                 <a:extLst>
                   <a:ext uri="{0D108BD9-81ED-4DB2-BD59-A6C34878D82A}">
-                    <a16:rowId xmlns:a16="http://schemas.microsoft.com/office/drawing/2014/main" xmlns="" val="4196316508"/>
+                    <a16:rowId xmlns:a16="http://schemas.microsoft.com/office/drawing/2014/main" val="4196316508"/>
                   </a:ext>
                 </a:extLst>
               </a:tr>
@@ -7759,7 +7770,7 @@
                 </a:tc>
                 <a:extLst>
                   <a:ext uri="{0D108BD9-81ED-4DB2-BD59-A6C34878D82A}">
-                    <a16:rowId xmlns:a16="http://schemas.microsoft.com/office/drawing/2014/main" xmlns="" val="3177275793"/>
+                    <a16:rowId xmlns:a16="http://schemas.microsoft.com/office/drawing/2014/main" val="3177275793"/>
                   </a:ext>
                 </a:extLst>
               </a:tr>
@@ -7773,7 +7784,7 @@
             <a:hlinkClick r:id="" action="ppaction://media"/>
             <a:extLst>
               <a:ext uri="{FF2B5EF4-FFF2-40B4-BE49-F238E27FC236}">
-                <a16:creationId xmlns:a16="http://schemas.microsoft.com/office/drawing/2014/main" xmlns="" id="{1FEB6FFA-C025-4DDA-922D-D1A6E4F5E729}"/>
+                <a16:creationId xmlns:a16="http://schemas.microsoft.com/office/drawing/2014/main" id="{1FEB6FFA-C025-4DDA-922D-D1A6E4F5E729}"/>
               </a:ext>
             </a:extLst>
           </p:cNvPr>
@@ -7935,10 +7946,10 @@
           <p:cNvPr id="14" name="Rectangle 13">
             <a:extLst>
               <a:ext uri="{FF2B5EF4-FFF2-40B4-BE49-F238E27FC236}">
-                <a16:creationId xmlns:a16="http://schemas.microsoft.com/office/drawing/2014/main" xmlns="" id="{0E807223-DF88-4D6D-970E-08919E5E02EB}"/>
+                <a16:creationId xmlns:a16="http://schemas.microsoft.com/office/drawing/2014/main" id="{0E807223-DF88-4D6D-970E-08919E5E02EB}"/>
               </a:ext>
               <a:ext uri="{C183D7F6-B498-43B3-948B-1728B52AA6E4}">
-                <adec:decorative xmlns:adec="http://schemas.microsoft.com/office/drawing/2017/decorative" xmlns="" val="1"/>
+                <adec:decorative xmlns:adec="http://schemas.microsoft.com/office/drawing/2017/decorative" val="1"/>
               </a:ext>
             </a:extLst>
           </p:cNvPr>
@@ -7948,7 +7959,7 @@
           <p:nvPr>
             <p:extLst>
               <p:ext uri="{386F3935-93C4-4BCD-93E2-E3B085C9AB24}">
-                <p16:designElem xmlns:p16="http://schemas.microsoft.com/office/powerpoint/2015/main" xmlns="" val="1"/>
+                <p16:designElem xmlns:p16="http://schemas.microsoft.com/office/powerpoint/2015/main" val="1"/>
               </p:ext>
             </p:extLst>
           </p:nvPr>
@@ -7990,10 +8001,10 @@
           <p:cNvPr id="16" name="Rectangle 15">
             <a:extLst>
               <a:ext uri="{FF2B5EF4-FFF2-40B4-BE49-F238E27FC236}">
-                <a16:creationId xmlns:a16="http://schemas.microsoft.com/office/drawing/2014/main" xmlns="" id="{83B91B61-BFCA-4647-957E-A8269BE46F39}"/>
+                <a16:creationId xmlns:a16="http://schemas.microsoft.com/office/drawing/2014/main" id="{83B91B61-BFCA-4647-957E-A8269BE46F39}"/>
               </a:ext>
               <a:ext uri="{C183D7F6-B498-43B3-948B-1728B52AA6E4}">
-                <adec:decorative xmlns:adec="http://schemas.microsoft.com/office/drawing/2017/decorative" xmlns="" val="1"/>
+                <adec:decorative xmlns:adec="http://schemas.microsoft.com/office/drawing/2017/decorative" val="1"/>
               </a:ext>
             </a:extLst>
           </p:cNvPr>
@@ -8003,7 +8014,7 @@
           <p:nvPr>
             <p:extLst>
               <p:ext uri="{386F3935-93C4-4BCD-93E2-E3B085C9AB24}">
-                <p16:designElem xmlns:p16="http://schemas.microsoft.com/office/powerpoint/2015/main" xmlns="" val="1"/>
+                <p16:designElem xmlns:p16="http://schemas.microsoft.com/office/powerpoint/2015/main" val="1"/>
               </p:ext>
             </p:extLst>
           </p:nvPr>
@@ -8050,7 +8061,7 @@
           <p:cNvPr id="3" name="Текстово поле 2">
             <a:extLst>
               <a:ext uri="{FF2B5EF4-FFF2-40B4-BE49-F238E27FC236}">
-                <a16:creationId xmlns:a16="http://schemas.microsoft.com/office/drawing/2014/main" xmlns="" id="{DE5B222A-B6A6-40E2-9E90-BC4961D935C0}"/>
+                <a16:creationId xmlns:a16="http://schemas.microsoft.com/office/drawing/2014/main" id="{DE5B222A-B6A6-40E2-9E90-BC4961D935C0}"/>
               </a:ext>
             </a:extLst>
           </p:cNvPr>
@@ -8105,7 +8116,7 @@
           <p:cNvPr id="2" name="Картина 2">
             <a:extLst>
               <a:ext uri="{FF2B5EF4-FFF2-40B4-BE49-F238E27FC236}">
-                <a16:creationId xmlns:a16="http://schemas.microsoft.com/office/drawing/2014/main" xmlns="" id="{09D0251B-F02F-40DE-97E0-F185F6E57037}"/>
+                <a16:creationId xmlns:a16="http://schemas.microsoft.com/office/drawing/2014/main" id="{09D0251B-F02F-40DE-97E0-F185F6E57037}"/>
               </a:ext>
             </a:extLst>
           </p:cNvPr>
@@ -8134,10 +8145,10 @@
           <p:cNvPr id="18" name="Rectangle 17">
             <a:extLst>
               <a:ext uri="{FF2B5EF4-FFF2-40B4-BE49-F238E27FC236}">
-                <a16:creationId xmlns:a16="http://schemas.microsoft.com/office/drawing/2014/main" xmlns="" id="{92D1D7C6-1C89-420C-8D35-483654167118}"/>
+                <a16:creationId xmlns:a16="http://schemas.microsoft.com/office/drawing/2014/main" id="{92D1D7C6-1C89-420C-8D35-483654167118}"/>
               </a:ext>
               <a:ext uri="{C183D7F6-B498-43B3-948B-1728B52AA6E4}">
-                <adec:decorative xmlns:adec="http://schemas.microsoft.com/office/drawing/2017/decorative" xmlns="" val="1"/>
+                <adec:decorative xmlns:adec="http://schemas.microsoft.com/office/drawing/2017/decorative" val="1"/>
               </a:ext>
             </a:extLst>
           </p:cNvPr>
@@ -8147,7 +8158,7 @@
           <p:nvPr>
             <p:extLst>
               <p:ext uri="{386F3935-93C4-4BCD-93E2-E3B085C9AB24}">
-                <p16:designElem xmlns:p16="http://schemas.microsoft.com/office/powerpoint/2015/main" xmlns="" val="1"/>
+                <p16:designElem xmlns:p16="http://schemas.microsoft.com/office/powerpoint/2015/main" val="1"/>
               </p:ext>
             </p:extLst>
           </p:nvPr>
@@ -8189,7 +8200,7 @@
           <p:cNvPr id="4" name="Текстово поле 3">
             <a:extLst>
               <a:ext uri="{FF2B5EF4-FFF2-40B4-BE49-F238E27FC236}">
-                <a16:creationId xmlns:a16="http://schemas.microsoft.com/office/drawing/2014/main" xmlns="" id="{80EDAA93-8FA3-4C67-93D8-43C31ECAE70F}"/>
+                <a16:creationId xmlns:a16="http://schemas.microsoft.com/office/drawing/2014/main" id="{80EDAA93-8FA3-4C67-93D8-43C31ECAE70F}"/>
               </a:ext>
             </a:extLst>
           </p:cNvPr>
@@ -8301,10 +8312,10 @@
           <p:cNvPr id="7" name="Rectangle 6">
             <a:extLst>
               <a:ext uri="{FF2B5EF4-FFF2-40B4-BE49-F238E27FC236}">
-                <a16:creationId xmlns:a16="http://schemas.microsoft.com/office/drawing/2014/main" xmlns="" id="{35383F2B-0D6A-4B1A-BA43-A65A34B3B2B3}"/>
+                <a16:creationId xmlns:a16="http://schemas.microsoft.com/office/drawing/2014/main" id="{35383F2B-0D6A-4B1A-BA43-A65A34B3B2B3}"/>
               </a:ext>
               <a:ext uri="{C183D7F6-B498-43B3-948B-1728B52AA6E4}">
-                <adec:decorative xmlns:adec="http://schemas.microsoft.com/office/drawing/2017/decorative" xmlns="" val="1"/>
+                <adec:decorative xmlns:adec="http://schemas.microsoft.com/office/drawing/2017/decorative" val="1"/>
               </a:ext>
             </a:extLst>
           </p:cNvPr>
@@ -8314,7 +8325,7 @@
           <p:nvPr>
             <p:extLst>
               <p:ext uri="{386F3935-93C4-4BCD-93E2-E3B085C9AB24}">
-                <p16:designElem xmlns:p16="http://schemas.microsoft.com/office/powerpoint/2015/main" xmlns="" val="1"/>
+                <p16:designElem xmlns:p16="http://schemas.microsoft.com/office/powerpoint/2015/main" val="1"/>
               </p:ext>
             </p:extLst>
           </p:nvPr>
@@ -8361,7 +8372,7 @@
           <p:cNvPr id="2" name="Картина 2">
             <a:extLst>
               <a:ext uri="{FF2B5EF4-FFF2-40B4-BE49-F238E27FC236}">
-                <a16:creationId xmlns:a16="http://schemas.microsoft.com/office/drawing/2014/main" xmlns="" id="{297DAAC4-A373-4EFD-8E78-CA8D4F88C9E7}"/>
+                <a16:creationId xmlns:a16="http://schemas.microsoft.com/office/drawing/2014/main" id="{297DAAC4-A373-4EFD-8E78-CA8D4F88C9E7}"/>
               </a:ext>
             </a:extLst>
           </p:cNvPr>
@@ -8423,7 +8434,7 @@
           <p:cNvPr id="3" name="Текстово поле 2">
             <a:extLst>
               <a:ext uri="{FF2B5EF4-FFF2-40B4-BE49-F238E27FC236}">
-                <a16:creationId xmlns:a16="http://schemas.microsoft.com/office/drawing/2014/main" xmlns="" id="{AE87C820-A5D7-4E23-A9B0-1192B7E70490}"/>
+                <a16:creationId xmlns:a16="http://schemas.microsoft.com/office/drawing/2014/main" id="{AE87C820-A5D7-4E23-A9B0-1192B7E70490}"/>
               </a:ext>
             </a:extLst>
           </p:cNvPr>
@@ -8461,7 +8472,7 @@
           <p:cNvPr id="4" name="Текстово поле 3">
             <a:extLst>
               <a:ext uri="{FF2B5EF4-FFF2-40B4-BE49-F238E27FC236}">
-                <a16:creationId xmlns:a16="http://schemas.microsoft.com/office/drawing/2014/main" xmlns="" id="{86D82ED0-DEA5-46C3-ABEF-7BEF11973A3C}"/>
+                <a16:creationId xmlns:a16="http://schemas.microsoft.com/office/drawing/2014/main" id="{86D82ED0-DEA5-46C3-ABEF-7BEF11973A3C}"/>
               </a:ext>
             </a:extLst>
           </p:cNvPr>
@@ -8508,7 +8519,7 @@
           <p:cNvPr id="9" name="Текстово поле 8">
             <a:extLst>
               <a:ext uri="{FF2B5EF4-FFF2-40B4-BE49-F238E27FC236}">
-                <a16:creationId xmlns:a16="http://schemas.microsoft.com/office/drawing/2014/main" xmlns="" id="{27D7D6C8-2012-4C48-85C1-B7D8D577656D}"/>
+                <a16:creationId xmlns:a16="http://schemas.microsoft.com/office/drawing/2014/main" id="{27D7D6C8-2012-4C48-85C1-B7D8D577656D}"/>
               </a:ext>
             </a:extLst>
           </p:cNvPr>
@@ -8555,7 +8566,7 @@
           <p:cNvPr id="5" name="Текстово поле 4">
             <a:extLst>
               <a:ext uri="{FF2B5EF4-FFF2-40B4-BE49-F238E27FC236}">
-                <a16:creationId xmlns:a16="http://schemas.microsoft.com/office/drawing/2014/main" xmlns="" id="{2F0D7B30-DDFF-48A2-97F5-C2EB6AC4FDD5}"/>
+                <a16:creationId xmlns:a16="http://schemas.microsoft.com/office/drawing/2014/main" id="{2F0D7B30-DDFF-48A2-97F5-C2EB6AC4FDD5}"/>
               </a:ext>
             </a:extLst>
           </p:cNvPr>
@@ -8616,11 +8627,11 @@
       </p:sp>
       <p:pic>
         <p:nvPicPr>
-          <p:cNvPr id="6" name="Slide 5">
+          <p:cNvPr id="8" name="Slide 5">
             <a:hlinkClick r:id="" action="ppaction://media"/>
             <a:extLst>
               <a:ext uri="{FF2B5EF4-FFF2-40B4-BE49-F238E27FC236}">
-                <a16:creationId xmlns:a16="http://schemas.microsoft.com/office/drawing/2014/main" xmlns="" id="{C79E50C3-73CD-4225-930C-1CF7220AE327}"/>
+                <a16:creationId xmlns:a16="http://schemas.microsoft.com/office/drawing/2014/main" id="{207078E6-EA94-4B7C-BFFB-7C6FA7DCB0FD}"/>
               </a:ext>
             </a:extLst>
           </p:cNvPr>
@@ -8628,12 +8639,10 @@
             <a:picLocks noChangeAspect="1"/>
           </p:cNvPicPr>
           <p:nvPr>
-            <a:audioFile r:link="rId1"/>
+            <a:audioFile r:link="rId2"/>
             <p:extLst>
               <p:ext uri="{DAA4B4D4-6D71-4841-9C94-3DE7FCFB9230}">
-                <p14:media xmlns:p14="http://schemas.microsoft.com/office/powerpoint/2010/main" r:embed="rId2">
-                  <p14:trim end="1856.0544"/>
-                </p14:media>
+                <p14:media xmlns:p14="http://schemas.microsoft.com/office/powerpoint/2010/main" r:embed="rId1"/>
               </p:ext>
             </p:extLst>
           </p:nvPr>
@@ -8646,7 +8655,7 @@
         </p:blipFill>
         <p:spPr>
           <a:xfrm>
-            <a:off x="11233256" y="6069750"/>
+            <a:off x="11463130" y="6106193"/>
             <a:ext cx="609600" cy="609600"/>
           </a:xfrm>
           <a:prstGeom prst="rect">
@@ -8676,9 +8685,6 @@
                     <p:cTn id="3" fill="hold">
                       <p:stCondLst>
                         <p:cond delay="indefinite"/>
-                        <p:cond evt="onBegin" delay="0">
-                          <p:tn val="2"/>
-                        </p:cond>
                       </p:stCondLst>
                       <p:childTnLst>
                         <p:par>
@@ -8688,16 +8694,16 @@
                             </p:stCondLst>
                             <p:childTnLst>
                               <p:par>
-                                <p:cTn id="5" presetID="1" presetClass="mediacall" presetSubtype="0" fill="hold" nodeType="afterEffect">
+                                <p:cTn id="5" presetID="1" presetClass="mediacall" presetSubtype="0" fill="hold" nodeType="clickEffect">
                                   <p:stCondLst>
                                     <p:cond delay="0"/>
                                   </p:stCondLst>
                                   <p:childTnLst>
                                     <p:cmd type="call" cmd="playFrom(0.0)">
                                       <p:cBhvr>
-                                        <p:cTn id="6" dur="44710" fill="hold"/>
+                                        <p:cTn id="6" dur="39692" fill="hold"/>
                                         <p:tgtEl>
-                                          <p:spTgt spid="6"/>
+                                          <p:spTgt spid="8"/>
                                         </p:tgtEl>
                                       </p:cBhvr>
                                     </p:cmd>
@@ -8742,7 +8748,7 @@
                   </p:endCondLst>
                 </p:cTn>
                 <p:tgtEl>
-                  <p:spTgt spid="6"/>
+                  <p:spTgt spid="8"/>
                 </p:tgtEl>
               </p:cMediaNode>
             </p:audio>
@@ -8776,7 +8782,7 @@
           <p:cNvPr id="2" name="Текстово поле 1">
             <a:extLst>
               <a:ext uri="{FF2B5EF4-FFF2-40B4-BE49-F238E27FC236}">
-                <a16:creationId xmlns:a16="http://schemas.microsoft.com/office/drawing/2014/main" xmlns="" id="{F6739BB3-2EA5-48AF-B37D-A3A4F9940362}"/>
+                <a16:creationId xmlns:a16="http://schemas.microsoft.com/office/drawing/2014/main" id="{F6739BB3-2EA5-48AF-B37D-A3A4F9940362}"/>
               </a:ext>
             </a:extLst>
           </p:cNvPr>
@@ -8804,7 +8810,7 @@
           <a:p>
             <a:pPr algn="ctr"/>
             <a:r>
-              <a:rPr lang="en-US" sz="4400" dirty="0" smtClean="0"/>
+              <a:rPr lang="en-US" sz="4400" dirty="0"/>
               <a:t>Logos and Design</a:t>
             </a:r>
             <a:endParaRPr lang="bg-BG" sz="4400" dirty="0"/>
@@ -9075,13 +9081,6 @@
   <p:clrMapOvr>
     <a:masterClrMapping/>
   </p:clrMapOvr>
-  <p:timing>
-    <p:tnLst>
-      <p:par>
-        <p:cTn id="1" dur="indefinite" restart="never" nodeType="tmRoot"/>
-      </p:par>
-    </p:tnLst>
-  </p:timing>
 </p:sld>
 </file>
 
@@ -9107,7 +9106,7 @@
           <p:cNvPr id="2" name="Текстово поле 1">
             <a:extLst>
               <a:ext uri="{FF2B5EF4-FFF2-40B4-BE49-F238E27FC236}">
-                <a16:creationId xmlns:a16="http://schemas.microsoft.com/office/drawing/2014/main" xmlns="" id="{F6739BB3-2EA5-48AF-B37D-A3A4F9940362}"/>
+                <a16:creationId xmlns:a16="http://schemas.microsoft.com/office/drawing/2014/main" id="{F6739BB3-2EA5-48AF-B37D-A3A4F9940362}"/>
               </a:ext>
             </a:extLst>
           </p:cNvPr>
@@ -9150,7 +9149,7 @@
           <p:cNvPr id="4" name="Картина 4">
             <a:extLst>
               <a:ext uri="{FF2B5EF4-FFF2-40B4-BE49-F238E27FC236}">
-                <a16:creationId xmlns:a16="http://schemas.microsoft.com/office/drawing/2014/main" xmlns="" id="{11D7D10B-36D6-4264-A1B4-0FF1E422751F}"/>
+                <a16:creationId xmlns:a16="http://schemas.microsoft.com/office/drawing/2014/main" id="{11D7D10B-36D6-4264-A1B4-0FF1E422751F}"/>
               </a:ext>
             </a:extLst>
           </p:cNvPr>
@@ -9180,7 +9179,7 @@
           <p:cNvPr id="6" name="Картина 6">
             <a:extLst>
               <a:ext uri="{FF2B5EF4-FFF2-40B4-BE49-F238E27FC236}">
-                <a16:creationId xmlns:a16="http://schemas.microsoft.com/office/drawing/2014/main" xmlns="" id="{072FD017-1F94-41B9-B3DE-7C3658F8F91F}"/>
+                <a16:creationId xmlns:a16="http://schemas.microsoft.com/office/drawing/2014/main" id="{072FD017-1F94-41B9-B3DE-7C3658F8F91F}"/>
               </a:ext>
             </a:extLst>
           </p:cNvPr>
@@ -9210,7 +9209,7 @@
           <p:cNvPr id="7" name="Картина 7">
             <a:extLst>
               <a:ext uri="{FF2B5EF4-FFF2-40B4-BE49-F238E27FC236}">
-                <a16:creationId xmlns:a16="http://schemas.microsoft.com/office/drawing/2014/main" xmlns="" id="{9FEB4DFD-ED35-4AD2-90DB-8215E25AAFD7}"/>
+                <a16:creationId xmlns:a16="http://schemas.microsoft.com/office/drawing/2014/main" id="{9FEB4DFD-ED35-4AD2-90DB-8215E25AAFD7}"/>
               </a:ext>
             </a:extLst>
           </p:cNvPr>
@@ -9240,7 +9239,7 @@
           <p:cNvPr id="8" name="Картина 8">
             <a:extLst>
               <a:ext uri="{FF2B5EF4-FFF2-40B4-BE49-F238E27FC236}">
-                <a16:creationId xmlns:a16="http://schemas.microsoft.com/office/drawing/2014/main" xmlns="" id="{EF991951-F14F-42D5-ABE4-6C7D6B23750A}"/>
+                <a16:creationId xmlns:a16="http://schemas.microsoft.com/office/drawing/2014/main" id="{EF991951-F14F-42D5-ABE4-6C7D6B23750A}"/>
               </a:ext>
             </a:extLst>
           </p:cNvPr>
@@ -9270,7 +9269,7 @@
           <p:cNvPr id="9" name="Картина 9">
             <a:extLst>
               <a:ext uri="{FF2B5EF4-FFF2-40B4-BE49-F238E27FC236}">
-                <a16:creationId xmlns:a16="http://schemas.microsoft.com/office/drawing/2014/main" xmlns="" id="{04BA4758-2497-45A6-BF0D-B7E2A254C420}"/>
+                <a16:creationId xmlns:a16="http://schemas.microsoft.com/office/drawing/2014/main" id="{04BA4758-2497-45A6-BF0D-B7E2A254C420}"/>
               </a:ext>
             </a:extLst>
           </p:cNvPr>
@@ -9300,7 +9299,7 @@
           <p:cNvPr id="13" name="Картина 13">
             <a:extLst>
               <a:ext uri="{FF2B5EF4-FFF2-40B4-BE49-F238E27FC236}">
-                <a16:creationId xmlns:a16="http://schemas.microsoft.com/office/drawing/2014/main" xmlns="" id="{FA1458E0-54F7-4930-AE44-19AB040CC70A}"/>
+                <a16:creationId xmlns:a16="http://schemas.microsoft.com/office/drawing/2014/main" id="{FA1458E0-54F7-4930-AE44-19AB040CC70A}"/>
               </a:ext>
             </a:extLst>
           </p:cNvPr>
@@ -9331,7 +9330,7 @@
             <a:hlinkClick r:id="" action="ppaction://media"/>
             <a:extLst>
               <a:ext uri="{FF2B5EF4-FFF2-40B4-BE49-F238E27FC236}">
-                <a16:creationId xmlns:a16="http://schemas.microsoft.com/office/drawing/2014/main" xmlns="" id="{E786ADEE-D86B-4E69-9F75-8ABD19B810F0}"/>
+                <a16:creationId xmlns:a16="http://schemas.microsoft.com/office/drawing/2014/main" id="{E786ADEE-D86B-4E69-9F75-8ABD19B810F0}"/>
               </a:ext>
             </a:extLst>
           </p:cNvPr>
@@ -9493,10 +9492,10 @@
           <p:cNvPr id="37" name="Group 36">
             <a:extLst>
               <a:ext uri="{FF2B5EF4-FFF2-40B4-BE49-F238E27FC236}">
-                <a16:creationId xmlns:a16="http://schemas.microsoft.com/office/drawing/2014/main" xmlns="" id="{9D9D6BF1-DFF2-4526-9D13-BF339D8C4163}"/>
+                <a16:creationId xmlns:a16="http://schemas.microsoft.com/office/drawing/2014/main" id="{9D9D6BF1-DFF2-4526-9D13-BF339D8C4163}"/>
               </a:ext>
               <a:ext uri="{C183D7F6-B498-43B3-948B-1728B52AA6E4}">
-                <adec:decorative xmlns:adec="http://schemas.microsoft.com/office/drawing/2017/decorative" xmlns="" val="1"/>
+                <adec:decorative xmlns:adec="http://schemas.microsoft.com/office/drawing/2017/decorative" val="1"/>
               </a:ext>
             </a:extLst>
           </p:cNvPr>
@@ -9506,7 +9505,7 @@
           <p:nvPr>
             <p:extLst>
               <p:ext uri="{386F3935-93C4-4BCD-93E2-E3B085C9AB24}">
-                <p16:designElem xmlns:p16="http://schemas.microsoft.com/office/powerpoint/2015/main" xmlns="" val="1"/>
+                <p16:designElem xmlns:p16="http://schemas.microsoft.com/office/powerpoint/2015/main" val="1"/>
               </p:ext>
             </p:extLst>
           </p:nvPr>
@@ -9524,10 +9523,10 @@
             <p:cNvPr id="38" name="Freeform 6">
               <a:extLst>
                 <a:ext uri="{FF2B5EF4-FFF2-40B4-BE49-F238E27FC236}">
-                  <a16:creationId xmlns:a16="http://schemas.microsoft.com/office/drawing/2014/main" xmlns="" id="{A54D4DB6-FB18-4CAE-8905-E0053C92569E}"/>
+                  <a16:creationId xmlns:a16="http://schemas.microsoft.com/office/drawing/2014/main" id="{A54D4DB6-FB18-4CAE-8905-E0053C92569E}"/>
                 </a:ext>
                 <a:ext uri="{C183D7F6-B498-43B3-948B-1728B52AA6E4}">
-                  <adec:decorative xmlns:adec="http://schemas.microsoft.com/office/drawing/2017/decorative" xmlns="" val="1"/>
+                  <adec:decorative xmlns:adec="http://schemas.microsoft.com/office/drawing/2017/decorative" val="1"/>
                 </a:ext>
               </a:extLst>
             </p:cNvPr>
@@ -9535,7 +9534,7 @@
             <p:nvPr>
               <p:extLst>
                 <p:ext uri="{386F3935-93C4-4BCD-93E2-E3B085C9AB24}">
-                  <p16:designElem xmlns:p16="http://schemas.microsoft.com/office/powerpoint/2015/main" xmlns="" val="1"/>
+                  <p16:designElem xmlns:p16="http://schemas.microsoft.com/office/powerpoint/2015/main" val="1"/>
                 </p:ext>
               </p:extLst>
             </p:nvPr>
@@ -9595,10 +9594,10 @@
             <p:cNvPr id="39" name="Freeform 6">
               <a:extLst>
                 <a:ext uri="{FF2B5EF4-FFF2-40B4-BE49-F238E27FC236}">
-                  <a16:creationId xmlns:a16="http://schemas.microsoft.com/office/drawing/2014/main" xmlns="" id="{1DBD6488-9429-4FFA-8AE8-C4022C39B0F2}"/>
+                  <a16:creationId xmlns:a16="http://schemas.microsoft.com/office/drawing/2014/main" id="{1DBD6488-9429-4FFA-8AE8-C4022C39B0F2}"/>
                 </a:ext>
                 <a:ext uri="{C183D7F6-B498-43B3-948B-1728B52AA6E4}">
-                  <adec:decorative xmlns:adec="http://schemas.microsoft.com/office/drawing/2017/decorative" xmlns="" val="1"/>
+                  <adec:decorative xmlns:adec="http://schemas.microsoft.com/office/drawing/2017/decorative" val="1"/>
                 </a:ext>
               </a:extLst>
             </p:cNvPr>
@@ -9606,7 +9605,7 @@
             <p:nvPr>
               <p:extLst>
                 <p:ext uri="{386F3935-93C4-4BCD-93E2-E3B085C9AB24}">
-                  <p16:designElem xmlns:p16="http://schemas.microsoft.com/office/powerpoint/2015/main" xmlns="" val="1"/>
+                  <p16:designElem xmlns:p16="http://schemas.microsoft.com/office/powerpoint/2015/main" val="1"/>
                 </p:ext>
               </p:extLst>
             </p:nvPr>
@@ -9669,7 +9668,7 @@
           <p:cNvPr id="2" name="Текстово поле 1">
             <a:extLst>
               <a:ext uri="{FF2B5EF4-FFF2-40B4-BE49-F238E27FC236}">
-                <a16:creationId xmlns:a16="http://schemas.microsoft.com/office/drawing/2014/main" xmlns="" id="{A6424D40-9064-4DFC-8A40-C47E849F4898}"/>
+                <a16:creationId xmlns:a16="http://schemas.microsoft.com/office/drawing/2014/main" id="{A6424D40-9064-4DFC-8A40-C47E849F4898}"/>
               </a:ext>
             </a:extLst>
           </p:cNvPr>
@@ -9724,7 +9723,7 @@
           <p:cNvPr id="3" name="Картина 3">
             <a:extLst>
               <a:ext uri="{FF2B5EF4-FFF2-40B4-BE49-F238E27FC236}">
-                <a16:creationId xmlns:a16="http://schemas.microsoft.com/office/drawing/2014/main" xmlns="" id="{2CC1C5A0-4960-4921-B307-49C0CCF9CC95}"/>
+                <a16:creationId xmlns:a16="http://schemas.microsoft.com/office/drawing/2014/main" id="{2CC1C5A0-4960-4921-B307-49C0CCF9CC95}"/>
               </a:ext>
             </a:extLst>
           </p:cNvPr>
@@ -9795,7 +9794,7 @@
           <p:cNvPr id="2" name="Картина 2">
             <a:extLst>
               <a:ext uri="{FF2B5EF4-FFF2-40B4-BE49-F238E27FC236}">
-                <a16:creationId xmlns:a16="http://schemas.microsoft.com/office/drawing/2014/main" xmlns="" id="{E81AB0D2-F5F4-42F4-81EA-E2AE1D0F8BEC}"/>
+                <a16:creationId xmlns:a16="http://schemas.microsoft.com/office/drawing/2014/main" id="{E81AB0D2-F5F4-42F4-81EA-E2AE1D0F8BEC}"/>
               </a:ext>
             </a:extLst>
           </p:cNvPr>
@@ -9824,7 +9823,7 @@
           <p:cNvPr id="3" name="Текстово поле 2">
             <a:extLst>
               <a:ext uri="{FF2B5EF4-FFF2-40B4-BE49-F238E27FC236}">
-                <a16:creationId xmlns:a16="http://schemas.microsoft.com/office/drawing/2014/main" xmlns="" id="{8DA100FE-4FF6-438E-B035-2018E206D794}"/>
+                <a16:creationId xmlns:a16="http://schemas.microsoft.com/office/drawing/2014/main" id="{8DA100FE-4FF6-438E-B035-2018E206D794}"/>
               </a:ext>
             </a:extLst>
           </p:cNvPr>
@@ -9864,7 +9863,7 @@
           <p:cNvPr id="6" name="Контейнер за съдържание 2">
             <a:extLst>
               <a:ext uri="{FF2B5EF4-FFF2-40B4-BE49-F238E27FC236}">
-                <a16:creationId xmlns:a16="http://schemas.microsoft.com/office/drawing/2014/main" xmlns="" id="{1985DDA9-46D3-42F4-9413-6486DCB0A117}"/>
+                <a16:creationId xmlns:a16="http://schemas.microsoft.com/office/drawing/2014/main" id="{1985DDA9-46D3-42F4-9413-6486DCB0A117}"/>
               </a:ext>
             </a:extLst>
           </p:cNvPr>
@@ -10169,7 +10168,7 @@
             <a:hlinkClick r:id="" action="ppaction://media"/>
             <a:extLst>
               <a:ext uri="{FF2B5EF4-FFF2-40B4-BE49-F238E27FC236}">
-                <a16:creationId xmlns:a16="http://schemas.microsoft.com/office/drawing/2014/main" xmlns="" id="{943A79AB-5EE4-456C-A3CD-95EBACFF7951}"/>
+                <a16:creationId xmlns:a16="http://schemas.microsoft.com/office/drawing/2014/main" id="{943A79AB-5EE4-456C-A3CD-95EBACFF7951}"/>
               </a:ext>
             </a:extLst>
           </p:cNvPr>
@@ -10553,7 +10552,7 @@
   <a:extraClrSchemeLst/>
   <a:extLst>
     <a:ext uri="{05A4C25C-085E-4340-85A3-A5531E510DB2}">
-      <thm15:themeFamily xmlns:thm15="http://schemas.microsoft.com/office/thememl/2012/main" xmlns="" name="Crop" id="{EC9488ED-E761-4D60-9AC4-764D1FE2C171}" vid="{CE19780C-D67D-4C13-9DE9-A52BC3BA51B4}"/>
+      <thm15:themeFamily xmlns:thm15="http://schemas.microsoft.com/office/thememl/2012/main" name="Crop" id="{EC9488ED-E761-4D60-9AC4-764D1FE2C171}" vid="{CE19780C-D67D-4C13-9DE9-A52BC3BA51B4}"/>
     </a:ext>
   </a:extLst>
 </a:theme>
@@ -10848,7 +10847,7 @@
   <a:extraClrSchemeLst/>
   <a:extLst>
     <a:ext uri="{05A4C25C-085E-4340-85A3-A5531E510DB2}">
-      <thm15:themeFamily xmlns:thm15="http://schemas.microsoft.com/office/thememl/2012/main" xmlns="" name="Office Theme" id="{62F939B6-93AF-4DB8-9C6B-D6C7DFDC589F}" vid="{4A3C46E8-61CC-4603-A589-7422A47A8E4A}"/>
+      <thm15:themeFamily xmlns:thm15="http://schemas.microsoft.com/office/thememl/2012/main" name="Office Theme" id="{62F939B6-93AF-4DB8-9C6B-D6C7DFDC589F}" vid="{4A3C46E8-61CC-4603-A589-7422A47A8E4A}"/>
     </a:ext>
   </a:extLst>
 </a:theme>
@@ -11143,7 +11142,7 @@
   <a:extraClrSchemeLst/>
   <a:extLst>
     <a:ext uri="{05A4C25C-085E-4340-85A3-A5531E510DB2}">
-      <thm15:themeFamily xmlns:thm15="http://schemas.microsoft.com/office/thememl/2012/main" xmlns="" name="Office Theme" id="{62F939B6-93AF-4DB8-9C6B-D6C7DFDC589F}" vid="{4A3C46E8-61CC-4603-A589-7422A47A8E4A}"/>
+      <thm15:themeFamily xmlns:thm15="http://schemas.microsoft.com/office/thememl/2012/main" name="Office Theme" id="{62F939B6-93AF-4DB8-9C6B-D6C7DFDC589F}" vid="{4A3C46E8-61CC-4603-A589-7422A47A8E4A}"/>
     </a:ext>
   </a:extLst>
 </a:theme>

</xml_diff>